<commit_message>
Add Aha solution in Content
</commit_message>
<xml_diff>
--- a/Aha-presentation.pptx
+++ b/Aha-presentation.pptx
@@ -8,7 +8,7 @@
     <p:sldId id="256" r:id="rId2"/>
     <p:sldId id="257" r:id="rId3"/>
     <p:sldId id="258" r:id="rId4"/>
-    <p:sldId id="267" r:id="rId5"/>
+    <p:sldId id="268" r:id="rId5"/>
     <p:sldId id="259" r:id="rId6"/>
     <p:sldId id="260" r:id="rId7"/>
     <p:sldId id="262" r:id="rId8"/>
@@ -173,7 +173,7 @@
           <a:noFill/>
           <a:extLst>
             <a:ext uri="{909E8E84-426E-40dd-AFC4-6F175D3DCCD1}">
-              <a14:hiddenFill xmlns:a14="http://schemas.microsoft.com/office/drawing/2010/main" xmlns="">
+              <a14:hiddenFill xmlns="" xmlns:a14="http://schemas.microsoft.com/office/drawing/2010/main">
                 <a:solidFill>
                   <a:srgbClr val="FFFFFF"/>
                 </a:solidFill>
@@ -233,7 +233,7 @@
             </a:ln>
             <a:extLst>
               <a:ext uri="{91240B29-F687-4f45-9708-019B960494DF}">
-                <a14:hiddenLine xmlns:a14="http://schemas.microsoft.com/office/drawing/2010/main" xmlns="" w="9525">
+                <a14:hiddenLine xmlns="" xmlns:a14="http://schemas.microsoft.com/office/drawing/2010/main" w="9525">
                   <a:solidFill>
                     <a:srgbClr val="000000"/>
                   </a:solidFill>
@@ -323,7 +323,7 @@
             </a:ln>
             <a:extLst>
               <a:ext uri="{91240B29-F687-4f45-9708-019B960494DF}">
-                <a14:hiddenLine xmlns:a14="http://schemas.microsoft.com/office/drawing/2010/main" xmlns="" w="9525">
+                <a14:hiddenLine xmlns="" xmlns:a14="http://schemas.microsoft.com/office/drawing/2010/main" w="9525">
                   <a:solidFill>
                     <a:srgbClr val="000000"/>
                   </a:solidFill>
@@ -413,7 +413,7 @@
             </a:ln>
             <a:extLst>
               <a:ext uri="{91240B29-F687-4f45-9708-019B960494DF}">
-                <a14:hiddenLine xmlns:a14="http://schemas.microsoft.com/office/drawing/2010/main" xmlns="" w="9525">
+                <a14:hiddenLine xmlns="" xmlns:a14="http://schemas.microsoft.com/office/drawing/2010/main" w="9525">
                   <a:solidFill>
                     <a:srgbClr val="000000"/>
                   </a:solidFill>
@@ -447,7 +447,7 @@
             </a:ln>
             <a:extLst>
               <a:ext uri="{91240B29-F687-4f45-9708-019B960494DF}">
-                <a14:hiddenLine xmlns:a14="http://schemas.microsoft.com/office/drawing/2010/main" xmlns="" w="9525">
+                <a14:hiddenLine xmlns="" xmlns:a14="http://schemas.microsoft.com/office/drawing/2010/main" w="9525">
                   <a:solidFill>
                     <a:srgbClr val="000000"/>
                   </a:solidFill>
@@ -537,7 +537,7 @@
             </a:ln>
             <a:extLst>
               <a:ext uri="{91240B29-F687-4f45-9708-019B960494DF}">
-                <a14:hiddenLine xmlns:a14="http://schemas.microsoft.com/office/drawing/2010/main" xmlns="" w="9525">
+                <a14:hiddenLine xmlns="" xmlns:a14="http://schemas.microsoft.com/office/drawing/2010/main" w="9525">
                   <a:solidFill>
                     <a:srgbClr val="000000"/>
                   </a:solidFill>
@@ -599,7 +599,7 @@
             </a:ln>
             <a:extLst>
               <a:ext uri="{91240B29-F687-4f45-9708-019B960494DF}">
-                <a14:hiddenLine xmlns:a14="http://schemas.microsoft.com/office/drawing/2010/main" xmlns="" w="9525">
+                <a14:hiddenLine xmlns="" xmlns:a14="http://schemas.microsoft.com/office/drawing/2010/main" w="9525">
                   <a:solidFill>
                     <a:srgbClr val="000000"/>
                   </a:solidFill>
@@ -661,7 +661,7 @@
             </a:ln>
             <a:extLst>
               <a:ext uri="{91240B29-F687-4f45-9708-019B960494DF}">
-                <a14:hiddenLine xmlns:a14="http://schemas.microsoft.com/office/drawing/2010/main" xmlns="" w="9525">
+                <a14:hiddenLine xmlns="" xmlns:a14="http://schemas.microsoft.com/office/drawing/2010/main" w="9525">
                   <a:solidFill>
                     <a:srgbClr val="000000"/>
                   </a:solidFill>
@@ -751,7 +751,7 @@
             </a:ln>
             <a:extLst>
               <a:ext uri="{91240B29-F687-4f45-9708-019B960494DF}">
-                <a14:hiddenLine xmlns:a14="http://schemas.microsoft.com/office/drawing/2010/main" xmlns="" w="9525">
+                <a14:hiddenLine xmlns="" xmlns:a14="http://schemas.microsoft.com/office/drawing/2010/main" w="9525">
                   <a:solidFill>
                     <a:srgbClr val="000000"/>
                   </a:solidFill>
@@ -813,7 +813,7 @@
             </a:ln>
             <a:extLst>
               <a:ext uri="{91240B29-F687-4f45-9708-019B960494DF}">
-                <a14:hiddenLine xmlns:a14="http://schemas.microsoft.com/office/drawing/2010/main" xmlns="" w="9525">
+                <a14:hiddenLine xmlns="" xmlns:a14="http://schemas.microsoft.com/office/drawing/2010/main" w="9525">
                   <a:solidFill>
                     <a:srgbClr val="000000"/>
                   </a:solidFill>
@@ -875,7 +875,7 @@
             </a:ln>
             <a:extLst>
               <a:ext uri="{91240B29-F687-4f45-9708-019B960494DF}">
-                <a14:hiddenLine xmlns:a14="http://schemas.microsoft.com/office/drawing/2010/main" xmlns="" w="9525">
+                <a14:hiddenLine xmlns="" xmlns:a14="http://schemas.microsoft.com/office/drawing/2010/main" w="9525">
                   <a:solidFill>
                     <a:srgbClr val="000000"/>
                   </a:solidFill>
@@ -965,7 +965,7 @@
             </a:ln>
             <a:extLst>
               <a:ext uri="{91240B29-F687-4f45-9708-019B960494DF}">
-                <a14:hiddenLine xmlns:a14="http://schemas.microsoft.com/office/drawing/2010/main" xmlns="" w="9525">
+                <a14:hiddenLine xmlns="" xmlns:a14="http://schemas.microsoft.com/office/drawing/2010/main" w="9525">
                   <a:solidFill>
                     <a:srgbClr val="000000"/>
                   </a:solidFill>
@@ -1055,7 +1055,7 @@
             </a:ln>
             <a:extLst>
               <a:ext uri="{91240B29-F687-4f45-9708-019B960494DF}">
-                <a14:hiddenLine xmlns:a14="http://schemas.microsoft.com/office/drawing/2010/main" xmlns="" w="9525">
+                <a14:hiddenLine xmlns="" xmlns:a14="http://schemas.microsoft.com/office/drawing/2010/main" w="9525">
                   <a:solidFill>
                     <a:srgbClr val="000000"/>
                   </a:solidFill>
@@ -1117,7 +1117,7 @@
             </a:ln>
             <a:extLst>
               <a:ext uri="{91240B29-F687-4f45-9708-019B960494DF}">
-                <a14:hiddenLine xmlns:a14="http://schemas.microsoft.com/office/drawing/2010/main" xmlns="" w="9525">
+                <a14:hiddenLine xmlns="" xmlns:a14="http://schemas.microsoft.com/office/drawing/2010/main" w="9525">
                   <a:solidFill>
                     <a:srgbClr val="000000"/>
                   </a:solidFill>
@@ -1227,7 +1227,7 @@
             </a:ln>
             <a:extLst>
               <a:ext uri="{91240B29-F687-4f45-9708-019B960494DF}">
-                <a14:hiddenLine xmlns:a14="http://schemas.microsoft.com/office/drawing/2010/main" xmlns="" w="9525">
+                <a14:hiddenLine xmlns="" xmlns:a14="http://schemas.microsoft.com/office/drawing/2010/main" w="9525">
                   <a:solidFill>
                     <a:srgbClr val="000000"/>
                   </a:solidFill>
@@ -1289,7 +1289,7 @@
             </a:ln>
             <a:extLst>
               <a:ext uri="{91240B29-F687-4f45-9708-019B960494DF}">
-                <a14:hiddenLine xmlns:a14="http://schemas.microsoft.com/office/drawing/2010/main" xmlns="" w="9525">
+                <a14:hiddenLine xmlns="" xmlns:a14="http://schemas.microsoft.com/office/drawing/2010/main" w="9525">
                   <a:solidFill>
                     <a:srgbClr val="000000"/>
                   </a:solidFill>
@@ -1379,7 +1379,7 @@
             </a:ln>
             <a:extLst>
               <a:ext uri="{91240B29-F687-4f45-9708-019B960494DF}">
-                <a14:hiddenLine xmlns:a14="http://schemas.microsoft.com/office/drawing/2010/main" xmlns="" w="9525">
+                <a14:hiddenLine xmlns="" xmlns:a14="http://schemas.microsoft.com/office/drawing/2010/main" w="9525">
                   <a:solidFill>
                     <a:srgbClr val="000000"/>
                   </a:solidFill>
@@ -1469,7 +1469,7 @@
             </a:ln>
             <a:extLst>
               <a:ext uri="{91240B29-F687-4f45-9708-019B960494DF}">
-                <a14:hiddenLine xmlns:a14="http://schemas.microsoft.com/office/drawing/2010/main" xmlns="" w="9525">
+                <a14:hiddenLine xmlns="" xmlns:a14="http://schemas.microsoft.com/office/drawing/2010/main" w="9525">
                   <a:solidFill>
                     <a:srgbClr val="000000"/>
                   </a:solidFill>
@@ -1531,7 +1531,7 @@
             </a:ln>
             <a:extLst>
               <a:ext uri="{91240B29-F687-4f45-9708-019B960494DF}">
-                <a14:hiddenLine xmlns:a14="http://schemas.microsoft.com/office/drawing/2010/main" xmlns="" w="9525">
+                <a14:hiddenLine xmlns="" xmlns:a14="http://schemas.microsoft.com/office/drawing/2010/main" w="9525">
                   <a:solidFill>
                     <a:srgbClr val="000000"/>
                   </a:solidFill>
@@ -1621,7 +1621,7 @@
             </a:ln>
             <a:extLst>
               <a:ext uri="{91240B29-F687-4f45-9708-019B960494DF}">
-                <a14:hiddenLine xmlns:a14="http://schemas.microsoft.com/office/drawing/2010/main" xmlns="" w="9525">
+                <a14:hiddenLine xmlns="" xmlns:a14="http://schemas.microsoft.com/office/drawing/2010/main" w="9525">
                   <a:solidFill>
                     <a:srgbClr val="000000"/>
                   </a:solidFill>
@@ -1711,7 +1711,7 @@
             </a:ln>
             <a:extLst>
               <a:ext uri="{91240B29-F687-4f45-9708-019B960494DF}">
-                <a14:hiddenLine xmlns:a14="http://schemas.microsoft.com/office/drawing/2010/main" xmlns="" w="9525">
+                <a14:hiddenLine xmlns="" xmlns:a14="http://schemas.microsoft.com/office/drawing/2010/main" w="9525">
                   <a:solidFill>
                     <a:srgbClr val="000000"/>
                   </a:solidFill>
@@ -1767,7 +1767,7 @@
             </a:ln>
             <a:extLst>
               <a:ext uri="{91240B29-F687-4f45-9708-019B960494DF}">
-                <a14:hiddenLine xmlns:a14="http://schemas.microsoft.com/office/drawing/2010/main" xmlns="" w="9525">
+                <a14:hiddenLine xmlns="" xmlns:a14="http://schemas.microsoft.com/office/drawing/2010/main" w="9525">
                   <a:solidFill>
                     <a:srgbClr val="000000"/>
                   </a:solidFill>
@@ -1857,7 +1857,7 @@
             </a:ln>
             <a:extLst>
               <a:ext uri="{91240B29-F687-4f45-9708-019B960494DF}">
-                <a14:hiddenLine xmlns:a14="http://schemas.microsoft.com/office/drawing/2010/main" xmlns="" w="9525">
+                <a14:hiddenLine xmlns="" xmlns:a14="http://schemas.microsoft.com/office/drawing/2010/main" w="9525">
                   <a:solidFill>
                     <a:srgbClr val="000000"/>
                   </a:solidFill>
@@ -1913,7 +1913,7 @@
             </a:ln>
             <a:extLst>
               <a:ext uri="{91240B29-F687-4f45-9708-019B960494DF}">
-                <a14:hiddenLine xmlns:a14="http://schemas.microsoft.com/office/drawing/2010/main" xmlns="" w="9525">
+                <a14:hiddenLine xmlns="" xmlns:a14="http://schemas.microsoft.com/office/drawing/2010/main" w="9525">
                   <a:solidFill>
                     <a:srgbClr val="000000"/>
                   </a:solidFill>
@@ -2003,7 +2003,7 @@
             </a:ln>
             <a:extLst>
               <a:ext uri="{91240B29-F687-4f45-9708-019B960494DF}">
-                <a14:hiddenLine xmlns:a14="http://schemas.microsoft.com/office/drawing/2010/main" xmlns="" w="9525">
+                <a14:hiddenLine xmlns="" xmlns:a14="http://schemas.microsoft.com/office/drawing/2010/main" w="9525">
                   <a:solidFill>
                     <a:srgbClr val="000000"/>
                   </a:solidFill>
@@ -2071,7 +2071,7 @@
             </a:ln>
             <a:extLst>
               <a:ext uri="{91240B29-F687-4f45-9708-019B960494DF}">
-                <a14:hiddenLine xmlns:a14="http://schemas.microsoft.com/office/drawing/2010/main" xmlns="" w="9525">
+                <a14:hiddenLine xmlns="" xmlns:a14="http://schemas.microsoft.com/office/drawing/2010/main" w="9525">
                   <a:solidFill>
                     <a:srgbClr val="000000"/>
                   </a:solidFill>
@@ -2161,7 +2161,7 @@
             </a:ln>
             <a:extLst>
               <a:ext uri="{91240B29-F687-4f45-9708-019B960494DF}">
-                <a14:hiddenLine xmlns:a14="http://schemas.microsoft.com/office/drawing/2010/main" xmlns="" w="9525">
+                <a14:hiddenLine xmlns="" xmlns:a14="http://schemas.microsoft.com/office/drawing/2010/main" w="9525">
                   <a:solidFill>
                     <a:srgbClr val="000000"/>
                   </a:solidFill>
@@ -2229,7 +2229,7 @@
             </a:ln>
             <a:extLst>
               <a:ext uri="{91240B29-F687-4f45-9708-019B960494DF}">
-                <a14:hiddenLine xmlns:a14="http://schemas.microsoft.com/office/drawing/2010/main" xmlns="" w="9525">
+                <a14:hiddenLine xmlns="" xmlns:a14="http://schemas.microsoft.com/office/drawing/2010/main" w="9525">
                   <a:solidFill>
                     <a:srgbClr val="000000"/>
                   </a:solidFill>
@@ -2319,7 +2319,7 @@
             </a:ln>
             <a:extLst>
               <a:ext uri="{91240B29-F687-4f45-9708-019B960494DF}">
-                <a14:hiddenLine xmlns:a14="http://schemas.microsoft.com/office/drawing/2010/main" xmlns="" w="9525">
+                <a14:hiddenLine xmlns="" xmlns:a14="http://schemas.microsoft.com/office/drawing/2010/main" w="9525">
                   <a:solidFill>
                     <a:srgbClr val="000000"/>
                   </a:solidFill>
@@ -2353,7 +2353,7 @@
             </a:ln>
             <a:extLst>
               <a:ext uri="{91240B29-F687-4f45-9708-019B960494DF}">
-                <a14:hiddenLine xmlns:a14="http://schemas.microsoft.com/office/drawing/2010/main" xmlns="" w="9525">
+                <a14:hiddenLine xmlns="" xmlns:a14="http://schemas.microsoft.com/office/drawing/2010/main" w="9525">
                   <a:solidFill>
                     <a:srgbClr val="000000"/>
                   </a:solidFill>
@@ -2443,7 +2443,7 @@
             </a:ln>
             <a:extLst>
               <a:ext uri="{91240B29-F687-4f45-9708-019B960494DF}">
-                <a14:hiddenLine xmlns:a14="http://schemas.microsoft.com/office/drawing/2010/main" xmlns="" w="9525">
+                <a14:hiddenLine xmlns="" xmlns:a14="http://schemas.microsoft.com/office/drawing/2010/main" w="9525">
                   <a:solidFill>
                     <a:srgbClr val="000000"/>
                   </a:solidFill>
@@ -2505,7 +2505,7 @@
             </a:ln>
             <a:extLst>
               <a:ext uri="{91240B29-F687-4f45-9708-019B960494DF}">
-                <a14:hiddenLine xmlns:a14="http://schemas.microsoft.com/office/drawing/2010/main" xmlns="" w="9525">
+                <a14:hiddenLine xmlns="" xmlns:a14="http://schemas.microsoft.com/office/drawing/2010/main" w="9525">
                   <a:solidFill>
                     <a:srgbClr val="000000"/>
                   </a:solidFill>
@@ -2567,7 +2567,7 @@
             </a:ln>
             <a:extLst>
               <a:ext uri="{91240B29-F687-4f45-9708-019B960494DF}">
-                <a14:hiddenLine xmlns:a14="http://schemas.microsoft.com/office/drawing/2010/main" xmlns="" w="9525">
+                <a14:hiddenLine xmlns="" xmlns:a14="http://schemas.microsoft.com/office/drawing/2010/main" w="9525">
                   <a:solidFill>
                     <a:srgbClr val="000000"/>
                   </a:solidFill>
@@ -2657,7 +2657,7 @@
             </a:ln>
             <a:extLst>
               <a:ext uri="{91240B29-F687-4f45-9708-019B960494DF}">
-                <a14:hiddenLine xmlns:a14="http://schemas.microsoft.com/office/drawing/2010/main" xmlns="" w="9525">
+                <a14:hiddenLine xmlns="" xmlns:a14="http://schemas.microsoft.com/office/drawing/2010/main" w="9525">
                   <a:solidFill>
                     <a:srgbClr val="000000"/>
                   </a:solidFill>
@@ -2725,7 +2725,7 @@
             </a:ln>
             <a:extLst>
               <a:ext uri="{91240B29-F687-4f45-9708-019B960494DF}">
-                <a14:hiddenLine xmlns:a14="http://schemas.microsoft.com/office/drawing/2010/main" xmlns="" w="9525">
+                <a14:hiddenLine xmlns="" xmlns:a14="http://schemas.microsoft.com/office/drawing/2010/main" w="9525">
                   <a:solidFill>
                     <a:srgbClr val="000000"/>
                   </a:solidFill>
@@ -2787,7 +2787,7 @@
             </a:ln>
             <a:extLst>
               <a:ext uri="{91240B29-F687-4f45-9708-019B960494DF}">
-                <a14:hiddenLine xmlns:a14="http://schemas.microsoft.com/office/drawing/2010/main" xmlns="" w="9525">
+                <a14:hiddenLine xmlns="" xmlns:a14="http://schemas.microsoft.com/office/drawing/2010/main" w="9525">
                   <a:solidFill>
                     <a:srgbClr val="000000"/>
                   </a:solidFill>
@@ -2877,7 +2877,7 @@
             </a:ln>
             <a:extLst>
               <a:ext uri="{91240B29-F687-4f45-9708-019B960494DF}">
-                <a14:hiddenLine xmlns:a14="http://schemas.microsoft.com/office/drawing/2010/main" xmlns="" w="9525">
+                <a14:hiddenLine xmlns="" xmlns:a14="http://schemas.microsoft.com/office/drawing/2010/main" w="9525">
                   <a:solidFill>
                     <a:srgbClr val="000000"/>
                   </a:solidFill>
@@ -2939,7 +2939,7 @@
             </a:ln>
             <a:extLst>
               <a:ext uri="{91240B29-F687-4f45-9708-019B960494DF}">
-                <a14:hiddenLine xmlns:a14="http://schemas.microsoft.com/office/drawing/2010/main" xmlns="" w="9525">
+                <a14:hiddenLine xmlns="" xmlns:a14="http://schemas.microsoft.com/office/drawing/2010/main" w="9525">
                   <a:solidFill>
                     <a:srgbClr val="000000"/>
                   </a:solidFill>
@@ -3029,7 +3029,7 @@
             </a:ln>
             <a:extLst>
               <a:ext uri="{91240B29-F687-4f45-9708-019B960494DF}">
-                <a14:hiddenLine xmlns:a14="http://schemas.microsoft.com/office/drawing/2010/main" xmlns="" w="9525">
+                <a14:hiddenLine xmlns="" xmlns:a14="http://schemas.microsoft.com/office/drawing/2010/main" w="9525">
                   <a:solidFill>
                     <a:srgbClr val="000000"/>
                   </a:solidFill>
@@ -3091,7 +3091,7 @@
             </a:ln>
             <a:extLst>
               <a:ext uri="{91240B29-F687-4f45-9708-019B960494DF}">
-                <a14:hiddenLine xmlns:a14="http://schemas.microsoft.com/office/drawing/2010/main" xmlns="" w="9525">
+                <a14:hiddenLine xmlns="" xmlns:a14="http://schemas.microsoft.com/office/drawing/2010/main" w="9525">
                   <a:solidFill>
                     <a:srgbClr val="000000"/>
                   </a:solidFill>
@@ -3181,7 +3181,7 @@
             </a:ln>
             <a:extLst>
               <a:ext uri="{91240B29-F687-4f45-9708-019B960494DF}">
-                <a14:hiddenLine xmlns:a14="http://schemas.microsoft.com/office/drawing/2010/main" xmlns="" w="9525">
+                <a14:hiddenLine xmlns="" xmlns:a14="http://schemas.microsoft.com/office/drawing/2010/main" w="9525">
                   <a:solidFill>
                     <a:srgbClr val="000000"/>
                   </a:solidFill>
@@ -3215,7 +3215,7 @@
             </a:ln>
             <a:extLst>
               <a:ext uri="{91240B29-F687-4f45-9708-019B960494DF}">
-                <a14:hiddenLine xmlns:a14="http://schemas.microsoft.com/office/drawing/2010/main" xmlns="" w="9525">
+                <a14:hiddenLine xmlns="" xmlns:a14="http://schemas.microsoft.com/office/drawing/2010/main" w="9525">
                   <a:solidFill>
                     <a:srgbClr val="000000"/>
                   </a:solidFill>
@@ -3280,7 +3280,7 @@
             </a:ln>
             <a:extLst>
               <a:ext uri="{91240B29-F687-4f45-9708-019B960494DF}">
-                <a14:hiddenLine xmlns:a14="http://schemas.microsoft.com/office/drawing/2010/main" xmlns="" w="9525">
+                <a14:hiddenLine xmlns="" xmlns:a14="http://schemas.microsoft.com/office/drawing/2010/main" w="9525">
                   <a:solidFill>
                     <a:srgbClr val="000000"/>
                   </a:solidFill>
@@ -3370,7 +3370,7 @@
             </a:ln>
             <a:extLst>
               <a:ext uri="{91240B29-F687-4f45-9708-019B960494DF}">
-                <a14:hiddenLine xmlns:a14="http://schemas.microsoft.com/office/drawing/2010/main" xmlns="" w="9525">
+                <a14:hiddenLine xmlns="" xmlns:a14="http://schemas.microsoft.com/office/drawing/2010/main" w="9525">
                   <a:solidFill>
                     <a:srgbClr val="000000"/>
                   </a:solidFill>
@@ -3432,7 +3432,7 @@
             </a:ln>
             <a:extLst>
               <a:ext uri="{91240B29-F687-4f45-9708-019B960494DF}">
-                <a14:hiddenLine xmlns:a14="http://schemas.microsoft.com/office/drawing/2010/main" xmlns="" w="9525">
+                <a14:hiddenLine xmlns="" xmlns:a14="http://schemas.microsoft.com/office/drawing/2010/main" w="9525">
                   <a:solidFill>
                     <a:srgbClr val="000000"/>
                   </a:solidFill>
@@ -3522,7 +3522,7 @@
             </a:ln>
             <a:extLst>
               <a:ext uri="{91240B29-F687-4f45-9708-019B960494DF}">
-                <a14:hiddenLine xmlns:a14="http://schemas.microsoft.com/office/drawing/2010/main" xmlns="" w="9525">
+                <a14:hiddenLine xmlns="" xmlns:a14="http://schemas.microsoft.com/office/drawing/2010/main" w="9525">
                   <a:solidFill>
                     <a:srgbClr val="000000"/>
                   </a:solidFill>
@@ -3612,7 +3612,7 @@
             </a:ln>
             <a:extLst>
               <a:ext uri="{91240B29-F687-4f45-9708-019B960494DF}">
-                <a14:hiddenLine xmlns:a14="http://schemas.microsoft.com/office/drawing/2010/main" xmlns="" w="9525">
+                <a14:hiddenLine xmlns="" xmlns:a14="http://schemas.microsoft.com/office/drawing/2010/main" w="9525">
                   <a:solidFill>
                     <a:srgbClr val="000000"/>
                   </a:solidFill>
@@ -3677,7 +3677,7 @@
             </a:ln>
             <a:extLst>
               <a:ext uri="{91240B29-F687-4f45-9708-019B960494DF}">
-                <a14:hiddenLine xmlns:a14="http://schemas.microsoft.com/office/drawing/2010/main" xmlns="" w="9525">
+                <a14:hiddenLine xmlns="" xmlns:a14="http://schemas.microsoft.com/office/drawing/2010/main" w="9525">
                   <a:solidFill>
                     <a:srgbClr val="000000"/>
                   </a:solidFill>
@@ -3739,7 +3739,7 @@
             </a:ln>
             <a:extLst>
               <a:ext uri="{91240B29-F687-4f45-9708-019B960494DF}">
-                <a14:hiddenLine xmlns:a14="http://schemas.microsoft.com/office/drawing/2010/main" xmlns="" w="9525">
+                <a14:hiddenLine xmlns="" xmlns:a14="http://schemas.microsoft.com/office/drawing/2010/main" w="9525">
                   <a:solidFill>
                     <a:srgbClr val="000000"/>
                   </a:solidFill>
@@ -3829,7 +3829,7 @@
             </a:ln>
             <a:extLst>
               <a:ext uri="{91240B29-F687-4f45-9708-019B960494DF}">
-                <a14:hiddenLine xmlns:a14="http://schemas.microsoft.com/office/drawing/2010/main" xmlns="" w="9525">
+                <a14:hiddenLine xmlns="" xmlns:a14="http://schemas.microsoft.com/office/drawing/2010/main" w="9525">
                   <a:solidFill>
                     <a:srgbClr val="000000"/>
                   </a:solidFill>
@@ -3919,7 +3919,7 @@
             </a:ln>
             <a:extLst>
               <a:ext uri="{91240B29-F687-4f45-9708-019B960494DF}">
-                <a14:hiddenLine xmlns:a14="http://schemas.microsoft.com/office/drawing/2010/main" xmlns="" w="9525">
+                <a14:hiddenLine xmlns="" xmlns:a14="http://schemas.microsoft.com/office/drawing/2010/main" w="9525">
                   <a:solidFill>
                     <a:srgbClr val="000000"/>
                   </a:solidFill>
@@ -3981,7 +3981,7 @@
             </a:ln>
             <a:extLst>
               <a:ext uri="{91240B29-F687-4f45-9708-019B960494DF}">
-                <a14:hiddenLine xmlns:a14="http://schemas.microsoft.com/office/drawing/2010/main" xmlns="" w="9525">
+                <a14:hiddenLine xmlns="" xmlns:a14="http://schemas.microsoft.com/office/drawing/2010/main" w="9525">
                   <a:solidFill>
                     <a:srgbClr val="000000"/>
                   </a:solidFill>
@@ -4101,7 +4101,7 @@
             </a:ln>
             <a:extLst>
               <a:ext uri="{91240B29-F687-4f45-9708-019B960494DF}">
-                <a14:hiddenLine xmlns:a14="http://schemas.microsoft.com/office/drawing/2010/main" xmlns="" w="9525">
+                <a14:hiddenLine xmlns="" xmlns:a14="http://schemas.microsoft.com/office/drawing/2010/main" w="9525">
                   <a:solidFill>
                     <a:srgbClr val="000000"/>
                   </a:solidFill>
@@ -4169,7 +4169,7 @@
             </a:ln>
             <a:extLst>
               <a:ext uri="{91240B29-F687-4f45-9708-019B960494DF}">
-                <a14:hiddenLine xmlns:a14="http://schemas.microsoft.com/office/drawing/2010/main" xmlns="" w="9525">
+                <a14:hiddenLine xmlns="" xmlns:a14="http://schemas.microsoft.com/office/drawing/2010/main" w="9525">
                   <a:solidFill>
                     <a:srgbClr val="000000"/>
                   </a:solidFill>
@@ -4259,7 +4259,7 @@
             </a:ln>
             <a:extLst>
               <a:ext uri="{91240B29-F687-4f45-9708-019B960494DF}">
-                <a14:hiddenLine xmlns:a14="http://schemas.microsoft.com/office/drawing/2010/main" xmlns="" w="9525">
+                <a14:hiddenLine xmlns="" xmlns:a14="http://schemas.microsoft.com/office/drawing/2010/main" w="9525">
                   <a:solidFill>
                     <a:srgbClr val="000000"/>
                   </a:solidFill>
@@ -4399,7 +4399,7 @@
           <a:p>
             <a:fld id="{48A87A34-81AB-432B-8DAE-1953F412C126}" type="datetimeFigureOut">
               <a:rPr lang="en-US" dirty="0"/>
-              <a:t>7/26/18</a:t>
+              <a:t>7/26/2018</a:t>
             </a:fld>
             <a:endParaRPr lang="en-US" dirty="0"/>
           </a:p>
@@ -4661,7 +4661,7 @@
           <a:p>
             <a:fld id="{48A87A34-81AB-432B-8DAE-1953F412C126}" type="datetimeFigureOut">
               <a:rPr lang="en-US" dirty="0"/>
-              <a:t>7/26/18</a:t>
+              <a:t>7/26/2018</a:t>
             </a:fld>
             <a:endParaRPr lang="en-US" dirty="0"/>
           </a:p>
@@ -4852,7 +4852,7 @@
           <a:p>
             <a:fld id="{48A87A34-81AB-432B-8DAE-1953F412C126}" type="datetimeFigureOut">
               <a:rPr lang="en-US" dirty="0"/>
-              <a:t>7/26/18</a:t>
+              <a:t>7/26/2018</a:t>
             </a:fld>
             <a:endParaRPr lang="en-US" dirty="0"/>
           </a:p>
@@ -5110,7 +5110,7 @@
           <a:p>
             <a:fld id="{48A87A34-81AB-432B-8DAE-1953F412C126}" type="datetimeFigureOut">
               <a:rPr lang="en-US" dirty="0"/>
-              <a:t>7/26/18</a:t>
+              <a:t>7/26/2018</a:t>
             </a:fld>
             <a:endParaRPr lang="en-US" dirty="0"/>
           </a:p>
@@ -5539,7 +5539,7 @@
           <a:p>
             <a:fld id="{48A87A34-81AB-432B-8DAE-1953F412C126}" type="datetimeFigureOut">
               <a:rPr lang="en-US" dirty="0"/>
-              <a:t>7/26/18</a:t>
+              <a:t>7/26/2018</a:t>
             </a:fld>
             <a:endParaRPr lang="en-US" dirty="0"/>
           </a:p>
@@ -6080,7 +6080,7 @@
           <a:p>
             <a:fld id="{48A87A34-81AB-432B-8DAE-1953F412C126}" type="datetimeFigureOut">
               <a:rPr lang="en-US" dirty="0"/>
-              <a:t>7/26/18</a:t>
+              <a:t>7/26/2018</a:t>
             </a:fld>
             <a:endParaRPr lang="en-US" dirty="0"/>
           </a:p>
@@ -6795,7 +6795,7 @@
           <a:p>
             <a:fld id="{48A87A34-81AB-432B-8DAE-1953F412C126}" type="datetimeFigureOut">
               <a:rPr lang="en-US" dirty="0"/>
-              <a:t>7/26/18</a:t>
+              <a:t>7/26/2018</a:t>
             </a:fld>
             <a:endParaRPr lang="en-US" dirty="0"/>
           </a:p>
@@ -6960,7 +6960,7 @@
           <a:p>
             <a:fld id="{48A87A34-81AB-432B-8DAE-1953F412C126}" type="datetimeFigureOut">
               <a:rPr lang="en-US" dirty="0"/>
-              <a:t>7/26/18</a:t>
+              <a:t>7/26/2018</a:t>
             </a:fld>
             <a:endParaRPr lang="en-US" dirty="0"/>
           </a:p>
@@ -7135,7 +7135,7 @@
           <a:p>
             <a:fld id="{48A87A34-81AB-432B-8DAE-1953F412C126}" type="datetimeFigureOut">
               <a:rPr lang="en-US" dirty="0"/>
-              <a:t>7/26/18</a:t>
+              <a:t>7/26/2018</a:t>
             </a:fld>
             <a:endParaRPr lang="en-US" dirty="0"/>
           </a:p>
@@ -7300,7 +7300,7 @@
           <a:p>
             <a:fld id="{48A87A34-81AB-432B-8DAE-1953F412C126}" type="datetimeFigureOut">
               <a:rPr lang="en-US" dirty="0"/>
-              <a:t>7/26/18</a:t>
+              <a:t>7/26/2018</a:t>
             </a:fld>
             <a:endParaRPr lang="en-US" dirty="0"/>
           </a:p>
@@ -7545,7 +7545,7 @@
           <a:p>
             <a:fld id="{48A87A34-81AB-432B-8DAE-1953F412C126}" type="datetimeFigureOut">
               <a:rPr lang="en-US" dirty="0"/>
-              <a:t>7/26/18</a:t>
+              <a:t>7/26/2018</a:t>
             </a:fld>
             <a:endParaRPr lang="en-US" dirty="0"/>
           </a:p>
@@ -7772,7 +7772,7 @@
           <a:p>
             <a:fld id="{48A87A34-81AB-432B-8DAE-1953F412C126}" type="datetimeFigureOut">
               <a:rPr lang="en-US" dirty="0"/>
-              <a:t>7/26/18</a:t>
+              <a:t>7/26/2018</a:t>
             </a:fld>
             <a:endParaRPr lang="en-US" dirty="0"/>
           </a:p>
@@ -8148,7 +8148,7 @@
           <a:p>
             <a:fld id="{48A87A34-81AB-432B-8DAE-1953F412C126}" type="datetimeFigureOut">
               <a:rPr lang="en-US" dirty="0"/>
-              <a:t>7/26/18</a:t>
+              <a:t>7/26/2018</a:t>
             </a:fld>
             <a:endParaRPr lang="en-US" dirty="0"/>
           </a:p>
@@ -8261,7 +8261,7 @@
           <a:p>
             <a:fld id="{48A87A34-81AB-432B-8DAE-1953F412C126}" type="datetimeFigureOut">
               <a:rPr lang="en-US" dirty="0"/>
-              <a:t>7/26/18</a:t>
+              <a:t>7/26/2018</a:t>
             </a:fld>
             <a:endParaRPr lang="en-US" dirty="0"/>
           </a:p>
@@ -8351,7 +8351,7 @@
           <a:p>
             <a:fld id="{48A87A34-81AB-432B-8DAE-1953F412C126}" type="datetimeFigureOut">
               <a:rPr lang="en-US" dirty="0"/>
-              <a:t>7/26/18</a:t>
+              <a:t>7/26/2018</a:t>
             </a:fld>
             <a:endParaRPr lang="en-US" dirty="0"/>
           </a:p>
@@ -8595,7 +8595,7 @@
           <a:p>
             <a:fld id="{48A87A34-81AB-432B-8DAE-1953F412C126}" type="datetimeFigureOut">
               <a:rPr lang="en-US" dirty="0"/>
-              <a:t>7/26/18</a:t>
+              <a:t>7/26/2018</a:t>
             </a:fld>
             <a:endParaRPr lang="en-US" dirty="0"/>
           </a:p>
@@ -8870,7 +8870,7 @@
           <a:p>
             <a:fld id="{48A87A34-81AB-432B-8DAE-1953F412C126}" type="datetimeFigureOut">
               <a:rPr lang="en-US" dirty="0"/>
-              <a:t>7/26/18</a:t>
+              <a:t>7/26/2018</a:t>
             </a:fld>
             <a:endParaRPr lang="en-US" dirty="0"/>
           </a:p>
@@ -8981,7 +8981,7 @@
           <a:noFill/>
           <a:extLst>
             <a:ext uri="{909E8E84-426E-40dd-AFC4-6F175D3DCCD1}">
-              <a14:hiddenFill xmlns:a14="http://schemas.microsoft.com/office/drawing/2010/main" xmlns="">
+              <a14:hiddenFill xmlns="" xmlns:a14="http://schemas.microsoft.com/office/drawing/2010/main">
                 <a:solidFill>
                   <a:srgbClr val="FFFFFF"/>
                 </a:solidFill>
@@ -9055,7 +9055,7 @@
               </a:ln>
               <a:extLst>
                 <a:ext uri="{91240B29-F687-4f45-9708-019B960494DF}">
-                  <a14:hiddenLine xmlns:a14="http://schemas.microsoft.com/office/drawing/2010/main" xmlns="" w="9525">
+                  <a14:hiddenLine xmlns="" xmlns:a14="http://schemas.microsoft.com/office/drawing/2010/main" w="9525">
                     <a:solidFill>
                       <a:srgbClr val="000000"/>
                     </a:solidFill>
@@ -9145,7 +9145,7 @@
               </a:ln>
               <a:extLst>
                 <a:ext uri="{91240B29-F687-4f45-9708-019B960494DF}">
-                  <a14:hiddenLine xmlns:a14="http://schemas.microsoft.com/office/drawing/2010/main" xmlns="" w="9525">
+                  <a14:hiddenLine xmlns="" xmlns:a14="http://schemas.microsoft.com/office/drawing/2010/main" w="9525">
                     <a:solidFill>
                       <a:srgbClr val="000000"/>
                     </a:solidFill>
@@ -9235,7 +9235,7 @@
               </a:ln>
               <a:extLst>
                 <a:ext uri="{91240B29-F687-4f45-9708-019B960494DF}">
-                  <a14:hiddenLine xmlns:a14="http://schemas.microsoft.com/office/drawing/2010/main" xmlns="" w="9525">
+                  <a14:hiddenLine xmlns="" xmlns:a14="http://schemas.microsoft.com/office/drawing/2010/main" w="9525">
                     <a:solidFill>
                       <a:srgbClr val="000000"/>
                     </a:solidFill>
@@ -9297,7 +9297,7 @@
               </a:ln>
               <a:extLst>
                 <a:ext uri="{91240B29-F687-4f45-9708-019B960494DF}">
-                  <a14:hiddenLine xmlns:a14="http://schemas.microsoft.com/office/drawing/2010/main" xmlns="" w="9525">
+                  <a14:hiddenLine xmlns="" xmlns:a14="http://schemas.microsoft.com/office/drawing/2010/main" w="9525">
                     <a:solidFill>
                       <a:srgbClr val="000000"/>
                     </a:solidFill>
@@ -9387,7 +9387,7 @@
               </a:ln>
               <a:extLst>
                 <a:ext uri="{91240B29-F687-4f45-9708-019B960494DF}">
-                  <a14:hiddenLine xmlns:a14="http://schemas.microsoft.com/office/drawing/2010/main" xmlns="" w="9525">
+                  <a14:hiddenLine xmlns="" xmlns:a14="http://schemas.microsoft.com/office/drawing/2010/main" w="9525">
                     <a:solidFill>
                       <a:srgbClr val="000000"/>
                     </a:solidFill>
@@ -9449,7 +9449,7 @@
               </a:ln>
               <a:extLst>
                 <a:ext uri="{91240B29-F687-4f45-9708-019B960494DF}">
-                  <a14:hiddenLine xmlns:a14="http://schemas.microsoft.com/office/drawing/2010/main" xmlns="" w="9525">
+                  <a14:hiddenLine xmlns="" xmlns:a14="http://schemas.microsoft.com/office/drawing/2010/main" w="9525">
                     <a:solidFill>
                       <a:srgbClr val="000000"/>
                     </a:solidFill>
@@ -9511,7 +9511,7 @@
               </a:ln>
               <a:extLst>
                 <a:ext uri="{91240B29-F687-4f45-9708-019B960494DF}">
-                  <a14:hiddenLine xmlns:a14="http://schemas.microsoft.com/office/drawing/2010/main" xmlns="" w="9525">
+                  <a14:hiddenLine xmlns="" xmlns:a14="http://schemas.microsoft.com/office/drawing/2010/main" w="9525">
                     <a:solidFill>
                       <a:srgbClr val="000000"/>
                     </a:solidFill>
@@ -9601,7 +9601,7 @@
               </a:ln>
               <a:extLst>
                 <a:ext uri="{91240B29-F687-4f45-9708-019B960494DF}">
-                  <a14:hiddenLine xmlns:a14="http://schemas.microsoft.com/office/drawing/2010/main" xmlns="" w="9525">
+                  <a14:hiddenLine xmlns="" xmlns:a14="http://schemas.microsoft.com/office/drawing/2010/main" w="9525">
                     <a:solidFill>
                       <a:srgbClr val="000000"/>
                     </a:solidFill>
@@ -9691,7 +9691,7 @@
               </a:ln>
               <a:extLst>
                 <a:ext uri="{91240B29-F687-4f45-9708-019B960494DF}">
-                  <a14:hiddenLine xmlns:a14="http://schemas.microsoft.com/office/drawing/2010/main" xmlns="" w="9525">
+                  <a14:hiddenLine xmlns="" xmlns:a14="http://schemas.microsoft.com/office/drawing/2010/main" w="9525">
                     <a:solidFill>
                       <a:srgbClr val="000000"/>
                     </a:solidFill>
@@ -9753,7 +9753,7 @@
               </a:ln>
               <a:extLst>
                 <a:ext uri="{91240B29-F687-4f45-9708-019B960494DF}">
-                  <a14:hiddenLine xmlns:a14="http://schemas.microsoft.com/office/drawing/2010/main" xmlns="" w="9525">
+                  <a14:hiddenLine xmlns="" xmlns:a14="http://schemas.microsoft.com/office/drawing/2010/main" w="9525">
                     <a:solidFill>
                       <a:srgbClr val="000000"/>
                     </a:solidFill>
@@ -9863,7 +9863,7 @@
               </a:ln>
               <a:extLst>
                 <a:ext uri="{91240B29-F687-4f45-9708-019B960494DF}">
-                  <a14:hiddenLine xmlns:a14="http://schemas.microsoft.com/office/drawing/2010/main" xmlns="" w="9525">
+                  <a14:hiddenLine xmlns="" xmlns:a14="http://schemas.microsoft.com/office/drawing/2010/main" w="9525">
                     <a:solidFill>
                       <a:srgbClr val="000000"/>
                     </a:solidFill>
@@ -9947,7 +9947,7 @@
               </a:ln>
               <a:extLst>
                 <a:ext uri="{91240B29-F687-4f45-9708-019B960494DF}">
-                  <a14:hiddenLine xmlns:a14="http://schemas.microsoft.com/office/drawing/2010/main" xmlns="" w="9525">
+                  <a14:hiddenLine xmlns="" xmlns:a14="http://schemas.microsoft.com/office/drawing/2010/main" w="9525">
                     <a:solidFill>
                       <a:srgbClr val="000000"/>
                     </a:solidFill>
@@ -10009,7 +10009,7 @@
               </a:ln>
               <a:extLst>
                 <a:ext uri="{91240B29-F687-4f45-9708-019B960494DF}">
-                  <a14:hiddenLine xmlns:a14="http://schemas.microsoft.com/office/drawing/2010/main" xmlns="" w="9525">
+                  <a14:hiddenLine xmlns="" xmlns:a14="http://schemas.microsoft.com/office/drawing/2010/main" w="9525">
                     <a:solidFill>
                       <a:srgbClr val="000000"/>
                     </a:solidFill>
@@ -10071,7 +10071,7 @@
               </a:ln>
               <a:extLst>
                 <a:ext uri="{91240B29-F687-4f45-9708-019B960494DF}">
-                  <a14:hiddenLine xmlns:a14="http://schemas.microsoft.com/office/drawing/2010/main" xmlns="" w="9525">
+                  <a14:hiddenLine xmlns="" xmlns:a14="http://schemas.microsoft.com/office/drawing/2010/main" w="9525">
                     <a:solidFill>
                       <a:srgbClr val="000000"/>
                     </a:solidFill>
@@ -10161,7 +10161,7 @@
               </a:ln>
               <a:extLst>
                 <a:ext uri="{91240B29-F687-4f45-9708-019B960494DF}">
-                  <a14:hiddenLine xmlns:a14="http://schemas.microsoft.com/office/drawing/2010/main" xmlns="" w="9525">
+                  <a14:hiddenLine xmlns="" xmlns:a14="http://schemas.microsoft.com/office/drawing/2010/main" w="9525">
                     <a:solidFill>
                       <a:srgbClr val="000000"/>
                     </a:solidFill>
@@ -10195,7 +10195,7 @@
               </a:ln>
               <a:extLst>
                 <a:ext uri="{91240B29-F687-4f45-9708-019B960494DF}">
-                  <a14:hiddenLine xmlns:a14="http://schemas.microsoft.com/office/drawing/2010/main" xmlns="" w="9525">
+                  <a14:hiddenLine xmlns="" xmlns:a14="http://schemas.microsoft.com/office/drawing/2010/main" w="9525">
                     <a:solidFill>
                       <a:srgbClr val="000000"/>
                     </a:solidFill>
@@ -10260,7 +10260,7 @@
               </a:ln>
               <a:extLst>
                 <a:ext uri="{91240B29-F687-4f45-9708-019B960494DF}">
-                  <a14:hiddenLine xmlns:a14="http://schemas.microsoft.com/office/drawing/2010/main" xmlns="" w="9525">
+                  <a14:hiddenLine xmlns="" xmlns:a14="http://schemas.microsoft.com/office/drawing/2010/main" w="9525">
                     <a:solidFill>
                       <a:srgbClr val="000000"/>
                     </a:solidFill>
@@ -10350,7 +10350,7 @@
               </a:ln>
               <a:extLst>
                 <a:ext uri="{91240B29-F687-4f45-9708-019B960494DF}">
-                  <a14:hiddenLine xmlns:a14="http://schemas.microsoft.com/office/drawing/2010/main" xmlns="" w="9525">
+                  <a14:hiddenLine xmlns="" xmlns:a14="http://schemas.microsoft.com/office/drawing/2010/main" w="9525">
                     <a:solidFill>
                       <a:srgbClr val="000000"/>
                     </a:solidFill>
@@ -10412,7 +10412,7 @@
               </a:ln>
               <a:extLst>
                 <a:ext uri="{91240B29-F687-4f45-9708-019B960494DF}">
-                  <a14:hiddenLine xmlns:a14="http://schemas.microsoft.com/office/drawing/2010/main" xmlns="" w="9525">
+                  <a14:hiddenLine xmlns="" xmlns:a14="http://schemas.microsoft.com/office/drawing/2010/main" w="9525">
                     <a:solidFill>
                       <a:srgbClr val="000000"/>
                     </a:solidFill>
@@ -10502,7 +10502,7 @@
               </a:ln>
               <a:extLst>
                 <a:ext uri="{91240B29-F687-4f45-9708-019B960494DF}">
-                  <a14:hiddenLine xmlns:a14="http://schemas.microsoft.com/office/drawing/2010/main" xmlns="" w="9525">
+                  <a14:hiddenLine xmlns="" xmlns:a14="http://schemas.microsoft.com/office/drawing/2010/main" w="9525">
                     <a:solidFill>
                       <a:srgbClr val="000000"/>
                     </a:solidFill>
@@ -10567,7 +10567,7 @@
               </a:ln>
               <a:extLst>
                 <a:ext uri="{91240B29-F687-4f45-9708-019B960494DF}">
-                  <a14:hiddenLine xmlns:a14="http://schemas.microsoft.com/office/drawing/2010/main" xmlns="" w="9525">
+                  <a14:hiddenLine xmlns="" xmlns:a14="http://schemas.microsoft.com/office/drawing/2010/main" w="9525">
                     <a:solidFill>
                       <a:srgbClr val="000000"/>
                     </a:solidFill>
@@ -10629,7 +10629,7 @@
               </a:ln>
               <a:extLst>
                 <a:ext uri="{91240B29-F687-4f45-9708-019B960494DF}">
-                  <a14:hiddenLine xmlns:a14="http://schemas.microsoft.com/office/drawing/2010/main" xmlns="" w="9525">
+                  <a14:hiddenLine xmlns="" xmlns:a14="http://schemas.microsoft.com/office/drawing/2010/main" w="9525">
                     <a:solidFill>
                       <a:srgbClr val="000000"/>
                     </a:solidFill>
@@ -10719,7 +10719,7 @@
               </a:ln>
               <a:extLst>
                 <a:ext uri="{91240B29-F687-4f45-9708-019B960494DF}">
-                  <a14:hiddenLine xmlns:a14="http://schemas.microsoft.com/office/drawing/2010/main" xmlns="" w="9525">
+                  <a14:hiddenLine xmlns="" xmlns:a14="http://schemas.microsoft.com/office/drawing/2010/main" w="9525">
                     <a:solidFill>
                       <a:srgbClr val="000000"/>
                     </a:solidFill>
@@ -10809,7 +10809,7 @@
               </a:ln>
               <a:extLst>
                 <a:ext uri="{91240B29-F687-4f45-9708-019B960494DF}">
-                  <a14:hiddenLine xmlns:a14="http://schemas.microsoft.com/office/drawing/2010/main" xmlns="" w="9525">
+                  <a14:hiddenLine xmlns="" xmlns:a14="http://schemas.microsoft.com/office/drawing/2010/main" w="9525">
                     <a:solidFill>
                       <a:srgbClr val="000000"/>
                     </a:solidFill>
@@ -10874,7 +10874,7 @@
               </a:ln>
               <a:extLst>
                 <a:ext uri="{91240B29-F687-4f45-9708-019B960494DF}">
-                  <a14:hiddenLine xmlns:a14="http://schemas.microsoft.com/office/drawing/2010/main" xmlns="" w="9525">
+                  <a14:hiddenLine xmlns="" xmlns:a14="http://schemas.microsoft.com/office/drawing/2010/main" w="9525">
                     <a:solidFill>
                       <a:srgbClr val="000000"/>
                     </a:solidFill>
@@ -10994,7 +10994,7 @@
               </a:ln>
               <a:extLst>
                 <a:ext uri="{91240B29-F687-4f45-9708-019B960494DF}">
-                  <a14:hiddenLine xmlns:a14="http://schemas.microsoft.com/office/drawing/2010/main" xmlns="" w="9525">
+                  <a14:hiddenLine xmlns="" xmlns:a14="http://schemas.microsoft.com/office/drawing/2010/main" w="9525">
                     <a:solidFill>
                       <a:srgbClr val="000000"/>
                     </a:solidFill>
@@ -11092,7 +11092,7 @@
               </a:ln>
               <a:extLst>
                 <a:ext uri="{91240B29-F687-4f45-9708-019B960494DF}">
-                  <a14:hiddenLine xmlns:a14="http://schemas.microsoft.com/office/drawing/2010/main" xmlns="" w="9525">
+                  <a14:hiddenLine xmlns="" xmlns:a14="http://schemas.microsoft.com/office/drawing/2010/main" w="9525">
                     <a:solidFill>
                       <a:srgbClr val="000000"/>
                     </a:solidFill>
@@ -11207,7 +11207,7 @@
               </a:ln>
               <a:extLst>
                 <a:ext uri="{91240B29-F687-4f45-9708-019B960494DF}">
-                  <a14:hiddenLine xmlns:a14="http://schemas.microsoft.com/office/drawing/2010/main" xmlns="" w="9525">
+                  <a14:hiddenLine xmlns="" xmlns:a14="http://schemas.microsoft.com/office/drawing/2010/main" w="9525">
                     <a:solidFill>
                       <a:srgbClr val="000000"/>
                     </a:solidFill>
@@ -11297,7 +11297,7 @@
               </a:ln>
               <a:extLst>
                 <a:ext uri="{91240B29-F687-4f45-9708-019B960494DF}">
-                  <a14:hiddenLine xmlns:a14="http://schemas.microsoft.com/office/drawing/2010/main" xmlns="" w="9525">
+                  <a14:hiddenLine xmlns="" xmlns:a14="http://schemas.microsoft.com/office/drawing/2010/main" w="9525">
                     <a:solidFill>
                       <a:srgbClr val="000000"/>
                     </a:solidFill>
@@ -11362,7 +11362,7 @@
               </a:ln>
               <a:extLst>
                 <a:ext uri="{91240B29-F687-4f45-9708-019B960494DF}">
-                  <a14:hiddenLine xmlns:a14="http://schemas.microsoft.com/office/drawing/2010/main" xmlns="" w="9525">
+                  <a14:hiddenLine xmlns="" xmlns:a14="http://schemas.microsoft.com/office/drawing/2010/main" w="9525">
                     <a:solidFill>
                       <a:srgbClr val="000000"/>
                     </a:solidFill>
@@ -11452,7 +11452,7 @@
               </a:ln>
               <a:extLst>
                 <a:ext uri="{91240B29-F687-4f45-9708-019B960494DF}">
-                  <a14:hiddenLine xmlns:a14="http://schemas.microsoft.com/office/drawing/2010/main" xmlns="" w="9525">
+                  <a14:hiddenLine xmlns="" xmlns:a14="http://schemas.microsoft.com/office/drawing/2010/main" w="9525">
                     <a:solidFill>
                       <a:srgbClr val="000000"/>
                     </a:solidFill>
@@ -11520,7 +11520,7 @@
               </a:ln>
               <a:extLst>
                 <a:ext uri="{91240B29-F687-4f45-9708-019B960494DF}">
-                  <a14:hiddenLine xmlns:a14="http://schemas.microsoft.com/office/drawing/2010/main" xmlns="" w="9525">
+                  <a14:hiddenLine xmlns="" xmlns:a14="http://schemas.microsoft.com/office/drawing/2010/main" w="9525">
                     <a:solidFill>
                       <a:srgbClr val="000000"/>
                     </a:solidFill>
@@ -11610,7 +11610,7 @@
               </a:ln>
               <a:extLst>
                 <a:ext uri="{91240B29-F687-4f45-9708-019B960494DF}">
-                  <a14:hiddenLine xmlns:a14="http://schemas.microsoft.com/office/drawing/2010/main" xmlns="" w="9525">
+                  <a14:hiddenLine xmlns="" xmlns:a14="http://schemas.microsoft.com/office/drawing/2010/main" w="9525">
                     <a:solidFill>
                       <a:srgbClr val="000000"/>
                     </a:solidFill>
@@ -11678,7 +11678,7 @@
               </a:ln>
               <a:extLst>
                 <a:ext uri="{91240B29-F687-4f45-9708-019B960494DF}">
-                  <a14:hiddenLine xmlns:a14="http://schemas.microsoft.com/office/drawing/2010/main" xmlns="" w="9525">
+                  <a14:hiddenLine xmlns="" xmlns:a14="http://schemas.microsoft.com/office/drawing/2010/main" w="9525">
                     <a:solidFill>
                       <a:srgbClr val="000000"/>
                     </a:solidFill>
@@ -11768,7 +11768,7 @@
               </a:ln>
               <a:extLst>
                 <a:ext uri="{91240B29-F687-4f45-9708-019B960494DF}">
-                  <a14:hiddenLine xmlns:a14="http://schemas.microsoft.com/office/drawing/2010/main" xmlns="" w="9525">
+                  <a14:hiddenLine xmlns="" xmlns:a14="http://schemas.microsoft.com/office/drawing/2010/main" w="9525">
                     <a:solidFill>
                       <a:srgbClr val="000000"/>
                     </a:solidFill>
@@ -11802,7 +11802,7 @@
               </a:ln>
               <a:extLst>
                 <a:ext uri="{91240B29-F687-4f45-9708-019B960494DF}">
-                  <a14:hiddenLine xmlns:a14="http://schemas.microsoft.com/office/drawing/2010/main" xmlns="" w="9525">
+                  <a14:hiddenLine xmlns="" xmlns:a14="http://schemas.microsoft.com/office/drawing/2010/main" w="9525">
                     <a:solidFill>
                       <a:srgbClr val="000000"/>
                     </a:solidFill>
@@ -11943,7 +11943,7 @@
             <a:fld id="{48A87A34-81AB-432B-8DAE-1953F412C126}" type="datetimeFigureOut">
               <a:rPr lang="en-US" dirty="0"/>
               <a:pPr/>
-              <a:t>7/26/18</a:t>
+              <a:t>7/26/2018</a:t>
             </a:fld>
             <a:endParaRPr lang="en-US" dirty="0"/>
           </a:p>
@@ -12364,7 +12364,7 @@
           <p:cNvPr id="2" name="Title 1">
             <a:extLst>
               <a:ext uri="{FF2B5EF4-FFF2-40B4-BE49-F238E27FC236}">
-                <a16:creationId xmlns:a16="http://schemas.microsoft.com/office/drawing/2014/main" xmlns="" id="{53381DB2-DAD7-4088-A485-03322094DCBF}"/>
+                <a16:creationId xmlns:a16="http://schemas.microsoft.com/office/drawing/2014/main" id="{53381DB2-DAD7-4088-A485-03322094DCBF}"/>
               </a:ext>
             </a:extLst>
           </p:cNvPr>
@@ -12399,7 +12399,7 @@
           <p:cNvPr id="3" name="Subtitle 2">
             <a:extLst>
               <a:ext uri="{FF2B5EF4-FFF2-40B4-BE49-F238E27FC236}">
-                <a16:creationId xmlns:a16="http://schemas.microsoft.com/office/drawing/2014/main" xmlns="" id="{4A6F3E2F-48B0-4295-8172-F169D39C02E5}"/>
+                <a16:creationId xmlns:a16="http://schemas.microsoft.com/office/drawing/2014/main" id="{4A6F3E2F-48B0-4295-8172-F169D39C02E5}"/>
               </a:ext>
             </a:extLst>
           </p:cNvPr>
@@ -12550,7 +12550,7 @@
           <p:cNvPr id="2" name="Title 1">
             <a:extLst>
               <a:ext uri="{FF2B5EF4-FFF2-40B4-BE49-F238E27FC236}">
-                <a16:creationId xmlns:a16="http://schemas.microsoft.com/office/drawing/2014/main" xmlns="" id="{271F5404-3E55-40A9-B153-40E7852200CE}"/>
+                <a16:creationId xmlns:a16="http://schemas.microsoft.com/office/drawing/2014/main" id="{271F5404-3E55-40A9-B153-40E7852200CE}"/>
               </a:ext>
             </a:extLst>
           </p:cNvPr>
@@ -12583,7 +12583,7 @@
           <p:cNvPr id="6" name="Content Placeholder 5">
             <a:extLst>
               <a:ext uri="{FF2B5EF4-FFF2-40B4-BE49-F238E27FC236}">
-                <a16:creationId xmlns:a16="http://schemas.microsoft.com/office/drawing/2014/main" xmlns="" id="{79534DFA-F0ED-4EB8-9730-D5C3B65E2031}"/>
+                <a16:creationId xmlns:a16="http://schemas.microsoft.com/office/drawing/2014/main" id="{79534DFA-F0ED-4EB8-9730-D5C3B65E2031}"/>
               </a:ext>
             </a:extLst>
           </p:cNvPr>
@@ -12613,28 +12613,28 @@
                 <a:gridCol w="649355">
                   <a:extLst>
                     <a:ext uri="{9D8B030D-6E8A-4147-A177-3AD203B41FA5}">
-                      <a16:colId xmlns:a16="http://schemas.microsoft.com/office/drawing/2014/main" xmlns="" val="1656889719"/>
+                      <a16:colId xmlns:a16="http://schemas.microsoft.com/office/drawing/2014/main" val="1656889719"/>
                     </a:ext>
                   </a:extLst>
                 </a:gridCol>
                 <a:gridCol w="3657600">
                   <a:extLst>
                     <a:ext uri="{9D8B030D-6E8A-4147-A177-3AD203B41FA5}">
-                      <a16:colId xmlns:a16="http://schemas.microsoft.com/office/drawing/2014/main" xmlns="" val="2613002775"/>
+                      <a16:colId xmlns:a16="http://schemas.microsoft.com/office/drawing/2014/main" val="2613002775"/>
                     </a:ext>
                   </a:extLst>
                 </a:gridCol>
                 <a:gridCol w="1386834">
                   <a:extLst>
                     <a:ext uri="{9D8B030D-6E8A-4147-A177-3AD203B41FA5}">
-                      <a16:colId xmlns:a16="http://schemas.microsoft.com/office/drawing/2014/main" xmlns="" val="3209742257"/>
+                      <a16:colId xmlns:a16="http://schemas.microsoft.com/office/drawing/2014/main" val="3209742257"/>
                     </a:ext>
                   </a:extLst>
                 </a:gridCol>
                 <a:gridCol w="4589897">
                   <a:extLst>
                     <a:ext uri="{9D8B030D-6E8A-4147-A177-3AD203B41FA5}">
-                      <a16:colId xmlns:a16="http://schemas.microsoft.com/office/drawing/2014/main" xmlns="" val="1679887175"/>
+                      <a16:colId xmlns:a16="http://schemas.microsoft.com/office/drawing/2014/main" val="1679887175"/>
                     </a:ext>
                   </a:extLst>
                 </a:gridCol>
@@ -12698,7 +12698,7 @@
                 </a:tc>
                 <a:extLst>
                   <a:ext uri="{0D108BD9-81ED-4DB2-BD59-A6C34878D82A}">
-                    <a16:rowId xmlns:a16="http://schemas.microsoft.com/office/drawing/2014/main" xmlns="" val="1260802174"/>
+                    <a16:rowId xmlns:a16="http://schemas.microsoft.com/office/drawing/2014/main" val="1260802174"/>
                   </a:ext>
                 </a:extLst>
               </a:tr>
@@ -12759,7 +12759,7 @@
                 </a:tc>
                 <a:extLst>
                   <a:ext uri="{0D108BD9-81ED-4DB2-BD59-A6C34878D82A}">
-                    <a16:rowId xmlns:a16="http://schemas.microsoft.com/office/drawing/2014/main" xmlns="" val="4282141431"/>
+                    <a16:rowId xmlns:a16="http://schemas.microsoft.com/office/drawing/2014/main" val="4282141431"/>
                   </a:ext>
                 </a:extLst>
               </a:tr>
@@ -12820,7 +12820,7 @@
                 </a:tc>
                 <a:extLst>
                   <a:ext uri="{0D108BD9-81ED-4DB2-BD59-A6C34878D82A}">
-                    <a16:rowId xmlns:a16="http://schemas.microsoft.com/office/drawing/2014/main" xmlns="" val="4092894426"/>
+                    <a16:rowId xmlns:a16="http://schemas.microsoft.com/office/drawing/2014/main" val="4092894426"/>
                   </a:ext>
                 </a:extLst>
               </a:tr>
@@ -12863,7 +12863,7 @@
           <p:cNvPr id="2" name="Title 1">
             <a:extLst>
               <a:ext uri="{FF2B5EF4-FFF2-40B4-BE49-F238E27FC236}">
-                <a16:creationId xmlns:a16="http://schemas.microsoft.com/office/drawing/2014/main" xmlns="" id="{271F5404-3E55-40A9-B153-40E7852200CE}"/>
+                <a16:creationId xmlns:a16="http://schemas.microsoft.com/office/drawing/2014/main" id="{271F5404-3E55-40A9-B153-40E7852200CE}"/>
               </a:ext>
             </a:extLst>
           </p:cNvPr>
@@ -12896,7 +12896,7 @@
           <p:cNvPr id="6" name="Content Placeholder 5">
             <a:extLst>
               <a:ext uri="{FF2B5EF4-FFF2-40B4-BE49-F238E27FC236}">
-                <a16:creationId xmlns:a16="http://schemas.microsoft.com/office/drawing/2014/main" xmlns="" id="{79534DFA-F0ED-4EB8-9730-D5C3B65E2031}"/>
+                <a16:creationId xmlns:a16="http://schemas.microsoft.com/office/drawing/2014/main" id="{79534DFA-F0ED-4EB8-9730-D5C3B65E2031}"/>
               </a:ext>
             </a:extLst>
           </p:cNvPr>
@@ -12926,28 +12926,28 @@
                 <a:gridCol w="649355">
                   <a:extLst>
                     <a:ext uri="{9D8B030D-6E8A-4147-A177-3AD203B41FA5}">
-                      <a16:colId xmlns:a16="http://schemas.microsoft.com/office/drawing/2014/main" xmlns="" val="1656889719"/>
+                      <a16:colId xmlns:a16="http://schemas.microsoft.com/office/drawing/2014/main" val="1656889719"/>
                     </a:ext>
                   </a:extLst>
                 </a:gridCol>
                 <a:gridCol w="4214192">
                   <a:extLst>
                     <a:ext uri="{9D8B030D-6E8A-4147-A177-3AD203B41FA5}">
-                      <a16:colId xmlns:a16="http://schemas.microsoft.com/office/drawing/2014/main" xmlns="" val="2613002775"/>
+                      <a16:colId xmlns:a16="http://schemas.microsoft.com/office/drawing/2014/main" val="2613002775"/>
                     </a:ext>
                   </a:extLst>
                 </a:gridCol>
                 <a:gridCol w="1298713">
                   <a:extLst>
                     <a:ext uri="{9D8B030D-6E8A-4147-A177-3AD203B41FA5}">
-                      <a16:colId xmlns:a16="http://schemas.microsoft.com/office/drawing/2014/main" xmlns="" val="3209742257"/>
+                      <a16:colId xmlns:a16="http://schemas.microsoft.com/office/drawing/2014/main" val="3209742257"/>
                     </a:ext>
                   </a:extLst>
                 </a:gridCol>
                 <a:gridCol w="4121426">
                   <a:extLst>
                     <a:ext uri="{9D8B030D-6E8A-4147-A177-3AD203B41FA5}">
-                      <a16:colId xmlns:a16="http://schemas.microsoft.com/office/drawing/2014/main" xmlns="" val="1679887175"/>
+                      <a16:colId xmlns:a16="http://schemas.microsoft.com/office/drawing/2014/main" val="1679887175"/>
                     </a:ext>
                   </a:extLst>
                 </a:gridCol>
@@ -13011,7 +13011,7 @@
                 </a:tc>
                 <a:extLst>
                   <a:ext uri="{0D108BD9-81ED-4DB2-BD59-A6C34878D82A}">
-                    <a16:rowId xmlns:a16="http://schemas.microsoft.com/office/drawing/2014/main" xmlns="" val="1260802174"/>
+                    <a16:rowId xmlns:a16="http://schemas.microsoft.com/office/drawing/2014/main" val="1260802174"/>
                   </a:ext>
                 </a:extLst>
               </a:tr>
@@ -13072,7 +13072,7 @@
                 </a:tc>
                 <a:extLst>
                   <a:ext uri="{0D108BD9-81ED-4DB2-BD59-A6C34878D82A}">
-                    <a16:rowId xmlns:a16="http://schemas.microsoft.com/office/drawing/2014/main" xmlns="" val="4282141431"/>
+                    <a16:rowId xmlns:a16="http://schemas.microsoft.com/office/drawing/2014/main" val="4282141431"/>
                   </a:ext>
                 </a:extLst>
               </a:tr>
@@ -13133,7 +13133,7 @@
                 </a:tc>
                 <a:extLst>
                   <a:ext uri="{0D108BD9-81ED-4DB2-BD59-A6C34878D82A}">
-                    <a16:rowId xmlns:a16="http://schemas.microsoft.com/office/drawing/2014/main" xmlns="" val="4092894426"/>
+                    <a16:rowId xmlns:a16="http://schemas.microsoft.com/office/drawing/2014/main" val="4092894426"/>
                   </a:ext>
                 </a:extLst>
               </a:tr>
@@ -13194,7 +13194,7 @@
                 </a:tc>
                 <a:extLst>
                   <a:ext uri="{0D108BD9-81ED-4DB2-BD59-A6C34878D82A}">
-                    <a16:rowId xmlns:a16="http://schemas.microsoft.com/office/drawing/2014/main" xmlns="" val="2117823587"/>
+                    <a16:rowId xmlns:a16="http://schemas.microsoft.com/office/drawing/2014/main" val="2117823587"/>
                   </a:ext>
                 </a:extLst>
               </a:tr>
@@ -13237,7 +13237,7 @@
           <p:cNvPr id="2" name="Title 1">
             <a:extLst>
               <a:ext uri="{FF2B5EF4-FFF2-40B4-BE49-F238E27FC236}">
-                <a16:creationId xmlns:a16="http://schemas.microsoft.com/office/drawing/2014/main" xmlns="" id="{271F5404-3E55-40A9-B153-40E7852200CE}"/>
+                <a16:creationId xmlns:a16="http://schemas.microsoft.com/office/drawing/2014/main" id="{271F5404-3E55-40A9-B153-40E7852200CE}"/>
               </a:ext>
             </a:extLst>
           </p:cNvPr>
@@ -13270,7 +13270,7 @@
           <p:cNvPr id="7" name="Picture 6">
             <a:extLst>
               <a:ext uri="{FF2B5EF4-FFF2-40B4-BE49-F238E27FC236}">
-                <a16:creationId xmlns:a16="http://schemas.microsoft.com/office/drawing/2014/main" xmlns="" id="{1B8B1AB8-79FD-4781-B534-5C7176201B86}"/>
+                <a16:creationId xmlns:a16="http://schemas.microsoft.com/office/drawing/2014/main" id="{1B8B1AB8-79FD-4781-B534-5C7176201B86}"/>
               </a:ext>
             </a:extLst>
           </p:cNvPr>
@@ -13330,7 +13330,7 @@
           <p:cNvPr id="2" name="Title 1">
             <a:extLst>
               <a:ext uri="{FF2B5EF4-FFF2-40B4-BE49-F238E27FC236}">
-                <a16:creationId xmlns:a16="http://schemas.microsoft.com/office/drawing/2014/main" xmlns="" id="{271F5404-3E55-40A9-B153-40E7852200CE}"/>
+                <a16:creationId xmlns:a16="http://schemas.microsoft.com/office/drawing/2014/main" id="{271F5404-3E55-40A9-B153-40E7852200CE}"/>
               </a:ext>
             </a:extLst>
           </p:cNvPr>
@@ -13363,7 +13363,7 @@
           <p:cNvPr id="3" name="Content Placeholder 2">
             <a:extLst>
               <a:ext uri="{FF2B5EF4-FFF2-40B4-BE49-F238E27FC236}">
-                <a16:creationId xmlns:a16="http://schemas.microsoft.com/office/drawing/2014/main" xmlns="" id="{533976F8-B8EC-44C8-9E41-D33BA4BC6F9A}"/>
+                <a16:creationId xmlns:a16="http://schemas.microsoft.com/office/drawing/2014/main" id="{533976F8-B8EC-44C8-9E41-D33BA4BC6F9A}"/>
               </a:ext>
             </a:extLst>
           </p:cNvPr>
@@ -13392,6 +13392,17 @@
               <a:rPr lang="en-US" dirty="0"/>
               <a:t>Statement of Problem</a:t>
             </a:r>
+          </a:p>
+          <a:p>
+            <a:pPr marL="457200" indent="-457200">
+              <a:buFont typeface="+mj-lt"/>
+              <a:buAutoNum type="arabicPeriod"/>
+            </a:pPr>
+            <a:r>
+              <a:rPr lang="en-US"/>
+              <a:t>Aha Solution</a:t>
+            </a:r>
+            <a:endParaRPr lang="en-US" dirty="0"/>
           </a:p>
           <a:p>
             <a:pPr marL="457200" indent="-457200">
@@ -13470,7 +13481,7 @@
           <p:cNvPr id="2" name="Title 1">
             <a:extLst>
               <a:ext uri="{FF2B5EF4-FFF2-40B4-BE49-F238E27FC236}">
-                <a16:creationId xmlns:a16="http://schemas.microsoft.com/office/drawing/2014/main" xmlns="" id="{271F5404-3E55-40A9-B153-40E7852200CE}"/>
+                <a16:creationId xmlns:a16="http://schemas.microsoft.com/office/drawing/2014/main" id="{271F5404-3E55-40A9-B153-40E7852200CE}"/>
               </a:ext>
             </a:extLst>
           </p:cNvPr>
@@ -13503,7 +13514,7 @@
           <p:cNvPr id="3" name="Content Placeholder 2">
             <a:extLst>
               <a:ext uri="{FF2B5EF4-FFF2-40B4-BE49-F238E27FC236}">
-                <a16:creationId xmlns:a16="http://schemas.microsoft.com/office/drawing/2014/main" xmlns="" id="{533976F8-B8EC-44C8-9E41-D33BA4BC6F9A}"/>
+                <a16:creationId xmlns:a16="http://schemas.microsoft.com/office/drawing/2014/main" id="{533976F8-B8EC-44C8-9E41-D33BA4BC6F9A}"/>
               </a:ext>
             </a:extLst>
           </p:cNvPr>
@@ -13612,7 +13623,13 @@
       </p:grpSpPr>
       <p:sp>
         <p:nvSpPr>
-          <p:cNvPr id="2" name="Title 1"/>
+          <p:cNvPr id="2" name="Title 1">
+            <a:extLst>
+              <a:ext uri="{FF2B5EF4-FFF2-40B4-BE49-F238E27FC236}">
+                <a16:creationId xmlns:a16="http://schemas.microsoft.com/office/drawing/2014/main" id="{271F5404-3E55-40A9-B153-40E7852200CE}"/>
+              </a:ext>
+            </a:extLst>
+          </p:cNvPr>
           <p:cNvSpPr>
             <a:spLocks noGrp="1"/>
           </p:cNvSpPr>
@@ -13620,22 +13637,32 @@
             <p:ph type="title"/>
           </p:nvPr>
         </p:nvSpPr>
-        <p:spPr/>
+        <p:spPr>
+          <a:xfrm>
+            <a:off x="1141413" y="618518"/>
+            <a:ext cx="9905998" cy="719952"/>
+          </a:xfrm>
+        </p:spPr>
         <p:txBody>
           <a:bodyPr/>
           <a:lstStyle/>
           <a:p>
             <a:r>
-              <a:rPr lang="en-US" dirty="0" smtClean="0"/>
-              <a:t>Aha solution</a:t>
+              <a:rPr lang="en-US" dirty="0"/>
+              <a:t>Aha Solution</a:t>
             </a:r>
-            <a:endParaRPr lang="en-US" dirty="0"/>
           </a:p>
         </p:txBody>
       </p:sp>
       <p:sp>
         <p:nvSpPr>
-          <p:cNvPr id="3" name="Content Placeholder 2"/>
+          <p:cNvPr id="3" name="Content Placeholder 2">
+            <a:extLst>
+              <a:ext uri="{FF2B5EF4-FFF2-40B4-BE49-F238E27FC236}">
+                <a16:creationId xmlns:a16="http://schemas.microsoft.com/office/drawing/2014/main" id="{533976F8-B8EC-44C8-9E41-D33BA4BC6F9A}"/>
+              </a:ext>
+            </a:extLst>
+          </p:cNvPr>
           <p:cNvSpPr>
             <a:spLocks noGrp="1"/>
           </p:cNvSpPr>
@@ -13643,7 +13670,12 @@
             <p:ph idx="1"/>
           </p:nvPr>
         </p:nvSpPr>
-        <p:spPr/>
+        <p:spPr>
+          <a:xfrm>
+            <a:off x="1141412" y="1643270"/>
+            <a:ext cx="9905999" cy="4147931"/>
+          </a:xfrm>
+        </p:spPr>
         <p:txBody>
           <a:bodyPr>
             <a:normAutofit/>
@@ -13651,119 +13683,47 @@
           <a:lstStyle/>
           <a:p>
             <a:r>
-              <a:rPr lang="en-US" dirty="0" smtClean="0"/>
-              <a:t>Like a traditional way but with </a:t>
+              <a:rPr lang="en-US" sz="2800" dirty="0"/>
+              <a:t>Like a traditional way but with low investment</a:t>
             </a:r>
+          </a:p>
+          <a:p>
             <a:r>
-              <a:rPr lang="en-US"/>
-              <a:t>low </a:t>
+              <a:rPr lang="en-US" sz="2800" dirty="0"/>
+              <a:t>Efficiency managing vehicles by maximizing the utilization of un-used or less-used cars</a:t>
             </a:r>
+          </a:p>
+          <a:p>
             <a:r>
-              <a:rPr lang="en-US" smtClean="0"/>
-              <a:t>investment</a:t>
-            </a:r>
-            <a:endParaRPr lang="en-US" dirty="0"/>
-          </a:p>
-          <a:p>
-            <a:r>
-              <a:rPr lang="en-US" dirty="0"/>
-              <a:t>Efficiency </a:t>
-            </a:r>
-            <a:r>
-              <a:rPr lang="en-US" dirty="0" smtClean="0"/>
-              <a:t>managing </a:t>
-            </a:r>
-            <a:r>
-              <a:rPr lang="en-US" dirty="0"/>
-              <a:t>vehicles </a:t>
-            </a:r>
-            <a:r>
-              <a:rPr lang="en-US" dirty="0" smtClean="0"/>
-              <a:t>by maximize </a:t>
-            </a:r>
-            <a:r>
-              <a:rPr lang="en-US" dirty="0"/>
-              <a:t>the utilization of un-used or less-used </a:t>
-            </a:r>
-            <a:r>
-              <a:rPr lang="en-US" dirty="0" smtClean="0"/>
-              <a:t>cars</a:t>
-            </a:r>
-            <a:endParaRPr lang="en-US" dirty="0"/>
-          </a:p>
-          <a:p>
-            <a:r>
-              <a:rPr lang="en-US" dirty="0"/>
-              <a:t>Create better </a:t>
-            </a:r>
-            <a:r>
-              <a:rPr lang="en-US" dirty="0" smtClean="0"/>
-              <a:t>services </a:t>
-            </a:r>
-            <a:r>
-              <a:rPr lang="en-US" dirty="0"/>
-              <a:t>and reduce cost</a:t>
+              <a:rPr lang="en-US" sz="2800" dirty="0"/>
+              <a:t>Create better services and reduce rental cost</a:t>
             </a:r>
           </a:p>
           <a:p>
             <a:pPr lvl="1"/>
             <a:r>
-              <a:rPr lang="en-US" dirty="0" smtClean="0"/>
+              <a:rPr lang="en-US" sz="2400" dirty="0"/>
               <a:t>By improving rental process</a:t>
             </a:r>
-            <a:endParaRPr lang="en-US" dirty="0"/>
           </a:p>
           <a:p>
             <a:r>
-              <a:rPr lang="en-US" dirty="0"/>
-              <a:t>Better </a:t>
+              <a:rPr lang="en-US" sz="2800" dirty="0"/>
+              <a:t>Better managing users or customer</a:t>
             </a:r>
-            <a:r>
-              <a:rPr lang="en-US" dirty="0" smtClean="0"/>
-              <a:t>managing </a:t>
-            </a:r>
-            <a:r>
-              <a:rPr lang="en-US" dirty="0"/>
-              <a:t>users or </a:t>
-            </a:r>
-            <a:r>
-              <a:rPr lang="en-US" dirty="0" smtClean="0"/>
-              <a:t>customer</a:t>
-            </a:r>
-            <a:endParaRPr lang="en-US" dirty="0"/>
-          </a:p>
-        </p:txBody>
-      </p:sp>
-      <p:sp>
-        <p:nvSpPr>
-          <p:cNvPr id="5" name="TextBox 4"/>
-          <p:cNvSpPr txBox="1"/>
-          <p:nvPr/>
-        </p:nvSpPr>
-        <p:spPr>
-          <a:xfrm>
-            <a:off x="-1917700" y="3225800"/>
-            <a:ext cx="184731" cy="369332"/>
-          </a:xfrm>
-          <a:prstGeom prst="rect">
-            <a:avLst/>
-          </a:prstGeom>
-          <a:noFill/>
-        </p:spPr>
-        <p:txBody>
-          <a:bodyPr wrap="none" rtlCol="0">
-            <a:spAutoFit/>
-          </a:bodyPr>
-          <a:lstStyle/>
-          <a:p>
-            <a:endParaRPr lang="en-US" dirty="0"/>
+          </a:p>
+          <a:p>
+            <a:pPr marL="0" indent="0">
+              <a:buNone/>
+            </a:pPr>
+            <a:endParaRPr lang="en-US" sz="2800" dirty="0"/>
           </a:p>
         </p:txBody>
       </p:sp>
     </p:spTree>
     <p:extLst>
       <p:ext uri="{BB962C8B-B14F-4D97-AF65-F5344CB8AC3E}">
-        <p14:creationId xmlns:p14="http://schemas.microsoft.com/office/powerpoint/2010/main" val="973754405"/>
+        <p14:creationId xmlns:p14="http://schemas.microsoft.com/office/powerpoint/2010/main" val="1513015638"/>
       </p:ext>
     </p:extLst>
   </p:cSld>
@@ -13795,7 +13755,7 @@
           <p:cNvPr id="2" name="Title 1">
             <a:extLst>
               <a:ext uri="{FF2B5EF4-FFF2-40B4-BE49-F238E27FC236}">
-                <a16:creationId xmlns:a16="http://schemas.microsoft.com/office/drawing/2014/main" xmlns="" id="{271F5404-3E55-40A9-B153-40E7852200CE}"/>
+                <a16:creationId xmlns:a16="http://schemas.microsoft.com/office/drawing/2014/main" id="{271F5404-3E55-40A9-B153-40E7852200CE}"/>
               </a:ext>
             </a:extLst>
           </p:cNvPr>
@@ -13828,7 +13788,7 @@
           <p:cNvPr id="6" name="Content Placeholder 5">
             <a:extLst>
               <a:ext uri="{FF2B5EF4-FFF2-40B4-BE49-F238E27FC236}">
-                <a16:creationId xmlns:a16="http://schemas.microsoft.com/office/drawing/2014/main" xmlns="" id="{D6ADC14B-2F20-467C-9662-A2F7C6A80B81}"/>
+                <a16:creationId xmlns:a16="http://schemas.microsoft.com/office/drawing/2014/main" id="{D6ADC14B-2F20-467C-9662-A2F7C6A80B81}"/>
               </a:ext>
             </a:extLst>
           </p:cNvPr>
@@ -13858,21 +13818,21 @@
                 <a:gridCol w="2040834">
                   <a:extLst>
                     <a:ext uri="{9D8B030D-6E8A-4147-A177-3AD203B41FA5}">
-                      <a16:colId xmlns:a16="http://schemas.microsoft.com/office/drawing/2014/main" xmlns="" val="1001908754"/>
+                      <a16:colId xmlns:a16="http://schemas.microsoft.com/office/drawing/2014/main" val="1001908754"/>
                     </a:ext>
                   </a:extLst>
                 </a:gridCol>
                 <a:gridCol w="4094922">
                   <a:extLst>
                     <a:ext uri="{9D8B030D-6E8A-4147-A177-3AD203B41FA5}">
-                      <a16:colId xmlns:a16="http://schemas.microsoft.com/office/drawing/2014/main" xmlns="" val="781334107"/>
+                      <a16:colId xmlns:a16="http://schemas.microsoft.com/office/drawing/2014/main" val="781334107"/>
                     </a:ext>
                   </a:extLst>
                 </a:gridCol>
                 <a:gridCol w="4386470">
                   <a:extLst>
                     <a:ext uri="{9D8B030D-6E8A-4147-A177-3AD203B41FA5}">
-                      <a16:colId xmlns:a16="http://schemas.microsoft.com/office/drawing/2014/main" xmlns="" val="4012071629"/>
+                      <a16:colId xmlns:a16="http://schemas.microsoft.com/office/drawing/2014/main" val="4012071629"/>
                     </a:ext>
                   </a:extLst>
                 </a:gridCol>
@@ -13918,7 +13878,7 @@
                 </a:tc>
                 <a:extLst>
                   <a:ext uri="{0D108BD9-81ED-4DB2-BD59-A6C34878D82A}">
-                    <a16:rowId xmlns:a16="http://schemas.microsoft.com/office/drawing/2014/main" xmlns="" val="3154465232"/>
+                    <a16:rowId xmlns:a16="http://schemas.microsoft.com/office/drawing/2014/main" val="3154465232"/>
                   </a:ext>
                 </a:extLst>
               </a:tr>
@@ -13976,7 +13936,7 @@
                 </a:tc>
                 <a:extLst>
                   <a:ext uri="{0D108BD9-81ED-4DB2-BD59-A6C34878D82A}">
-                    <a16:rowId xmlns:a16="http://schemas.microsoft.com/office/drawing/2014/main" xmlns="" val="850522831"/>
+                    <a16:rowId xmlns:a16="http://schemas.microsoft.com/office/drawing/2014/main" val="850522831"/>
                   </a:ext>
                 </a:extLst>
               </a:tr>
@@ -14022,7 +13982,7 @@
                 </a:tc>
                 <a:extLst>
                   <a:ext uri="{0D108BD9-81ED-4DB2-BD59-A6C34878D82A}">
-                    <a16:rowId xmlns:a16="http://schemas.microsoft.com/office/drawing/2014/main" xmlns="" val="3469913030"/>
+                    <a16:rowId xmlns:a16="http://schemas.microsoft.com/office/drawing/2014/main" val="3469913030"/>
                   </a:ext>
                 </a:extLst>
               </a:tr>
@@ -14065,7 +14025,7 @@
           <p:cNvPr id="2" name="Title 1">
             <a:extLst>
               <a:ext uri="{FF2B5EF4-FFF2-40B4-BE49-F238E27FC236}">
-                <a16:creationId xmlns:a16="http://schemas.microsoft.com/office/drawing/2014/main" xmlns="" id="{271F5404-3E55-40A9-B153-40E7852200CE}"/>
+                <a16:creationId xmlns:a16="http://schemas.microsoft.com/office/drawing/2014/main" id="{271F5404-3E55-40A9-B153-40E7852200CE}"/>
               </a:ext>
             </a:extLst>
           </p:cNvPr>
@@ -14098,7 +14058,7 @@
           <p:cNvPr id="3" name="Content Placeholder 2">
             <a:extLst>
               <a:ext uri="{FF2B5EF4-FFF2-40B4-BE49-F238E27FC236}">
-                <a16:creationId xmlns:a16="http://schemas.microsoft.com/office/drawing/2014/main" xmlns="" id="{533976F8-B8EC-44C8-9E41-D33BA4BC6F9A}"/>
+                <a16:creationId xmlns:a16="http://schemas.microsoft.com/office/drawing/2014/main" id="{533976F8-B8EC-44C8-9E41-D33BA4BC6F9A}"/>
               </a:ext>
             </a:extLst>
           </p:cNvPr>
@@ -14131,7 +14091,7 @@
           <p:cNvPr id="5" name="Picture 4">
             <a:extLst>
               <a:ext uri="{FF2B5EF4-FFF2-40B4-BE49-F238E27FC236}">
-                <a16:creationId xmlns:a16="http://schemas.microsoft.com/office/drawing/2014/main" xmlns="" id="{7354015E-DC29-4DCB-90AA-D601B76D37B0}"/>
+                <a16:creationId xmlns:a16="http://schemas.microsoft.com/office/drawing/2014/main" id="{7354015E-DC29-4DCB-90AA-D601B76D37B0}"/>
               </a:ext>
             </a:extLst>
           </p:cNvPr>
@@ -14191,7 +14151,7 @@
           <p:cNvPr id="2" name="Title 1">
             <a:extLst>
               <a:ext uri="{FF2B5EF4-FFF2-40B4-BE49-F238E27FC236}">
-                <a16:creationId xmlns:a16="http://schemas.microsoft.com/office/drawing/2014/main" xmlns="" id="{271F5404-3E55-40A9-B153-40E7852200CE}"/>
+                <a16:creationId xmlns:a16="http://schemas.microsoft.com/office/drawing/2014/main" id="{271F5404-3E55-40A9-B153-40E7852200CE}"/>
               </a:ext>
             </a:extLst>
           </p:cNvPr>
@@ -14224,7 +14184,7 @@
           <p:cNvPr id="3" name="Content Placeholder 2">
             <a:extLst>
               <a:ext uri="{FF2B5EF4-FFF2-40B4-BE49-F238E27FC236}">
-                <a16:creationId xmlns:a16="http://schemas.microsoft.com/office/drawing/2014/main" xmlns="" id="{533976F8-B8EC-44C8-9E41-D33BA4BC6F9A}"/>
+                <a16:creationId xmlns:a16="http://schemas.microsoft.com/office/drawing/2014/main" id="{533976F8-B8EC-44C8-9E41-D33BA4BC6F9A}"/>
               </a:ext>
             </a:extLst>
           </p:cNvPr>
@@ -14257,7 +14217,7 @@
           <p:cNvPr id="5" name="Picture 4">
             <a:extLst>
               <a:ext uri="{FF2B5EF4-FFF2-40B4-BE49-F238E27FC236}">
-                <a16:creationId xmlns:a16="http://schemas.microsoft.com/office/drawing/2014/main" xmlns="" id="{31962F3A-3BE6-450D-8BEC-DAA5E2AEF04F}"/>
+                <a16:creationId xmlns:a16="http://schemas.microsoft.com/office/drawing/2014/main" id="{31962F3A-3BE6-450D-8BEC-DAA5E2AEF04F}"/>
               </a:ext>
             </a:extLst>
           </p:cNvPr>
@@ -14317,7 +14277,7 @@
           <p:cNvPr id="2" name="Title 1">
             <a:extLst>
               <a:ext uri="{FF2B5EF4-FFF2-40B4-BE49-F238E27FC236}">
-                <a16:creationId xmlns:a16="http://schemas.microsoft.com/office/drawing/2014/main" xmlns="" id="{271F5404-3E55-40A9-B153-40E7852200CE}"/>
+                <a16:creationId xmlns:a16="http://schemas.microsoft.com/office/drawing/2014/main" id="{271F5404-3E55-40A9-B153-40E7852200CE}"/>
               </a:ext>
             </a:extLst>
           </p:cNvPr>
@@ -14350,7 +14310,7 @@
           <p:cNvPr id="3" name="Content Placeholder 2">
             <a:extLst>
               <a:ext uri="{FF2B5EF4-FFF2-40B4-BE49-F238E27FC236}">
-                <a16:creationId xmlns:a16="http://schemas.microsoft.com/office/drawing/2014/main" xmlns="" id="{533976F8-B8EC-44C8-9E41-D33BA4BC6F9A}"/>
+                <a16:creationId xmlns:a16="http://schemas.microsoft.com/office/drawing/2014/main" id="{533976F8-B8EC-44C8-9E41-D33BA4BC6F9A}"/>
               </a:ext>
             </a:extLst>
           </p:cNvPr>
@@ -14383,7 +14343,7 @@
           <p:cNvPr id="6" name="Picture 5">
             <a:extLst>
               <a:ext uri="{FF2B5EF4-FFF2-40B4-BE49-F238E27FC236}">
-                <a16:creationId xmlns:a16="http://schemas.microsoft.com/office/drawing/2014/main" xmlns="" id="{572388BF-856F-4550-B9EF-5E433937F571}"/>
+                <a16:creationId xmlns:a16="http://schemas.microsoft.com/office/drawing/2014/main" id="{572388BF-856F-4550-B9EF-5E433937F571}"/>
               </a:ext>
             </a:extLst>
           </p:cNvPr>
@@ -14443,7 +14403,7 @@
           <p:cNvPr id="2" name="Title 1">
             <a:extLst>
               <a:ext uri="{FF2B5EF4-FFF2-40B4-BE49-F238E27FC236}">
-                <a16:creationId xmlns:a16="http://schemas.microsoft.com/office/drawing/2014/main" xmlns="" id="{271F5404-3E55-40A9-B153-40E7852200CE}"/>
+                <a16:creationId xmlns:a16="http://schemas.microsoft.com/office/drawing/2014/main" id="{271F5404-3E55-40A9-B153-40E7852200CE}"/>
               </a:ext>
             </a:extLst>
           </p:cNvPr>
@@ -14476,7 +14436,7 @@
           <p:cNvPr id="6" name="Content Placeholder 5">
             <a:extLst>
               <a:ext uri="{FF2B5EF4-FFF2-40B4-BE49-F238E27FC236}">
-                <a16:creationId xmlns:a16="http://schemas.microsoft.com/office/drawing/2014/main" xmlns="" id="{79534DFA-F0ED-4EB8-9730-D5C3B65E2031}"/>
+                <a16:creationId xmlns:a16="http://schemas.microsoft.com/office/drawing/2014/main" id="{79534DFA-F0ED-4EB8-9730-D5C3B65E2031}"/>
               </a:ext>
             </a:extLst>
           </p:cNvPr>
@@ -14506,28 +14466,28 @@
                 <a:gridCol w="649355">
                   <a:extLst>
                     <a:ext uri="{9D8B030D-6E8A-4147-A177-3AD203B41FA5}">
-                      <a16:colId xmlns:a16="http://schemas.microsoft.com/office/drawing/2014/main" xmlns="" val="1656889719"/>
+                      <a16:colId xmlns:a16="http://schemas.microsoft.com/office/drawing/2014/main" val="1656889719"/>
                     </a:ext>
                   </a:extLst>
                 </a:gridCol>
                 <a:gridCol w="3657600">
                   <a:extLst>
                     <a:ext uri="{9D8B030D-6E8A-4147-A177-3AD203B41FA5}">
-                      <a16:colId xmlns:a16="http://schemas.microsoft.com/office/drawing/2014/main" xmlns="" val="2613002775"/>
+                      <a16:colId xmlns:a16="http://schemas.microsoft.com/office/drawing/2014/main" val="2613002775"/>
                     </a:ext>
                   </a:extLst>
                 </a:gridCol>
                 <a:gridCol w="1386834">
                   <a:extLst>
                     <a:ext uri="{9D8B030D-6E8A-4147-A177-3AD203B41FA5}">
-                      <a16:colId xmlns:a16="http://schemas.microsoft.com/office/drawing/2014/main" xmlns="" val="3209742257"/>
+                      <a16:colId xmlns:a16="http://schemas.microsoft.com/office/drawing/2014/main" val="3209742257"/>
                     </a:ext>
                   </a:extLst>
                 </a:gridCol>
                 <a:gridCol w="4589897">
                   <a:extLst>
                     <a:ext uri="{9D8B030D-6E8A-4147-A177-3AD203B41FA5}">
-                      <a16:colId xmlns:a16="http://schemas.microsoft.com/office/drawing/2014/main" xmlns="" val="1679887175"/>
+                      <a16:colId xmlns:a16="http://schemas.microsoft.com/office/drawing/2014/main" val="1679887175"/>
                     </a:ext>
                   </a:extLst>
                 </a:gridCol>
@@ -14591,7 +14551,7 @@
                 </a:tc>
                 <a:extLst>
                   <a:ext uri="{0D108BD9-81ED-4DB2-BD59-A6C34878D82A}">
-                    <a16:rowId xmlns:a16="http://schemas.microsoft.com/office/drawing/2014/main" xmlns="" val="1260802174"/>
+                    <a16:rowId xmlns:a16="http://schemas.microsoft.com/office/drawing/2014/main" val="1260802174"/>
                   </a:ext>
                 </a:extLst>
               </a:tr>
@@ -14652,7 +14612,7 @@
                 </a:tc>
                 <a:extLst>
                   <a:ext uri="{0D108BD9-81ED-4DB2-BD59-A6C34878D82A}">
-                    <a16:rowId xmlns:a16="http://schemas.microsoft.com/office/drawing/2014/main" xmlns="" val="4282141431"/>
+                    <a16:rowId xmlns:a16="http://schemas.microsoft.com/office/drawing/2014/main" val="4282141431"/>
                   </a:ext>
                 </a:extLst>
               </a:tr>
@@ -14713,7 +14673,7 @@
                 </a:tc>
                 <a:extLst>
                   <a:ext uri="{0D108BD9-81ED-4DB2-BD59-A6C34878D82A}">
-                    <a16:rowId xmlns:a16="http://schemas.microsoft.com/office/drawing/2014/main" xmlns="" val="4092894426"/>
+                    <a16:rowId xmlns:a16="http://schemas.microsoft.com/office/drawing/2014/main" val="4092894426"/>
                   </a:ext>
                 </a:extLst>
               </a:tr>

</xml_diff>

<commit_message>
Update Aha Solution that is deleted
</commit_message>
<xml_diff>
--- a/Aha-presentation.pptx
+++ b/Aha-presentation.pptx
@@ -8,14 +8,15 @@
     <p:sldId id="256" r:id="rId2"/>
     <p:sldId id="257" r:id="rId3"/>
     <p:sldId id="258" r:id="rId4"/>
-    <p:sldId id="259" r:id="rId5"/>
-    <p:sldId id="260" r:id="rId6"/>
-    <p:sldId id="262" r:id="rId7"/>
-    <p:sldId id="261" r:id="rId8"/>
-    <p:sldId id="263" r:id="rId9"/>
-    <p:sldId id="264" r:id="rId10"/>
-    <p:sldId id="265" r:id="rId11"/>
-    <p:sldId id="266" r:id="rId12"/>
+    <p:sldId id="267" r:id="rId5"/>
+    <p:sldId id="259" r:id="rId6"/>
+    <p:sldId id="260" r:id="rId7"/>
+    <p:sldId id="262" r:id="rId8"/>
+    <p:sldId id="261" r:id="rId9"/>
+    <p:sldId id="263" r:id="rId10"/>
+    <p:sldId id="264" r:id="rId11"/>
+    <p:sldId id="265" r:id="rId12"/>
+    <p:sldId id="266" r:id="rId13"/>
   </p:sldIdLst>
   <p:sldSz cx="12192000" cy="6858000"/>
   <p:notesSz cx="6858000" cy="9144000"/>
@@ -172,7 +173,7 @@
           <a:noFill/>
           <a:extLst>
             <a:ext uri="{909E8E84-426E-40dd-AFC4-6F175D3DCCD1}">
-              <a14:hiddenFill xmlns:a14="http://schemas.microsoft.com/office/drawing/2010/main" xmlns="">
+              <a14:hiddenFill xmlns="" xmlns:a14="http://schemas.microsoft.com/office/drawing/2010/main">
                 <a:solidFill>
                   <a:srgbClr val="FFFFFF"/>
                 </a:solidFill>
@@ -232,7 +233,7 @@
             </a:ln>
             <a:extLst>
               <a:ext uri="{91240B29-F687-4f45-9708-019B960494DF}">
-                <a14:hiddenLine xmlns:a14="http://schemas.microsoft.com/office/drawing/2010/main" xmlns="" w="9525">
+                <a14:hiddenLine xmlns="" xmlns:a14="http://schemas.microsoft.com/office/drawing/2010/main" w="9525">
                   <a:solidFill>
                     <a:srgbClr val="000000"/>
                   </a:solidFill>
@@ -322,7 +323,7 @@
             </a:ln>
             <a:extLst>
               <a:ext uri="{91240B29-F687-4f45-9708-019B960494DF}">
-                <a14:hiddenLine xmlns:a14="http://schemas.microsoft.com/office/drawing/2010/main" xmlns="" w="9525">
+                <a14:hiddenLine xmlns="" xmlns:a14="http://schemas.microsoft.com/office/drawing/2010/main" w="9525">
                   <a:solidFill>
                     <a:srgbClr val="000000"/>
                   </a:solidFill>
@@ -412,7 +413,7 @@
             </a:ln>
             <a:extLst>
               <a:ext uri="{91240B29-F687-4f45-9708-019B960494DF}">
-                <a14:hiddenLine xmlns:a14="http://schemas.microsoft.com/office/drawing/2010/main" xmlns="" w="9525">
+                <a14:hiddenLine xmlns="" xmlns:a14="http://schemas.microsoft.com/office/drawing/2010/main" w="9525">
                   <a:solidFill>
                     <a:srgbClr val="000000"/>
                   </a:solidFill>
@@ -446,7 +447,7 @@
             </a:ln>
             <a:extLst>
               <a:ext uri="{91240B29-F687-4f45-9708-019B960494DF}">
-                <a14:hiddenLine xmlns:a14="http://schemas.microsoft.com/office/drawing/2010/main" xmlns="" w="9525">
+                <a14:hiddenLine xmlns="" xmlns:a14="http://schemas.microsoft.com/office/drawing/2010/main" w="9525">
                   <a:solidFill>
                     <a:srgbClr val="000000"/>
                   </a:solidFill>
@@ -536,7 +537,7 @@
             </a:ln>
             <a:extLst>
               <a:ext uri="{91240B29-F687-4f45-9708-019B960494DF}">
-                <a14:hiddenLine xmlns:a14="http://schemas.microsoft.com/office/drawing/2010/main" xmlns="" w="9525">
+                <a14:hiddenLine xmlns="" xmlns:a14="http://schemas.microsoft.com/office/drawing/2010/main" w="9525">
                   <a:solidFill>
                     <a:srgbClr val="000000"/>
                   </a:solidFill>
@@ -598,7 +599,7 @@
             </a:ln>
             <a:extLst>
               <a:ext uri="{91240B29-F687-4f45-9708-019B960494DF}">
-                <a14:hiddenLine xmlns:a14="http://schemas.microsoft.com/office/drawing/2010/main" xmlns="" w="9525">
+                <a14:hiddenLine xmlns="" xmlns:a14="http://schemas.microsoft.com/office/drawing/2010/main" w="9525">
                   <a:solidFill>
                     <a:srgbClr val="000000"/>
                   </a:solidFill>
@@ -660,7 +661,7 @@
             </a:ln>
             <a:extLst>
               <a:ext uri="{91240B29-F687-4f45-9708-019B960494DF}">
-                <a14:hiddenLine xmlns:a14="http://schemas.microsoft.com/office/drawing/2010/main" xmlns="" w="9525">
+                <a14:hiddenLine xmlns="" xmlns:a14="http://schemas.microsoft.com/office/drawing/2010/main" w="9525">
                   <a:solidFill>
                     <a:srgbClr val="000000"/>
                   </a:solidFill>
@@ -750,7 +751,7 @@
             </a:ln>
             <a:extLst>
               <a:ext uri="{91240B29-F687-4f45-9708-019B960494DF}">
-                <a14:hiddenLine xmlns:a14="http://schemas.microsoft.com/office/drawing/2010/main" xmlns="" w="9525">
+                <a14:hiddenLine xmlns="" xmlns:a14="http://schemas.microsoft.com/office/drawing/2010/main" w="9525">
                   <a:solidFill>
                     <a:srgbClr val="000000"/>
                   </a:solidFill>
@@ -812,7 +813,7 @@
             </a:ln>
             <a:extLst>
               <a:ext uri="{91240B29-F687-4f45-9708-019B960494DF}">
-                <a14:hiddenLine xmlns:a14="http://schemas.microsoft.com/office/drawing/2010/main" xmlns="" w="9525">
+                <a14:hiddenLine xmlns="" xmlns:a14="http://schemas.microsoft.com/office/drawing/2010/main" w="9525">
                   <a:solidFill>
                     <a:srgbClr val="000000"/>
                   </a:solidFill>
@@ -874,7 +875,7 @@
             </a:ln>
             <a:extLst>
               <a:ext uri="{91240B29-F687-4f45-9708-019B960494DF}">
-                <a14:hiddenLine xmlns:a14="http://schemas.microsoft.com/office/drawing/2010/main" xmlns="" w="9525">
+                <a14:hiddenLine xmlns="" xmlns:a14="http://schemas.microsoft.com/office/drawing/2010/main" w="9525">
                   <a:solidFill>
                     <a:srgbClr val="000000"/>
                   </a:solidFill>
@@ -964,7 +965,7 @@
             </a:ln>
             <a:extLst>
               <a:ext uri="{91240B29-F687-4f45-9708-019B960494DF}">
-                <a14:hiddenLine xmlns:a14="http://schemas.microsoft.com/office/drawing/2010/main" xmlns="" w="9525">
+                <a14:hiddenLine xmlns="" xmlns:a14="http://schemas.microsoft.com/office/drawing/2010/main" w="9525">
                   <a:solidFill>
                     <a:srgbClr val="000000"/>
                   </a:solidFill>
@@ -1054,7 +1055,7 @@
             </a:ln>
             <a:extLst>
               <a:ext uri="{91240B29-F687-4f45-9708-019B960494DF}">
-                <a14:hiddenLine xmlns:a14="http://schemas.microsoft.com/office/drawing/2010/main" xmlns="" w="9525">
+                <a14:hiddenLine xmlns="" xmlns:a14="http://schemas.microsoft.com/office/drawing/2010/main" w="9525">
                   <a:solidFill>
                     <a:srgbClr val="000000"/>
                   </a:solidFill>
@@ -1116,7 +1117,7 @@
             </a:ln>
             <a:extLst>
               <a:ext uri="{91240B29-F687-4f45-9708-019B960494DF}">
-                <a14:hiddenLine xmlns:a14="http://schemas.microsoft.com/office/drawing/2010/main" xmlns="" w="9525">
+                <a14:hiddenLine xmlns="" xmlns:a14="http://schemas.microsoft.com/office/drawing/2010/main" w="9525">
                   <a:solidFill>
                     <a:srgbClr val="000000"/>
                   </a:solidFill>
@@ -1226,7 +1227,7 @@
             </a:ln>
             <a:extLst>
               <a:ext uri="{91240B29-F687-4f45-9708-019B960494DF}">
-                <a14:hiddenLine xmlns:a14="http://schemas.microsoft.com/office/drawing/2010/main" xmlns="" w="9525">
+                <a14:hiddenLine xmlns="" xmlns:a14="http://schemas.microsoft.com/office/drawing/2010/main" w="9525">
                   <a:solidFill>
                     <a:srgbClr val="000000"/>
                   </a:solidFill>
@@ -1288,7 +1289,7 @@
             </a:ln>
             <a:extLst>
               <a:ext uri="{91240B29-F687-4f45-9708-019B960494DF}">
-                <a14:hiddenLine xmlns:a14="http://schemas.microsoft.com/office/drawing/2010/main" xmlns="" w="9525">
+                <a14:hiddenLine xmlns="" xmlns:a14="http://schemas.microsoft.com/office/drawing/2010/main" w="9525">
                   <a:solidFill>
                     <a:srgbClr val="000000"/>
                   </a:solidFill>
@@ -1378,7 +1379,7 @@
             </a:ln>
             <a:extLst>
               <a:ext uri="{91240B29-F687-4f45-9708-019B960494DF}">
-                <a14:hiddenLine xmlns:a14="http://schemas.microsoft.com/office/drawing/2010/main" xmlns="" w="9525">
+                <a14:hiddenLine xmlns="" xmlns:a14="http://schemas.microsoft.com/office/drawing/2010/main" w="9525">
                   <a:solidFill>
                     <a:srgbClr val="000000"/>
                   </a:solidFill>
@@ -1468,7 +1469,7 @@
             </a:ln>
             <a:extLst>
               <a:ext uri="{91240B29-F687-4f45-9708-019B960494DF}">
-                <a14:hiddenLine xmlns:a14="http://schemas.microsoft.com/office/drawing/2010/main" xmlns="" w="9525">
+                <a14:hiddenLine xmlns="" xmlns:a14="http://schemas.microsoft.com/office/drawing/2010/main" w="9525">
                   <a:solidFill>
                     <a:srgbClr val="000000"/>
                   </a:solidFill>
@@ -1530,7 +1531,7 @@
             </a:ln>
             <a:extLst>
               <a:ext uri="{91240B29-F687-4f45-9708-019B960494DF}">
-                <a14:hiddenLine xmlns:a14="http://schemas.microsoft.com/office/drawing/2010/main" xmlns="" w="9525">
+                <a14:hiddenLine xmlns="" xmlns:a14="http://schemas.microsoft.com/office/drawing/2010/main" w="9525">
                   <a:solidFill>
                     <a:srgbClr val="000000"/>
                   </a:solidFill>
@@ -1620,7 +1621,7 @@
             </a:ln>
             <a:extLst>
               <a:ext uri="{91240B29-F687-4f45-9708-019B960494DF}">
-                <a14:hiddenLine xmlns:a14="http://schemas.microsoft.com/office/drawing/2010/main" xmlns="" w="9525">
+                <a14:hiddenLine xmlns="" xmlns:a14="http://schemas.microsoft.com/office/drawing/2010/main" w="9525">
                   <a:solidFill>
                     <a:srgbClr val="000000"/>
                   </a:solidFill>
@@ -1710,7 +1711,7 @@
             </a:ln>
             <a:extLst>
               <a:ext uri="{91240B29-F687-4f45-9708-019B960494DF}">
-                <a14:hiddenLine xmlns:a14="http://schemas.microsoft.com/office/drawing/2010/main" xmlns="" w="9525">
+                <a14:hiddenLine xmlns="" xmlns:a14="http://schemas.microsoft.com/office/drawing/2010/main" w="9525">
                   <a:solidFill>
                     <a:srgbClr val="000000"/>
                   </a:solidFill>
@@ -1766,7 +1767,7 @@
             </a:ln>
             <a:extLst>
               <a:ext uri="{91240B29-F687-4f45-9708-019B960494DF}">
-                <a14:hiddenLine xmlns:a14="http://schemas.microsoft.com/office/drawing/2010/main" xmlns="" w="9525">
+                <a14:hiddenLine xmlns="" xmlns:a14="http://schemas.microsoft.com/office/drawing/2010/main" w="9525">
                   <a:solidFill>
                     <a:srgbClr val="000000"/>
                   </a:solidFill>
@@ -1856,7 +1857,7 @@
             </a:ln>
             <a:extLst>
               <a:ext uri="{91240B29-F687-4f45-9708-019B960494DF}">
-                <a14:hiddenLine xmlns:a14="http://schemas.microsoft.com/office/drawing/2010/main" xmlns="" w="9525">
+                <a14:hiddenLine xmlns="" xmlns:a14="http://schemas.microsoft.com/office/drawing/2010/main" w="9525">
                   <a:solidFill>
                     <a:srgbClr val="000000"/>
                   </a:solidFill>
@@ -1912,7 +1913,7 @@
             </a:ln>
             <a:extLst>
               <a:ext uri="{91240B29-F687-4f45-9708-019B960494DF}">
-                <a14:hiddenLine xmlns:a14="http://schemas.microsoft.com/office/drawing/2010/main" xmlns="" w="9525">
+                <a14:hiddenLine xmlns="" xmlns:a14="http://schemas.microsoft.com/office/drawing/2010/main" w="9525">
                   <a:solidFill>
                     <a:srgbClr val="000000"/>
                   </a:solidFill>
@@ -2002,7 +2003,7 @@
             </a:ln>
             <a:extLst>
               <a:ext uri="{91240B29-F687-4f45-9708-019B960494DF}">
-                <a14:hiddenLine xmlns:a14="http://schemas.microsoft.com/office/drawing/2010/main" xmlns="" w="9525">
+                <a14:hiddenLine xmlns="" xmlns:a14="http://schemas.microsoft.com/office/drawing/2010/main" w="9525">
                   <a:solidFill>
                     <a:srgbClr val="000000"/>
                   </a:solidFill>
@@ -2070,7 +2071,7 @@
             </a:ln>
             <a:extLst>
               <a:ext uri="{91240B29-F687-4f45-9708-019B960494DF}">
-                <a14:hiddenLine xmlns:a14="http://schemas.microsoft.com/office/drawing/2010/main" xmlns="" w="9525">
+                <a14:hiddenLine xmlns="" xmlns:a14="http://schemas.microsoft.com/office/drawing/2010/main" w="9525">
                   <a:solidFill>
                     <a:srgbClr val="000000"/>
                   </a:solidFill>
@@ -2160,7 +2161,7 @@
             </a:ln>
             <a:extLst>
               <a:ext uri="{91240B29-F687-4f45-9708-019B960494DF}">
-                <a14:hiddenLine xmlns:a14="http://schemas.microsoft.com/office/drawing/2010/main" xmlns="" w="9525">
+                <a14:hiddenLine xmlns="" xmlns:a14="http://schemas.microsoft.com/office/drawing/2010/main" w="9525">
                   <a:solidFill>
                     <a:srgbClr val="000000"/>
                   </a:solidFill>
@@ -2228,7 +2229,7 @@
             </a:ln>
             <a:extLst>
               <a:ext uri="{91240B29-F687-4f45-9708-019B960494DF}">
-                <a14:hiddenLine xmlns:a14="http://schemas.microsoft.com/office/drawing/2010/main" xmlns="" w="9525">
+                <a14:hiddenLine xmlns="" xmlns:a14="http://schemas.microsoft.com/office/drawing/2010/main" w="9525">
                   <a:solidFill>
                     <a:srgbClr val="000000"/>
                   </a:solidFill>
@@ -2318,7 +2319,7 @@
             </a:ln>
             <a:extLst>
               <a:ext uri="{91240B29-F687-4f45-9708-019B960494DF}">
-                <a14:hiddenLine xmlns:a14="http://schemas.microsoft.com/office/drawing/2010/main" xmlns="" w="9525">
+                <a14:hiddenLine xmlns="" xmlns:a14="http://schemas.microsoft.com/office/drawing/2010/main" w="9525">
                   <a:solidFill>
                     <a:srgbClr val="000000"/>
                   </a:solidFill>
@@ -2352,7 +2353,7 @@
             </a:ln>
             <a:extLst>
               <a:ext uri="{91240B29-F687-4f45-9708-019B960494DF}">
-                <a14:hiddenLine xmlns:a14="http://schemas.microsoft.com/office/drawing/2010/main" xmlns="" w="9525">
+                <a14:hiddenLine xmlns="" xmlns:a14="http://schemas.microsoft.com/office/drawing/2010/main" w="9525">
                   <a:solidFill>
                     <a:srgbClr val="000000"/>
                   </a:solidFill>
@@ -2442,7 +2443,7 @@
             </a:ln>
             <a:extLst>
               <a:ext uri="{91240B29-F687-4f45-9708-019B960494DF}">
-                <a14:hiddenLine xmlns:a14="http://schemas.microsoft.com/office/drawing/2010/main" xmlns="" w="9525">
+                <a14:hiddenLine xmlns="" xmlns:a14="http://schemas.microsoft.com/office/drawing/2010/main" w="9525">
                   <a:solidFill>
                     <a:srgbClr val="000000"/>
                   </a:solidFill>
@@ -2504,7 +2505,7 @@
             </a:ln>
             <a:extLst>
               <a:ext uri="{91240B29-F687-4f45-9708-019B960494DF}">
-                <a14:hiddenLine xmlns:a14="http://schemas.microsoft.com/office/drawing/2010/main" xmlns="" w="9525">
+                <a14:hiddenLine xmlns="" xmlns:a14="http://schemas.microsoft.com/office/drawing/2010/main" w="9525">
                   <a:solidFill>
                     <a:srgbClr val="000000"/>
                   </a:solidFill>
@@ -2566,7 +2567,7 @@
             </a:ln>
             <a:extLst>
               <a:ext uri="{91240B29-F687-4f45-9708-019B960494DF}">
-                <a14:hiddenLine xmlns:a14="http://schemas.microsoft.com/office/drawing/2010/main" xmlns="" w="9525">
+                <a14:hiddenLine xmlns="" xmlns:a14="http://schemas.microsoft.com/office/drawing/2010/main" w="9525">
                   <a:solidFill>
                     <a:srgbClr val="000000"/>
                   </a:solidFill>
@@ -2656,7 +2657,7 @@
             </a:ln>
             <a:extLst>
               <a:ext uri="{91240B29-F687-4f45-9708-019B960494DF}">
-                <a14:hiddenLine xmlns:a14="http://schemas.microsoft.com/office/drawing/2010/main" xmlns="" w="9525">
+                <a14:hiddenLine xmlns="" xmlns:a14="http://schemas.microsoft.com/office/drawing/2010/main" w="9525">
                   <a:solidFill>
                     <a:srgbClr val="000000"/>
                   </a:solidFill>
@@ -2724,7 +2725,7 @@
             </a:ln>
             <a:extLst>
               <a:ext uri="{91240B29-F687-4f45-9708-019B960494DF}">
-                <a14:hiddenLine xmlns:a14="http://schemas.microsoft.com/office/drawing/2010/main" xmlns="" w="9525">
+                <a14:hiddenLine xmlns="" xmlns:a14="http://schemas.microsoft.com/office/drawing/2010/main" w="9525">
                   <a:solidFill>
                     <a:srgbClr val="000000"/>
                   </a:solidFill>
@@ -2786,7 +2787,7 @@
             </a:ln>
             <a:extLst>
               <a:ext uri="{91240B29-F687-4f45-9708-019B960494DF}">
-                <a14:hiddenLine xmlns:a14="http://schemas.microsoft.com/office/drawing/2010/main" xmlns="" w="9525">
+                <a14:hiddenLine xmlns="" xmlns:a14="http://schemas.microsoft.com/office/drawing/2010/main" w="9525">
                   <a:solidFill>
                     <a:srgbClr val="000000"/>
                   </a:solidFill>
@@ -2876,7 +2877,7 @@
             </a:ln>
             <a:extLst>
               <a:ext uri="{91240B29-F687-4f45-9708-019B960494DF}">
-                <a14:hiddenLine xmlns:a14="http://schemas.microsoft.com/office/drawing/2010/main" xmlns="" w="9525">
+                <a14:hiddenLine xmlns="" xmlns:a14="http://schemas.microsoft.com/office/drawing/2010/main" w="9525">
                   <a:solidFill>
                     <a:srgbClr val="000000"/>
                   </a:solidFill>
@@ -2938,7 +2939,7 @@
             </a:ln>
             <a:extLst>
               <a:ext uri="{91240B29-F687-4f45-9708-019B960494DF}">
-                <a14:hiddenLine xmlns:a14="http://schemas.microsoft.com/office/drawing/2010/main" xmlns="" w="9525">
+                <a14:hiddenLine xmlns="" xmlns:a14="http://schemas.microsoft.com/office/drawing/2010/main" w="9525">
                   <a:solidFill>
                     <a:srgbClr val="000000"/>
                   </a:solidFill>
@@ -3028,7 +3029,7 @@
             </a:ln>
             <a:extLst>
               <a:ext uri="{91240B29-F687-4f45-9708-019B960494DF}">
-                <a14:hiddenLine xmlns:a14="http://schemas.microsoft.com/office/drawing/2010/main" xmlns="" w="9525">
+                <a14:hiddenLine xmlns="" xmlns:a14="http://schemas.microsoft.com/office/drawing/2010/main" w="9525">
                   <a:solidFill>
                     <a:srgbClr val="000000"/>
                   </a:solidFill>
@@ -3090,7 +3091,7 @@
             </a:ln>
             <a:extLst>
               <a:ext uri="{91240B29-F687-4f45-9708-019B960494DF}">
-                <a14:hiddenLine xmlns:a14="http://schemas.microsoft.com/office/drawing/2010/main" xmlns="" w="9525">
+                <a14:hiddenLine xmlns="" xmlns:a14="http://schemas.microsoft.com/office/drawing/2010/main" w="9525">
                   <a:solidFill>
                     <a:srgbClr val="000000"/>
                   </a:solidFill>
@@ -3180,7 +3181,7 @@
             </a:ln>
             <a:extLst>
               <a:ext uri="{91240B29-F687-4f45-9708-019B960494DF}">
-                <a14:hiddenLine xmlns:a14="http://schemas.microsoft.com/office/drawing/2010/main" xmlns="" w="9525">
+                <a14:hiddenLine xmlns="" xmlns:a14="http://schemas.microsoft.com/office/drawing/2010/main" w="9525">
                   <a:solidFill>
                     <a:srgbClr val="000000"/>
                   </a:solidFill>
@@ -3214,7 +3215,7 @@
             </a:ln>
             <a:extLst>
               <a:ext uri="{91240B29-F687-4f45-9708-019B960494DF}">
-                <a14:hiddenLine xmlns:a14="http://schemas.microsoft.com/office/drawing/2010/main" xmlns="" w="9525">
+                <a14:hiddenLine xmlns="" xmlns:a14="http://schemas.microsoft.com/office/drawing/2010/main" w="9525">
                   <a:solidFill>
                     <a:srgbClr val="000000"/>
                   </a:solidFill>
@@ -3279,7 +3280,7 @@
             </a:ln>
             <a:extLst>
               <a:ext uri="{91240B29-F687-4f45-9708-019B960494DF}">
-                <a14:hiddenLine xmlns:a14="http://schemas.microsoft.com/office/drawing/2010/main" xmlns="" w="9525">
+                <a14:hiddenLine xmlns="" xmlns:a14="http://schemas.microsoft.com/office/drawing/2010/main" w="9525">
                   <a:solidFill>
                     <a:srgbClr val="000000"/>
                   </a:solidFill>
@@ -3369,7 +3370,7 @@
             </a:ln>
             <a:extLst>
               <a:ext uri="{91240B29-F687-4f45-9708-019B960494DF}">
-                <a14:hiddenLine xmlns:a14="http://schemas.microsoft.com/office/drawing/2010/main" xmlns="" w="9525">
+                <a14:hiddenLine xmlns="" xmlns:a14="http://schemas.microsoft.com/office/drawing/2010/main" w="9525">
                   <a:solidFill>
                     <a:srgbClr val="000000"/>
                   </a:solidFill>
@@ -3431,7 +3432,7 @@
             </a:ln>
             <a:extLst>
               <a:ext uri="{91240B29-F687-4f45-9708-019B960494DF}">
-                <a14:hiddenLine xmlns:a14="http://schemas.microsoft.com/office/drawing/2010/main" xmlns="" w="9525">
+                <a14:hiddenLine xmlns="" xmlns:a14="http://schemas.microsoft.com/office/drawing/2010/main" w="9525">
                   <a:solidFill>
                     <a:srgbClr val="000000"/>
                   </a:solidFill>
@@ -3521,7 +3522,7 @@
             </a:ln>
             <a:extLst>
               <a:ext uri="{91240B29-F687-4f45-9708-019B960494DF}">
-                <a14:hiddenLine xmlns:a14="http://schemas.microsoft.com/office/drawing/2010/main" xmlns="" w="9525">
+                <a14:hiddenLine xmlns="" xmlns:a14="http://schemas.microsoft.com/office/drawing/2010/main" w="9525">
                   <a:solidFill>
                     <a:srgbClr val="000000"/>
                   </a:solidFill>
@@ -3611,7 +3612,7 @@
             </a:ln>
             <a:extLst>
               <a:ext uri="{91240B29-F687-4f45-9708-019B960494DF}">
-                <a14:hiddenLine xmlns:a14="http://schemas.microsoft.com/office/drawing/2010/main" xmlns="" w="9525">
+                <a14:hiddenLine xmlns="" xmlns:a14="http://schemas.microsoft.com/office/drawing/2010/main" w="9525">
                   <a:solidFill>
                     <a:srgbClr val="000000"/>
                   </a:solidFill>
@@ -3676,7 +3677,7 @@
             </a:ln>
             <a:extLst>
               <a:ext uri="{91240B29-F687-4f45-9708-019B960494DF}">
-                <a14:hiddenLine xmlns:a14="http://schemas.microsoft.com/office/drawing/2010/main" xmlns="" w="9525">
+                <a14:hiddenLine xmlns="" xmlns:a14="http://schemas.microsoft.com/office/drawing/2010/main" w="9525">
                   <a:solidFill>
                     <a:srgbClr val="000000"/>
                   </a:solidFill>
@@ -3738,7 +3739,7 @@
             </a:ln>
             <a:extLst>
               <a:ext uri="{91240B29-F687-4f45-9708-019B960494DF}">
-                <a14:hiddenLine xmlns:a14="http://schemas.microsoft.com/office/drawing/2010/main" xmlns="" w="9525">
+                <a14:hiddenLine xmlns="" xmlns:a14="http://schemas.microsoft.com/office/drawing/2010/main" w="9525">
                   <a:solidFill>
                     <a:srgbClr val="000000"/>
                   </a:solidFill>
@@ -3828,7 +3829,7 @@
             </a:ln>
             <a:extLst>
               <a:ext uri="{91240B29-F687-4f45-9708-019B960494DF}">
-                <a14:hiddenLine xmlns:a14="http://schemas.microsoft.com/office/drawing/2010/main" xmlns="" w="9525">
+                <a14:hiddenLine xmlns="" xmlns:a14="http://schemas.microsoft.com/office/drawing/2010/main" w="9525">
                   <a:solidFill>
                     <a:srgbClr val="000000"/>
                   </a:solidFill>
@@ -3918,7 +3919,7 @@
             </a:ln>
             <a:extLst>
               <a:ext uri="{91240B29-F687-4f45-9708-019B960494DF}">
-                <a14:hiddenLine xmlns:a14="http://schemas.microsoft.com/office/drawing/2010/main" xmlns="" w="9525">
+                <a14:hiddenLine xmlns="" xmlns:a14="http://schemas.microsoft.com/office/drawing/2010/main" w="9525">
                   <a:solidFill>
                     <a:srgbClr val="000000"/>
                   </a:solidFill>
@@ -3980,7 +3981,7 @@
             </a:ln>
             <a:extLst>
               <a:ext uri="{91240B29-F687-4f45-9708-019B960494DF}">
-                <a14:hiddenLine xmlns:a14="http://schemas.microsoft.com/office/drawing/2010/main" xmlns="" w="9525">
+                <a14:hiddenLine xmlns="" xmlns:a14="http://schemas.microsoft.com/office/drawing/2010/main" w="9525">
                   <a:solidFill>
                     <a:srgbClr val="000000"/>
                   </a:solidFill>
@@ -4100,7 +4101,7 @@
             </a:ln>
             <a:extLst>
               <a:ext uri="{91240B29-F687-4f45-9708-019B960494DF}">
-                <a14:hiddenLine xmlns:a14="http://schemas.microsoft.com/office/drawing/2010/main" xmlns="" w="9525">
+                <a14:hiddenLine xmlns="" xmlns:a14="http://schemas.microsoft.com/office/drawing/2010/main" w="9525">
                   <a:solidFill>
                     <a:srgbClr val="000000"/>
                   </a:solidFill>
@@ -4168,7 +4169,7 @@
             </a:ln>
             <a:extLst>
               <a:ext uri="{91240B29-F687-4f45-9708-019B960494DF}">
-                <a14:hiddenLine xmlns:a14="http://schemas.microsoft.com/office/drawing/2010/main" xmlns="" w="9525">
+                <a14:hiddenLine xmlns="" xmlns:a14="http://schemas.microsoft.com/office/drawing/2010/main" w="9525">
                   <a:solidFill>
                     <a:srgbClr val="000000"/>
                   </a:solidFill>
@@ -4258,7 +4259,7 @@
             </a:ln>
             <a:extLst>
               <a:ext uri="{91240B29-F687-4f45-9708-019B960494DF}">
-                <a14:hiddenLine xmlns:a14="http://schemas.microsoft.com/office/drawing/2010/main" xmlns="" w="9525">
+                <a14:hiddenLine xmlns="" xmlns:a14="http://schemas.microsoft.com/office/drawing/2010/main" w="9525">
                   <a:solidFill>
                     <a:srgbClr val="000000"/>
                   </a:solidFill>
@@ -8980,7 +8981,7 @@
           <a:noFill/>
           <a:extLst>
             <a:ext uri="{909E8E84-426E-40dd-AFC4-6F175D3DCCD1}">
-              <a14:hiddenFill xmlns:a14="http://schemas.microsoft.com/office/drawing/2010/main" xmlns="">
+              <a14:hiddenFill xmlns="" xmlns:a14="http://schemas.microsoft.com/office/drawing/2010/main">
                 <a:solidFill>
                   <a:srgbClr val="FFFFFF"/>
                 </a:solidFill>
@@ -9054,7 +9055,7 @@
               </a:ln>
               <a:extLst>
                 <a:ext uri="{91240B29-F687-4f45-9708-019B960494DF}">
-                  <a14:hiddenLine xmlns:a14="http://schemas.microsoft.com/office/drawing/2010/main" xmlns="" w="9525">
+                  <a14:hiddenLine xmlns="" xmlns:a14="http://schemas.microsoft.com/office/drawing/2010/main" w="9525">
                     <a:solidFill>
                       <a:srgbClr val="000000"/>
                     </a:solidFill>
@@ -9144,7 +9145,7 @@
               </a:ln>
               <a:extLst>
                 <a:ext uri="{91240B29-F687-4f45-9708-019B960494DF}">
-                  <a14:hiddenLine xmlns:a14="http://schemas.microsoft.com/office/drawing/2010/main" xmlns="" w="9525">
+                  <a14:hiddenLine xmlns="" xmlns:a14="http://schemas.microsoft.com/office/drawing/2010/main" w="9525">
                     <a:solidFill>
                       <a:srgbClr val="000000"/>
                     </a:solidFill>
@@ -9234,7 +9235,7 @@
               </a:ln>
               <a:extLst>
                 <a:ext uri="{91240B29-F687-4f45-9708-019B960494DF}">
-                  <a14:hiddenLine xmlns:a14="http://schemas.microsoft.com/office/drawing/2010/main" xmlns="" w="9525">
+                  <a14:hiddenLine xmlns="" xmlns:a14="http://schemas.microsoft.com/office/drawing/2010/main" w="9525">
                     <a:solidFill>
                       <a:srgbClr val="000000"/>
                     </a:solidFill>
@@ -9296,7 +9297,7 @@
               </a:ln>
               <a:extLst>
                 <a:ext uri="{91240B29-F687-4f45-9708-019B960494DF}">
-                  <a14:hiddenLine xmlns:a14="http://schemas.microsoft.com/office/drawing/2010/main" xmlns="" w="9525">
+                  <a14:hiddenLine xmlns="" xmlns:a14="http://schemas.microsoft.com/office/drawing/2010/main" w="9525">
                     <a:solidFill>
                       <a:srgbClr val="000000"/>
                     </a:solidFill>
@@ -9386,7 +9387,7 @@
               </a:ln>
               <a:extLst>
                 <a:ext uri="{91240B29-F687-4f45-9708-019B960494DF}">
-                  <a14:hiddenLine xmlns:a14="http://schemas.microsoft.com/office/drawing/2010/main" xmlns="" w="9525">
+                  <a14:hiddenLine xmlns="" xmlns:a14="http://schemas.microsoft.com/office/drawing/2010/main" w="9525">
                     <a:solidFill>
                       <a:srgbClr val="000000"/>
                     </a:solidFill>
@@ -9448,7 +9449,7 @@
               </a:ln>
               <a:extLst>
                 <a:ext uri="{91240B29-F687-4f45-9708-019B960494DF}">
-                  <a14:hiddenLine xmlns:a14="http://schemas.microsoft.com/office/drawing/2010/main" xmlns="" w="9525">
+                  <a14:hiddenLine xmlns="" xmlns:a14="http://schemas.microsoft.com/office/drawing/2010/main" w="9525">
                     <a:solidFill>
                       <a:srgbClr val="000000"/>
                     </a:solidFill>
@@ -9510,7 +9511,7 @@
               </a:ln>
               <a:extLst>
                 <a:ext uri="{91240B29-F687-4f45-9708-019B960494DF}">
-                  <a14:hiddenLine xmlns:a14="http://schemas.microsoft.com/office/drawing/2010/main" xmlns="" w="9525">
+                  <a14:hiddenLine xmlns="" xmlns:a14="http://schemas.microsoft.com/office/drawing/2010/main" w="9525">
                     <a:solidFill>
                       <a:srgbClr val="000000"/>
                     </a:solidFill>
@@ -9600,7 +9601,7 @@
               </a:ln>
               <a:extLst>
                 <a:ext uri="{91240B29-F687-4f45-9708-019B960494DF}">
-                  <a14:hiddenLine xmlns:a14="http://schemas.microsoft.com/office/drawing/2010/main" xmlns="" w="9525">
+                  <a14:hiddenLine xmlns="" xmlns:a14="http://schemas.microsoft.com/office/drawing/2010/main" w="9525">
                     <a:solidFill>
                       <a:srgbClr val="000000"/>
                     </a:solidFill>
@@ -9690,7 +9691,7 @@
               </a:ln>
               <a:extLst>
                 <a:ext uri="{91240B29-F687-4f45-9708-019B960494DF}">
-                  <a14:hiddenLine xmlns:a14="http://schemas.microsoft.com/office/drawing/2010/main" xmlns="" w="9525">
+                  <a14:hiddenLine xmlns="" xmlns:a14="http://schemas.microsoft.com/office/drawing/2010/main" w="9525">
                     <a:solidFill>
                       <a:srgbClr val="000000"/>
                     </a:solidFill>
@@ -9752,7 +9753,7 @@
               </a:ln>
               <a:extLst>
                 <a:ext uri="{91240B29-F687-4f45-9708-019B960494DF}">
-                  <a14:hiddenLine xmlns:a14="http://schemas.microsoft.com/office/drawing/2010/main" xmlns="" w="9525">
+                  <a14:hiddenLine xmlns="" xmlns:a14="http://schemas.microsoft.com/office/drawing/2010/main" w="9525">
                     <a:solidFill>
                       <a:srgbClr val="000000"/>
                     </a:solidFill>
@@ -9862,7 +9863,7 @@
               </a:ln>
               <a:extLst>
                 <a:ext uri="{91240B29-F687-4f45-9708-019B960494DF}">
-                  <a14:hiddenLine xmlns:a14="http://schemas.microsoft.com/office/drawing/2010/main" xmlns="" w="9525">
+                  <a14:hiddenLine xmlns="" xmlns:a14="http://schemas.microsoft.com/office/drawing/2010/main" w="9525">
                     <a:solidFill>
                       <a:srgbClr val="000000"/>
                     </a:solidFill>
@@ -9946,7 +9947,7 @@
               </a:ln>
               <a:extLst>
                 <a:ext uri="{91240B29-F687-4f45-9708-019B960494DF}">
-                  <a14:hiddenLine xmlns:a14="http://schemas.microsoft.com/office/drawing/2010/main" xmlns="" w="9525">
+                  <a14:hiddenLine xmlns="" xmlns:a14="http://schemas.microsoft.com/office/drawing/2010/main" w="9525">
                     <a:solidFill>
                       <a:srgbClr val="000000"/>
                     </a:solidFill>
@@ -10008,7 +10009,7 @@
               </a:ln>
               <a:extLst>
                 <a:ext uri="{91240B29-F687-4f45-9708-019B960494DF}">
-                  <a14:hiddenLine xmlns:a14="http://schemas.microsoft.com/office/drawing/2010/main" xmlns="" w="9525">
+                  <a14:hiddenLine xmlns="" xmlns:a14="http://schemas.microsoft.com/office/drawing/2010/main" w="9525">
                     <a:solidFill>
                       <a:srgbClr val="000000"/>
                     </a:solidFill>
@@ -10070,7 +10071,7 @@
               </a:ln>
               <a:extLst>
                 <a:ext uri="{91240B29-F687-4f45-9708-019B960494DF}">
-                  <a14:hiddenLine xmlns:a14="http://schemas.microsoft.com/office/drawing/2010/main" xmlns="" w="9525">
+                  <a14:hiddenLine xmlns="" xmlns:a14="http://schemas.microsoft.com/office/drawing/2010/main" w="9525">
                     <a:solidFill>
                       <a:srgbClr val="000000"/>
                     </a:solidFill>
@@ -10160,7 +10161,7 @@
               </a:ln>
               <a:extLst>
                 <a:ext uri="{91240B29-F687-4f45-9708-019B960494DF}">
-                  <a14:hiddenLine xmlns:a14="http://schemas.microsoft.com/office/drawing/2010/main" xmlns="" w="9525">
+                  <a14:hiddenLine xmlns="" xmlns:a14="http://schemas.microsoft.com/office/drawing/2010/main" w="9525">
                     <a:solidFill>
                       <a:srgbClr val="000000"/>
                     </a:solidFill>
@@ -10194,7 +10195,7 @@
               </a:ln>
               <a:extLst>
                 <a:ext uri="{91240B29-F687-4f45-9708-019B960494DF}">
-                  <a14:hiddenLine xmlns:a14="http://schemas.microsoft.com/office/drawing/2010/main" xmlns="" w="9525">
+                  <a14:hiddenLine xmlns="" xmlns:a14="http://schemas.microsoft.com/office/drawing/2010/main" w="9525">
                     <a:solidFill>
                       <a:srgbClr val="000000"/>
                     </a:solidFill>
@@ -10259,7 +10260,7 @@
               </a:ln>
               <a:extLst>
                 <a:ext uri="{91240B29-F687-4f45-9708-019B960494DF}">
-                  <a14:hiddenLine xmlns:a14="http://schemas.microsoft.com/office/drawing/2010/main" xmlns="" w="9525">
+                  <a14:hiddenLine xmlns="" xmlns:a14="http://schemas.microsoft.com/office/drawing/2010/main" w="9525">
                     <a:solidFill>
                       <a:srgbClr val="000000"/>
                     </a:solidFill>
@@ -10349,7 +10350,7 @@
               </a:ln>
               <a:extLst>
                 <a:ext uri="{91240B29-F687-4f45-9708-019B960494DF}">
-                  <a14:hiddenLine xmlns:a14="http://schemas.microsoft.com/office/drawing/2010/main" xmlns="" w="9525">
+                  <a14:hiddenLine xmlns="" xmlns:a14="http://schemas.microsoft.com/office/drawing/2010/main" w="9525">
                     <a:solidFill>
                       <a:srgbClr val="000000"/>
                     </a:solidFill>
@@ -10411,7 +10412,7 @@
               </a:ln>
               <a:extLst>
                 <a:ext uri="{91240B29-F687-4f45-9708-019B960494DF}">
-                  <a14:hiddenLine xmlns:a14="http://schemas.microsoft.com/office/drawing/2010/main" xmlns="" w="9525">
+                  <a14:hiddenLine xmlns="" xmlns:a14="http://schemas.microsoft.com/office/drawing/2010/main" w="9525">
                     <a:solidFill>
                       <a:srgbClr val="000000"/>
                     </a:solidFill>
@@ -10501,7 +10502,7 @@
               </a:ln>
               <a:extLst>
                 <a:ext uri="{91240B29-F687-4f45-9708-019B960494DF}">
-                  <a14:hiddenLine xmlns:a14="http://schemas.microsoft.com/office/drawing/2010/main" xmlns="" w="9525">
+                  <a14:hiddenLine xmlns="" xmlns:a14="http://schemas.microsoft.com/office/drawing/2010/main" w="9525">
                     <a:solidFill>
                       <a:srgbClr val="000000"/>
                     </a:solidFill>
@@ -10566,7 +10567,7 @@
               </a:ln>
               <a:extLst>
                 <a:ext uri="{91240B29-F687-4f45-9708-019B960494DF}">
-                  <a14:hiddenLine xmlns:a14="http://schemas.microsoft.com/office/drawing/2010/main" xmlns="" w="9525">
+                  <a14:hiddenLine xmlns="" xmlns:a14="http://schemas.microsoft.com/office/drawing/2010/main" w="9525">
                     <a:solidFill>
                       <a:srgbClr val="000000"/>
                     </a:solidFill>
@@ -10628,7 +10629,7 @@
               </a:ln>
               <a:extLst>
                 <a:ext uri="{91240B29-F687-4f45-9708-019B960494DF}">
-                  <a14:hiddenLine xmlns:a14="http://schemas.microsoft.com/office/drawing/2010/main" xmlns="" w="9525">
+                  <a14:hiddenLine xmlns="" xmlns:a14="http://schemas.microsoft.com/office/drawing/2010/main" w="9525">
                     <a:solidFill>
                       <a:srgbClr val="000000"/>
                     </a:solidFill>
@@ -10718,7 +10719,7 @@
               </a:ln>
               <a:extLst>
                 <a:ext uri="{91240B29-F687-4f45-9708-019B960494DF}">
-                  <a14:hiddenLine xmlns:a14="http://schemas.microsoft.com/office/drawing/2010/main" xmlns="" w="9525">
+                  <a14:hiddenLine xmlns="" xmlns:a14="http://schemas.microsoft.com/office/drawing/2010/main" w="9525">
                     <a:solidFill>
                       <a:srgbClr val="000000"/>
                     </a:solidFill>
@@ -10808,7 +10809,7 @@
               </a:ln>
               <a:extLst>
                 <a:ext uri="{91240B29-F687-4f45-9708-019B960494DF}">
-                  <a14:hiddenLine xmlns:a14="http://schemas.microsoft.com/office/drawing/2010/main" xmlns="" w="9525">
+                  <a14:hiddenLine xmlns="" xmlns:a14="http://schemas.microsoft.com/office/drawing/2010/main" w="9525">
                     <a:solidFill>
                       <a:srgbClr val="000000"/>
                     </a:solidFill>
@@ -10873,7 +10874,7 @@
               </a:ln>
               <a:extLst>
                 <a:ext uri="{91240B29-F687-4f45-9708-019B960494DF}">
-                  <a14:hiddenLine xmlns:a14="http://schemas.microsoft.com/office/drawing/2010/main" xmlns="" w="9525">
+                  <a14:hiddenLine xmlns="" xmlns:a14="http://schemas.microsoft.com/office/drawing/2010/main" w="9525">
                     <a:solidFill>
                       <a:srgbClr val="000000"/>
                     </a:solidFill>
@@ -10993,7 +10994,7 @@
               </a:ln>
               <a:extLst>
                 <a:ext uri="{91240B29-F687-4f45-9708-019B960494DF}">
-                  <a14:hiddenLine xmlns:a14="http://schemas.microsoft.com/office/drawing/2010/main" xmlns="" w="9525">
+                  <a14:hiddenLine xmlns="" xmlns:a14="http://schemas.microsoft.com/office/drawing/2010/main" w="9525">
                     <a:solidFill>
                       <a:srgbClr val="000000"/>
                     </a:solidFill>
@@ -11091,7 +11092,7 @@
               </a:ln>
               <a:extLst>
                 <a:ext uri="{91240B29-F687-4f45-9708-019B960494DF}">
-                  <a14:hiddenLine xmlns:a14="http://schemas.microsoft.com/office/drawing/2010/main" xmlns="" w="9525">
+                  <a14:hiddenLine xmlns="" xmlns:a14="http://schemas.microsoft.com/office/drawing/2010/main" w="9525">
                     <a:solidFill>
                       <a:srgbClr val="000000"/>
                     </a:solidFill>
@@ -11206,7 +11207,7 @@
               </a:ln>
               <a:extLst>
                 <a:ext uri="{91240B29-F687-4f45-9708-019B960494DF}">
-                  <a14:hiddenLine xmlns:a14="http://schemas.microsoft.com/office/drawing/2010/main" xmlns="" w="9525">
+                  <a14:hiddenLine xmlns="" xmlns:a14="http://schemas.microsoft.com/office/drawing/2010/main" w="9525">
                     <a:solidFill>
                       <a:srgbClr val="000000"/>
                     </a:solidFill>
@@ -11296,7 +11297,7 @@
               </a:ln>
               <a:extLst>
                 <a:ext uri="{91240B29-F687-4f45-9708-019B960494DF}">
-                  <a14:hiddenLine xmlns:a14="http://schemas.microsoft.com/office/drawing/2010/main" xmlns="" w="9525">
+                  <a14:hiddenLine xmlns="" xmlns:a14="http://schemas.microsoft.com/office/drawing/2010/main" w="9525">
                     <a:solidFill>
                       <a:srgbClr val="000000"/>
                     </a:solidFill>
@@ -11361,7 +11362,7 @@
               </a:ln>
               <a:extLst>
                 <a:ext uri="{91240B29-F687-4f45-9708-019B960494DF}">
-                  <a14:hiddenLine xmlns:a14="http://schemas.microsoft.com/office/drawing/2010/main" xmlns="" w="9525">
+                  <a14:hiddenLine xmlns="" xmlns:a14="http://schemas.microsoft.com/office/drawing/2010/main" w="9525">
                     <a:solidFill>
                       <a:srgbClr val="000000"/>
                     </a:solidFill>
@@ -11451,7 +11452,7 @@
               </a:ln>
               <a:extLst>
                 <a:ext uri="{91240B29-F687-4f45-9708-019B960494DF}">
-                  <a14:hiddenLine xmlns:a14="http://schemas.microsoft.com/office/drawing/2010/main" xmlns="" w="9525">
+                  <a14:hiddenLine xmlns="" xmlns:a14="http://schemas.microsoft.com/office/drawing/2010/main" w="9525">
                     <a:solidFill>
                       <a:srgbClr val="000000"/>
                     </a:solidFill>
@@ -11519,7 +11520,7 @@
               </a:ln>
               <a:extLst>
                 <a:ext uri="{91240B29-F687-4f45-9708-019B960494DF}">
-                  <a14:hiddenLine xmlns:a14="http://schemas.microsoft.com/office/drawing/2010/main" xmlns="" w="9525">
+                  <a14:hiddenLine xmlns="" xmlns:a14="http://schemas.microsoft.com/office/drawing/2010/main" w="9525">
                     <a:solidFill>
                       <a:srgbClr val="000000"/>
                     </a:solidFill>
@@ -11609,7 +11610,7 @@
               </a:ln>
               <a:extLst>
                 <a:ext uri="{91240B29-F687-4f45-9708-019B960494DF}">
-                  <a14:hiddenLine xmlns:a14="http://schemas.microsoft.com/office/drawing/2010/main" xmlns="" w="9525">
+                  <a14:hiddenLine xmlns="" xmlns:a14="http://schemas.microsoft.com/office/drawing/2010/main" w="9525">
                     <a:solidFill>
                       <a:srgbClr val="000000"/>
                     </a:solidFill>
@@ -11677,7 +11678,7 @@
               </a:ln>
               <a:extLst>
                 <a:ext uri="{91240B29-F687-4f45-9708-019B960494DF}">
-                  <a14:hiddenLine xmlns:a14="http://schemas.microsoft.com/office/drawing/2010/main" xmlns="" w="9525">
+                  <a14:hiddenLine xmlns="" xmlns:a14="http://schemas.microsoft.com/office/drawing/2010/main" w="9525">
                     <a:solidFill>
                       <a:srgbClr val="000000"/>
                     </a:solidFill>
@@ -11767,7 +11768,7 @@
               </a:ln>
               <a:extLst>
                 <a:ext uri="{91240B29-F687-4f45-9708-019B960494DF}">
-                  <a14:hiddenLine xmlns:a14="http://schemas.microsoft.com/office/drawing/2010/main" xmlns="" w="9525">
+                  <a14:hiddenLine xmlns="" xmlns:a14="http://schemas.microsoft.com/office/drawing/2010/main" w="9525">
                     <a:solidFill>
                       <a:srgbClr val="000000"/>
                     </a:solidFill>
@@ -11801,7 +11802,7 @@
               </a:ln>
               <a:extLst>
                 <a:ext uri="{91240B29-F687-4f45-9708-019B960494DF}">
-                  <a14:hiddenLine xmlns:a14="http://schemas.microsoft.com/office/drawing/2010/main" xmlns="" w="9525">
+                  <a14:hiddenLine xmlns="" xmlns:a14="http://schemas.microsoft.com/office/drawing/2010/main" w="9525">
                     <a:solidFill>
                       <a:srgbClr val="000000"/>
                     </a:solidFill>
@@ -12572,6 +12573,319 @@
           <a:p>
             <a:r>
               <a:rPr lang="en-US" dirty="0"/>
+              <a:t>Use case descriptions – Admin</a:t>
+            </a:r>
+          </a:p>
+        </p:txBody>
+      </p:sp>
+      <p:graphicFrame>
+        <p:nvGraphicFramePr>
+          <p:cNvPr id="6" name="Content Placeholder 5">
+            <a:extLst>
+              <a:ext uri="{FF2B5EF4-FFF2-40B4-BE49-F238E27FC236}">
+                <a16:creationId xmlns:a16="http://schemas.microsoft.com/office/drawing/2014/main" id="{79534DFA-F0ED-4EB8-9730-D5C3B65E2031}"/>
+              </a:ext>
+            </a:extLst>
+          </p:cNvPr>
+          <p:cNvGraphicFramePr>
+            <a:graphicFrameLocks noGrp="1"/>
+          </p:cNvGraphicFramePr>
+          <p:nvPr>
+            <p:ph idx="1"/>
+            <p:extLst>
+              <p:ext uri="{D42A27DB-BD31-4B8C-83A1-F6EECF244321}">
+                <p14:modId xmlns:p14="http://schemas.microsoft.com/office/powerpoint/2010/main" val="187355002"/>
+              </p:ext>
+            </p:extLst>
+          </p:nvPr>
+        </p:nvGraphicFramePr>
+        <p:xfrm>
+          <a:off x="967410" y="1643063"/>
+          <a:ext cx="10283686" cy="3261360"/>
+        </p:xfrm>
+        <a:graphic>
+          <a:graphicData uri="http://schemas.openxmlformats.org/drawingml/2006/table">
+            <a:tbl>
+              <a:tblPr firstRow="1" bandRow="1">
+                <a:tableStyleId>{5C22544A-7EE6-4342-B048-85BDC9FD1C3A}</a:tableStyleId>
+              </a:tblPr>
+              <a:tblGrid>
+                <a:gridCol w="649355">
+                  <a:extLst>
+                    <a:ext uri="{9D8B030D-6E8A-4147-A177-3AD203B41FA5}">
+                      <a16:colId xmlns:a16="http://schemas.microsoft.com/office/drawing/2014/main" val="1656889719"/>
+                    </a:ext>
+                  </a:extLst>
+                </a:gridCol>
+                <a:gridCol w="3657600">
+                  <a:extLst>
+                    <a:ext uri="{9D8B030D-6E8A-4147-A177-3AD203B41FA5}">
+                      <a16:colId xmlns:a16="http://schemas.microsoft.com/office/drawing/2014/main" val="2613002775"/>
+                    </a:ext>
+                  </a:extLst>
+                </a:gridCol>
+                <a:gridCol w="1386834">
+                  <a:extLst>
+                    <a:ext uri="{9D8B030D-6E8A-4147-A177-3AD203B41FA5}">
+                      <a16:colId xmlns:a16="http://schemas.microsoft.com/office/drawing/2014/main" val="3209742257"/>
+                    </a:ext>
+                  </a:extLst>
+                </a:gridCol>
+                <a:gridCol w="4589897">
+                  <a:extLst>
+                    <a:ext uri="{9D8B030D-6E8A-4147-A177-3AD203B41FA5}">
+                      <a16:colId xmlns:a16="http://schemas.microsoft.com/office/drawing/2014/main" val="1679887175"/>
+                    </a:ext>
+                  </a:extLst>
+                </a:gridCol>
+              </a:tblGrid>
+              <a:tr h="370840">
+                <a:tc>
+                  <a:txBody>
+                    <a:bodyPr/>
+                    <a:lstStyle/>
+                    <a:p>
+                      <a:pPr algn="ctr"/>
+                      <a:r>
+                        <a:rPr lang="en-US" sz="2800" dirty="0"/>
+                        <a:t>No</a:t>
+                      </a:r>
+                    </a:p>
+                  </a:txBody>
+                  <a:tcPr/>
+                </a:tc>
+                <a:tc>
+                  <a:txBody>
+                    <a:bodyPr/>
+                    <a:lstStyle/>
+                    <a:p>
+                      <a:pPr algn="ctr"/>
+                      <a:r>
+                        <a:rPr lang="en-US" sz="2800" dirty="0"/>
+                        <a:t>Use Case</a:t>
+                      </a:r>
+                    </a:p>
+                  </a:txBody>
+                  <a:tcPr/>
+                </a:tc>
+                <a:tc>
+                  <a:txBody>
+                    <a:bodyPr/>
+                    <a:lstStyle/>
+                    <a:p>
+                      <a:pPr algn="ctr"/>
+                      <a:r>
+                        <a:rPr lang="en-US" sz="2800" dirty="0"/>
+                        <a:t>Priority</a:t>
+                      </a:r>
+                    </a:p>
+                  </a:txBody>
+                  <a:tcPr/>
+                </a:tc>
+                <a:tc>
+                  <a:txBody>
+                    <a:bodyPr/>
+                    <a:lstStyle/>
+                    <a:p>
+                      <a:pPr algn="ctr"/>
+                      <a:r>
+                        <a:rPr lang="en-US" sz="2800" dirty="0"/>
+                        <a:t>Description</a:t>
+                      </a:r>
+                    </a:p>
+                  </a:txBody>
+                  <a:tcPr/>
+                </a:tc>
+                <a:extLst>
+                  <a:ext uri="{0D108BD9-81ED-4DB2-BD59-A6C34878D82A}">
+                    <a16:rowId xmlns:a16="http://schemas.microsoft.com/office/drawing/2014/main" val="1260802174"/>
+                  </a:ext>
+                </a:extLst>
+              </a:tr>
+              <a:tr h="370840">
+                <a:tc>
+                  <a:txBody>
+                    <a:bodyPr/>
+                    <a:lstStyle/>
+                    <a:p>
+                      <a:pPr algn="r"/>
+                      <a:r>
+                        <a:rPr lang="en-US" sz="2800" dirty="0"/>
+                        <a:t>1</a:t>
+                      </a:r>
+                    </a:p>
+                  </a:txBody>
+                  <a:tcPr/>
+                </a:tc>
+                <a:tc>
+                  <a:txBody>
+                    <a:bodyPr/>
+                    <a:lstStyle/>
+                    <a:p>
+                      <a:r>
+                        <a:rPr lang="en-US" sz="2800" dirty="0"/>
+                        <a:t>View and Approve Car Owner application</a:t>
+                      </a:r>
+                    </a:p>
+                  </a:txBody>
+                  <a:tcPr/>
+                </a:tc>
+                <a:tc>
+                  <a:txBody>
+                    <a:bodyPr/>
+                    <a:lstStyle/>
+                    <a:p>
+                      <a:pPr algn="ctr"/>
+                      <a:r>
+                        <a:rPr lang="en-US" sz="2800" dirty="0"/>
+                        <a:t>1</a:t>
+                      </a:r>
+                    </a:p>
+                  </a:txBody>
+                  <a:tcPr/>
+                </a:tc>
+                <a:tc>
+                  <a:txBody>
+                    <a:bodyPr/>
+                    <a:lstStyle/>
+                    <a:p>
+                      <a:r>
+                        <a:rPr lang="en-US" sz="2800" dirty="0"/>
+                        <a:t>Admin can view and approve pending Car Owner application</a:t>
+                      </a:r>
+                    </a:p>
+                  </a:txBody>
+                  <a:tcPr/>
+                </a:tc>
+                <a:extLst>
+                  <a:ext uri="{0D108BD9-81ED-4DB2-BD59-A6C34878D82A}">
+                    <a16:rowId xmlns:a16="http://schemas.microsoft.com/office/drawing/2014/main" val="4282141431"/>
+                  </a:ext>
+                </a:extLst>
+              </a:tr>
+              <a:tr h="370840">
+                <a:tc>
+                  <a:txBody>
+                    <a:bodyPr/>
+                    <a:lstStyle/>
+                    <a:p>
+                      <a:pPr algn="r"/>
+                      <a:r>
+                        <a:rPr lang="en-US" sz="2800" dirty="0"/>
+                        <a:t>2</a:t>
+                      </a:r>
+                    </a:p>
+                  </a:txBody>
+                  <a:tcPr/>
+                </a:tc>
+                <a:tc>
+                  <a:txBody>
+                    <a:bodyPr/>
+                    <a:lstStyle/>
+                    <a:p>
+                      <a:r>
+                        <a:rPr lang="en-US" sz="2800" dirty="0"/>
+                        <a:t>View and approve Car registration and Car rental price offer</a:t>
+                      </a:r>
+                    </a:p>
+                  </a:txBody>
+                  <a:tcPr/>
+                </a:tc>
+                <a:tc>
+                  <a:txBody>
+                    <a:bodyPr/>
+                    <a:lstStyle/>
+                    <a:p>
+                      <a:pPr algn="ctr"/>
+                      <a:r>
+                        <a:rPr lang="en-US" sz="2800" dirty="0"/>
+                        <a:t>1</a:t>
+                      </a:r>
+                    </a:p>
+                  </a:txBody>
+                  <a:tcPr/>
+                </a:tc>
+                <a:tc>
+                  <a:txBody>
+                    <a:bodyPr/>
+                    <a:lstStyle/>
+                    <a:p>
+                      <a:r>
+                        <a:rPr lang="en-US" sz="2800" dirty="0"/>
+                        <a:t>Car Owner can view and approve Car and rental price offer of Car Owner</a:t>
+                      </a:r>
+                    </a:p>
+                  </a:txBody>
+                  <a:tcPr/>
+                </a:tc>
+                <a:extLst>
+                  <a:ext uri="{0D108BD9-81ED-4DB2-BD59-A6C34878D82A}">
+                    <a16:rowId xmlns:a16="http://schemas.microsoft.com/office/drawing/2014/main" val="4092894426"/>
+                  </a:ext>
+                </a:extLst>
+              </a:tr>
+            </a:tbl>
+          </a:graphicData>
+        </a:graphic>
+      </p:graphicFrame>
+    </p:spTree>
+    <p:extLst>
+      <p:ext uri="{BB962C8B-B14F-4D97-AF65-F5344CB8AC3E}">
+        <p14:creationId xmlns:p14="http://schemas.microsoft.com/office/powerpoint/2010/main" val="522995816"/>
+      </p:ext>
+    </p:extLst>
+  </p:cSld>
+  <p:clrMapOvr>
+    <a:masterClrMapping/>
+  </p:clrMapOvr>
+</p:sld>
+</file>
+
+<file path=ppt/slides/slide11.xml><?xml version="1.0" encoding="utf-8"?>
+<p:sld xmlns:a="http://schemas.openxmlformats.org/drawingml/2006/main" xmlns:r="http://schemas.openxmlformats.org/officeDocument/2006/relationships" xmlns:p="http://schemas.openxmlformats.org/presentationml/2006/main">
+  <p:cSld>
+    <p:spTree>
+      <p:nvGrpSpPr>
+        <p:cNvPr id="1" name=""/>
+        <p:cNvGrpSpPr/>
+        <p:nvPr/>
+      </p:nvGrpSpPr>
+      <p:grpSpPr>
+        <a:xfrm>
+          <a:off x="0" y="0"/>
+          <a:ext cx="0" cy="0"/>
+          <a:chOff x="0" y="0"/>
+          <a:chExt cx="0" cy="0"/>
+        </a:xfrm>
+      </p:grpSpPr>
+      <p:sp>
+        <p:nvSpPr>
+          <p:cNvPr id="2" name="Title 1">
+            <a:extLst>
+              <a:ext uri="{FF2B5EF4-FFF2-40B4-BE49-F238E27FC236}">
+                <a16:creationId xmlns:a16="http://schemas.microsoft.com/office/drawing/2014/main" id="{271F5404-3E55-40A9-B153-40E7852200CE}"/>
+              </a:ext>
+            </a:extLst>
+          </p:cNvPr>
+          <p:cNvSpPr>
+            <a:spLocks noGrp="1"/>
+          </p:cNvSpPr>
+          <p:nvPr>
+            <p:ph type="title"/>
+          </p:nvPr>
+        </p:nvSpPr>
+        <p:spPr>
+          <a:xfrm>
+            <a:off x="1141413" y="618518"/>
+            <a:ext cx="9905998" cy="719952"/>
+          </a:xfrm>
+        </p:spPr>
+        <p:txBody>
+          <a:bodyPr/>
+          <a:lstStyle/>
+          <a:p>
+            <a:r>
+              <a:rPr lang="en-US" dirty="0"/>
               <a:t>Use case descriptions – Customer</a:t>
             </a:r>
           </a:p>
@@ -12901,7 +13215,7 @@
 </p:sld>
 </file>
 
-<file path=ppt/slides/slide11.xml><?xml version="1.0" encoding="utf-8"?>
+<file path=ppt/slides/slide12.xml><?xml version="1.0" encoding="utf-8"?>
 <p:sld xmlns:a="http://schemas.openxmlformats.org/drawingml/2006/main" xmlns:r="http://schemas.openxmlformats.org/officeDocument/2006/relationships" xmlns:p="http://schemas.openxmlformats.org/presentationml/2006/main">
   <p:cSld>
     <p:spTree>
@@ -13086,6 +13400,16 @@
             </a:pPr>
             <a:r>
               <a:rPr lang="en-US" dirty="0"/>
+              <a:t>Aha Solution</a:t>
+            </a:r>
+          </a:p>
+          <a:p>
+            <a:pPr marL="457200" indent="-457200">
+              <a:buFont typeface="+mj-lt"/>
+              <a:buAutoNum type="arabicPeriod"/>
+            </a:pPr>
+            <a:r>
+              <a:rPr lang="en-US" dirty="0"/>
               <a:t>Some Comparisons</a:t>
             </a:r>
           </a:p>
@@ -13280,6 +13604,129 @@
 </file>
 
 <file path=ppt/slides/slide4.xml><?xml version="1.0" encoding="utf-8"?>
+<p:sld xmlns:a="http://schemas.openxmlformats.org/drawingml/2006/main" xmlns:r="http://schemas.openxmlformats.org/officeDocument/2006/relationships" xmlns:p="http://schemas.openxmlformats.org/presentationml/2006/main">
+  <p:cSld>
+    <p:spTree>
+      <p:nvGrpSpPr>
+        <p:cNvPr id="1" name=""/>
+        <p:cNvGrpSpPr/>
+        <p:nvPr/>
+      </p:nvGrpSpPr>
+      <p:grpSpPr>
+        <a:xfrm>
+          <a:off x="0" y="0"/>
+          <a:ext cx="0" cy="0"/>
+          <a:chOff x="0" y="0"/>
+          <a:chExt cx="0" cy="0"/>
+        </a:xfrm>
+      </p:grpSpPr>
+      <p:sp>
+        <p:nvSpPr>
+          <p:cNvPr id="2" name="Title 1">
+            <a:extLst>
+              <a:ext uri="{FF2B5EF4-FFF2-40B4-BE49-F238E27FC236}">
+                <a16:creationId xmlns:a16="http://schemas.microsoft.com/office/drawing/2014/main" id="{271F5404-3E55-40A9-B153-40E7852200CE}"/>
+              </a:ext>
+            </a:extLst>
+          </p:cNvPr>
+          <p:cNvSpPr>
+            <a:spLocks noGrp="1"/>
+          </p:cNvSpPr>
+          <p:nvPr>
+            <p:ph type="title"/>
+          </p:nvPr>
+        </p:nvSpPr>
+        <p:spPr>
+          <a:xfrm>
+            <a:off x="1141413" y="618518"/>
+            <a:ext cx="9905998" cy="719952"/>
+          </a:xfrm>
+        </p:spPr>
+        <p:txBody>
+          <a:bodyPr/>
+          <a:lstStyle/>
+          <a:p>
+            <a:r>
+              <a:rPr lang="en-US" dirty="0"/>
+              <a:t>Aha solution</a:t>
+            </a:r>
+          </a:p>
+        </p:txBody>
+      </p:sp>
+      <p:sp>
+        <p:nvSpPr>
+          <p:cNvPr id="3" name="Content Placeholder 2">
+            <a:extLst>
+              <a:ext uri="{FF2B5EF4-FFF2-40B4-BE49-F238E27FC236}">
+                <a16:creationId xmlns:a16="http://schemas.microsoft.com/office/drawing/2014/main" id="{533976F8-B8EC-44C8-9E41-D33BA4BC6F9A}"/>
+              </a:ext>
+            </a:extLst>
+          </p:cNvPr>
+          <p:cNvSpPr>
+            <a:spLocks noGrp="1"/>
+          </p:cNvSpPr>
+          <p:nvPr>
+            <p:ph idx="1"/>
+          </p:nvPr>
+        </p:nvSpPr>
+        <p:spPr>
+          <a:xfrm>
+            <a:off x="1141412" y="1643270"/>
+            <a:ext cx="9905999" cy="4147931"/>
+          </a:xfrm>
+        </p:spPr>
+        <p:txBody>
+          <a:bodyPr>
+            <a:normAutofit/>
+          </a:bodyPr>
+          <a:lstStyle/>
+          <a:p>
+            <a:r>
+              <a:rPr lang="en-US" sz="2800" dirty="0"/>
+              <a:t>Like a traditional way but with low investment</a:t>
+            </a:r>
+          </a:p>
+          <a:p>
+            <a:r>
+              <a:rPr lang="en-US" sz="2800" dirty="0"/>
+              <a:t>Efficiency managing vehicles by maximizing the utilization of un-used or less-used cars</a:t>
+            </a:r>
+          </a:p>
+          <a:p>
+            <a:r>
+              <a:rPr lang="en-US" sz="2800" dirty="0"/>
+              <a:t>Create better services and reduce rental cost</a:t>
+            </a:r>
+          </a:p>
+          <a:p>
+            <a:pPr lvl="1"/>
+            <a:r>
+              <a:rPr lang="en-US" sz="2400" dirty="0"/>
+              <a:t>By improving rental process</a:t>
+            </a:r>
+          </a:p>
+          <a:p>
+            <a:r>
+              <a:rPr lang="en-US" sz="2800" dirty="0"/>
+              <a:t>Better managing users or customer</a:t>
+            </a:r>
+          </a:p>
+        </p:txBody>
+      </p:sp>
+    </p:spTree>
+    <p:extLst>
+      <p:ext uri="{BB962C8B-B14F-4D97-AF65-F5344CB8AC3E}">
+        <p14:creationId xmlns:p14="http://schemas.microsoft.com/office/powerpoint/2010/main" val="3604358542"/>
+      </p:ext>
+    </p:extLst>
+  </p:cSld>
+  <p:clrMapOvr>
+    <a:masterClrMapping/>
+  </p:clrMapOvr>
+</p:sld>
+</file>
+
+<file path=ppt/slides/slide5.xml><?xml version="1.0" encoding="utf-8"?>
 <p:sld xmlns:a="http://schemas.openxmlformats.org/drawingml/2006/main" xmlns:r="http://schemas.openxmlformats.org/officeDocument/2006/relationships" xmlns:p="http://schemas.openxmlformats.org/presentationml/2006/main">
   <p:cSld>
     <p:spTree>
@@ -13549,132 +13996,6 @@
 </p:sld>
 </file>
 
-<file path=ppt/slides/slide5.xml><?xml version="1.0" encoding="utf-8"?>
-<p:sld xmlns:a="http://schemas.openxmlformats.org/drawingml/2006/main" xmlns:r="http://schemas.openxmlformats.org/officeDocument/2006/relationships" xmlns:p="http://schemas.openxmlformats.org/presentationml/2006/main">
-  <p:cSld>
-    <p:spTree>
-      <p:nvGrpSpPr>
-        <p:cNvPr id="1" name=""/>
-        <p:cNvGrpSpPr/>
-        <p:nvPr/>
-      </p:nvGrpSpPr>
-      <p:grpSpPr>
-        <a:xfrm>
-          <a:off x="0" y="0"/>
-          <a:ext cx="0" cy="0"/>
-          <a:chOff x="0" y="0"/>
-          <a:chExt cx="0" cy="0"/>
-        </a:xfrm>
-      </p:grpSpPr>
-      <p:sp>
-        <p:nvSpPr>
-          <p:cNvPr id="2" name="Title 1">
-            <a:extLst>
-              <a:ext uri="{FF2B5EF4-FFF2-40B4-BE49-F238E27FC236}">
-                <a16:creationId xmlns:a16="http://schemas.microsoft.com/office/drawing/2014/main" id="{271F5404-3E55-40A9-B153-40E7852200CE}"/>
-              </a:ext>
-            </a:extLst>
-          </p:cNvPr>
-          <p:cNvSpPr>
-            <a:spLocks noGrp="1"/>
-          </p:cNvSpPr>
-          <p:nvPr>
-            <p:ph type="title"/>
-          </p:nvPr>
-        </p:nvSpPr>
-        <p:spPr>
-          <a:xfrm>
-            <a:off x="1141413" y="618518"/>
-            <a:ext cx="9905998" cy="719952"/>
-          </a:xfrm>
-        </p:spPr>
-        <p:txBody>
-          <a:bodyPr/>
-          <a:lstStyle/>
-          <a:p>
-            <a:r>
-              <a:rPr lang="en-US" dirty="0"/>
-              <a:t>Use case model – Car owner</a:t>
-            </a:r>
-          </a:p>
-        </p:txBody>
-      </p:sp>
-      <p:sp>
-        <p:nvSpPr>
-          <p:cNvPr id="3" name="Content Placeholder 2">
-            <a:extLst>
-              <a:ext uri="{FF2B5EF4-FFF2-40B4-BE49-F238E27FC236}">
-                <a16:creationId xmlns:a16="http://schemas.microsoft.com/office/drawing/2014/main" id="{533976F8-B8EC-44C8-9E41-D33BA4BC6F9A}"/>
-              </a:ext>
-            </a:extLst>
-          </p:cNvPr>
-          <p:cNvSpPr>
-            <a:spLocks noGrp="1"/>
-          </p:cNvSpPr>
-          <p:nvPr>
-            <p:ph idx="1"/>
-          </p:nvPr>
-        </p:nvSpPr>
-        <p:spPr>
-          <a:xfrm>
-            <a:off x="1141412" y="1643270"/>
-            <a:ext cx="9905999" cy="4147931"/>
-          </a:xfrm>
-        </p:spPr>
-        <p:txBody>
-          <a:bodyPr/>
-          <a:lstStyle/>
-          <a:p>
-            <a:pPr marL="0" indent="0">
-              <a:buNone/>
-            </a:pPr>
-            <a:endParaRPr lang="en-US" dirty="0"/>
-          </a:p>
-        </p:txBody>
-      </p:sp>
-      <p:pic>
-        <p:nvPicPr>
-          <p:cNvPr id="5" name="Picture 4">
-            <a:extLst>
-              <a:ext uri="{FF2B5EF4-FFF2-40B4-BE49-F238E27FC236}">
-                <a16:creationId xmlns:a16="http://schemas.microsoft.com/office/drawing/2014/main" id="{7354015E-DC29-4DCB-90AA-D601B76D37B0}"/>
-              </a:ext>
-            </a:extLst>
-          </p:cNvPr>
-          <p:cNvPicPr>
-            <a:picLocks noChangeAspect="1"/>
-          </p:cNvPicPr>
-          <p:nvPr/>
-        </p:nvPicPr>
-        <p:blipFill>
-          <a:blip r:embed="rId2"/>
-          <a:stretch>
-            <a:fillRect/>
-          </a:stretch>
-        </p:blipFill>
-        <p:spPr>
-          <a:xfrm>
-            <a:off x="2766070" y="1643270"/>
-            <a:ext cx="6656682" cy="4293704"/>
-          </a:xfrm>
-          <a:prstGeom prst="rect">
-            <a:avLst/>
-          </a:prstGeom>
-        </p:spPr>
-      </p:pic>
-    </p:spTree>
-    <p:extLst>
-      <p:ext uri="{BB962C8B-B14F-4D97-AF65-F5344CB8AC3E}">
-        <p14:creationId xmlns:p14="http://schemas.microsoft.com/office/powerpoint/2010/main" val="2256354360"/>
-      </p:ext>
-    </p:extLst>
-  </p:cSld>
-  <p:clrMapOvr>
-    <a:masterClrMapping/>
-  </p:clrMapOvr>
-</p:sld>
-</file>
-
 <file path=ppt/slides/slide6.xml><?xml version="1.0" encoding="utf-8"?>
 <p:sld xmlns:a="http://schemas.openxmlformats.org/drawingml/2006/main" xmlns:r="http://schemas.openxmlformats.org/officeDocument/2006/relationships" xmlns:p="http://schemas.openxmlformats.org/presentationml/2006/main">
   <p:cSld>
@@ -13720,7 +14041,7 @@
           <a:p>
             <a:r>
               <a:rPr lang="en-US" dirty="0"/>
-              <a:t>Use case model – Admin</a:t>
+              <a:t>Use case model – Car owner</a:t>
             </a:r>
           </a:p>
         </p:txBody>
@@ -13763,7 +14084,7 @@
           <p:cNvPr id="5" name="Picture 4">
             <a:extLst>
               <a:ext uri="{FF2B5EF4-FFF2-40B4-BE49-F238E27FC236}">
-                <a16:creationId xmlns:a16="http://schemas.microsoft.com/office/drawing/2014/main" id="{31962F3A-3BE6-450D-8BEC-DAA5E2AEF04F}"/>
+                <a16:creationId xmlns:a16="http://schemas.microsoft.com/office/drawing/2014/main" id="{7354015E-DC29-4DCB-90AA-D601B76D37B0}"/>
               </a:ext>
             </a:extLst>
           </p:cNvPr>
@@ -13780,8 +14101,8 @@
         </p:blipFill>
         <p:spPr>
           <a:xfrm>
-            <a:off x="2694126" y="1643269"/>
-            <a:ext cx="6991406" cy="4280453"/>
+            <a:off x="2766070" y="1643270"/>
+            <a:ext cx="6656682" cy="4293704"/>
           </a:xfrm>
           <a:prstGeom prst="rect">
             <a:avLst/>
@@ -13791,7 +14112,7 @@
     </p:spTree>
     <p:extLst>
       <p:ext uri="{BB962C8B-B14F-4D97-AF65-F5344CB8AC3E}">
-        <p14:creationId xmlns:p14="http://schemas.microsoft.com/office/powerpoint/2010/main" val="1515106765"/>
+        <p14:creationId xmlns:p14="http://schemas.microsoft.com/office/powerpoint/2010/main" val="2256354360"/>
       </p:ext>
     </p:extLst>
   </p:cSld>
@@ -13846,6 +14167,132 @@
           <a:p>
             <a:r>
               <a:rPr lang="en-US" dirty="0"/>
+              <a:t>Use case model – Admin</a:t>
+            </a:r>
+          </a:p>
+        </p:txBody>
+      </p:sp>
+      <p:sp>
+        <p:nvSpPr>
+          <p:cNvPr id="3" name="Content Placeholder 2">
+            <a:extLst>
+              <a:ext uri="{FF2B5EF4-FFF2-40B4-BE49-F238E27FC236}">
+                <a16:creationId xmlns:a16="http://schemas.microsoft.com/office/drawing/2014/main" id="{533976F8-B8EC-44C8-9E41-D33BA4BC6F9A}"/>
+              </a:ext>
+            </a:extLst>
+          </p:cNvPr>
+          <p:cNvSpPr>
+            <a:spLocks noGrp="1"/>
+          </p:cNvSpPr>
+          <p:nvPr>
+            <p:ph idx="1"/>
+          </p:nvPr>
+        </p:nvSpPr>
+        <p:spPr>
+          <a:xfrm>
+            <a:off x="1141412" y="1643270"/>
+            <a:ext cx="9905999" cy="4147931"/>
+          </a:xfrm>
+        </p:spPr>
+        <p:txBody>
+          <a:bodyPr/>
+          <a:lstStyle/>
+          <a:p>
+            <a:pPr marL="0" indent="0">
+              <a:buNone/>
+            </a:pPr>
+            <a:endParaRPr lang="en-US" dirty="0"/>
+          </a:p>
+        </p:txBody>
+      </p:sp>
+      <p:pic>
+        <p:nvPicPr>
+          <p:cNvPr id="5" name="Picture 4">
+            <a:extLst>
+              <a:ext uri="{FF2B5EF4-FFF2-40B4-BE49-F238E27FC236}">
+                <a16:creationId xmlns:a16="http://schemas.microsoft.com/office/drawing/2014/main" id="{31962F3A-3BE6-450D-8BEC-DAA5E2AEF04F}"/>
+              </a:ext>
+            </a:extLst>
+          </p:cNvPr>
+          <p:cNvPicPr>
+            <a:picLocks noChangeAspect="1"/>
+          </p:cNvPicPr>
+          <p:nvPr/>
+        </p:nvPicPr>
+        <p:blipFill>
+          <a:blip r:embed="rId2"/>
+          <a:stretch>
+            <a:fillRect/>
+          </a:stretch>
+        </p:blipFill>
+        <p:spPr>
+          <a:xfrm>
+            <a:off x="2694126" y="1643269"/>
+            <a:ext cx="6991406" cy="4280453"/>
+          </a:xfrm>
+          <a:prstGeom prst="rect">
+            <a:avLst/>
+          </a:prstGeom>
+        </p:spPr>
+      </p:pic>
+    </p:spTree>
+    <p:extLst>
+      <p:ext uri="{BB962C8B-B14F-4D97-AF65-F5344CB8AC3E}">
+        <p14:creationId xmlns:p14="http://schemas.microsoft.com/office/powerpoint/2010/main" val="1515106765"/>
+      </p:ext>
+    </p:extLst>
+  </p:cSld>
+  <p:clrMapOvr>
+    <a:masterClrMapping/>
+  </p:clrMapOvr>
+</p:sld>
+</file>
+
+<file path=ppt/slides/slide8.xml><?xml version="1.0" encoding="utf-8"?>
+<p:sld xmlns:a="http://schemas.openxmlformats.org/drawingml/2006/main" xmlns:r="http://schemas.openxmlformats.org/officeDocument/2006/relationships" xmlns:p="http://schemas.openxmlformats.org/presentationml/2006/main">
+  <p:cSld>
+    <p:spTree>
+      <p:nvGrpSpPr>
+        <p:cNvPr id="1" name=""/>
+        <p:cNvGrpSpPr/>
+        <p:nvPr/>
+      </p:nvGrpSpPr>
+      <p:grpSpPr>
+        <a:xfrm>
+          <a:off x="0" y="0"/>
+          <a:ext cx="0" cy="0"/>
+          <a:chOff x="0" y="0"/>
+          <a:chExt cx="0" cy="0"/>
+        </a:xfrm>
+      </p:grpSpPr>
+      <p:sp>
+        <p:nvSpPr>
+          <p:cNvPr id="2" name="Title 1">
+            <a:extLst>
+              <a:ext uri="{FF2B5EF4-FFF2-40B4-BE49-F238E27FC236}">
+                <a16:creationId xmlns:a16="http://schemas.microsoft.com/office/drawing/2014/main" id="{271F5404-3E55-40A9-B153-40E7852200CE}"/>
+              </a:ext>
+            </a:extLst>
+          </p:cNvPr>
+          <p:cNvSpPr>
+            <a:spLocks noGrp="1"/>
+          </p:cNvSpPr>
+          <p:nvPr>
+            <p:ph type="title"/>
+          </p:nvPr>
+        </p:nvSpPr>
+        <p:spPr>
+          <a:xfrm>
+            <a:off x="1141413" y="618518"/>
+            <a:ext cx="9905998" cy="719952"/>
+          </a:xfrm>
+        </p:spPr>
+        <p:txBody>
+          <a:bodyPr/>
+          <a:lstStyle/>
+          <a:p>
+            <a:r>
+              <a:rPr lang="en-US" dirty="0"/>
               <a:t>Use case model – Customer</a:t>
             </a:r>
           </a:p>
@@ -13927,7 +14374,7 @@
 </p:sld>
 </file>
 
-<file path=ppt/slides/slide8.xml><?xml version="1.0" encoding="utf-8"?>
+<file path=ppt/slides/slide9.xml><?xml version="1.0" encoding="utf-8"?>
 <p:sld xmlns:a="http://schemas.openxmlformats.org/drawingml/2006/main" xmlns:r="http://schemas.openxmlformats.org/officeDocument/2006/relationships" xmlns:p="http://schemas.openxmlformats.org/presentationml/2006/main">
   <p:cSld>
     <p:spTree>
@@ -14240,319 +14687,6 @@
 </p:sld>
 </file>
 
-<file path=ppt/slides/slide9.xml><?xml version="1.0" encoding="utf-8"?>
-<p:sld xmlns:a="http://schemas.openxmlformats.org/drawingml/2006/main" xmlns:r="http://schemas.openxmlformats.org/officeDocument/2006/relationships" xmlns:p="http://schemas.openxmlformats.org/presentationml/2006/main">
-  <p:cSld>
-    <p:spTree>
-      <p:nvGrpSpPr>
-        <p:cNvPr id="1" name=""/>
-        <p:cNvGrpSpPr/>
-        <p:nvPr/>
-      </p:nvGrpSpPr>
-      <p:grpSpPr>
-        <a:xfrm>
-          <a:off x="0" y="0"/>
-          <a:ext cx="0" cy="0"/>
-          <a:chOff x="0" y="0"/>
-          <a:chExt cx="0" cy="0"/>
-        </a:xfrm>
-      </p:grpSpPr>
-      <p:sp>
-        <p:nvSpPr>
-          <p:cNvPr id="2" name="Title 1">
-            <a:extLst>
-              <a:ext uri="{FF2B5EF4-FFF2-40B4-BE49-F238E27FC236}">
-                <a16:creationId xmlns:a16="http://schemas.microsoft.com/office/drawing/2014/main" id="{271F5404-3E55-40A9-B153-40E7852200CE}"/>
-              </a:ext>
-            </a:extLst>
-          </p:cNvPr>
-          <p:cNvSpPr>
-            <a:spLocks noGrp="1"/>
-          </p:cNvSpPr>
-          <p:nvPr>
-            <p:ph type="title"/>
-          </p:nvPr>
-        </p:nvSpPr>
-        <p:spPr>
-          <a:xfrm>
-            <a:off x="1141413" y="618518"/>
-            <a:ext cx="9905998" cy="719952"/>
-          </a:xfrm>
-        </p:spPr>
-        <p:txBody>
-          <a:bodyPr/>
-          <a:lstStyle/>
-          <a:p>
-            <a:r>
-              <a:rPr lang="en-US" dirty="0"/>
-              <a:t>Use case descriptions – Admin</a:t>
-            </a:r>
-          </a:p>
-        </p:txBody>
-      </p:sp>
-      <p:graphicFrame>
-        <p:nvGraphicFramePr>
-          <p:cNvPr id="6" name="Content Placeholder 5">
-            <a:extLst>
-              <a:ext uri="{FF2B5EF4-FFF2-40B4-BE49-F238E27FC236}">
-                <a16:creationId xmlns:a16="http://schemas.microsoft.com/office/drawing/2014/main" id="{79534DFA-F0ED-4EB8-9730-D5C3B65E2031}"/>
-              </a:ext>
-            </a:extLst>
-          </p:cNvPr>
-          <p:cNvGraphicFramePr>
-            <a:graphicFrameLocks noGrp="1"/>
-          </p:cNvGraphicFramePr>
-          <p:nvPr>
-            <p:ph idx="1"/>
-            <p:extLst>
-              <p:ext uri="{D42A27DB-BD31-4B8C-83A1-F6EECF244321}">
-                <p14:modId xmlns:p14="http://schemas.microsoft.com/office/powerpoint/2010/main" val="187355002"/>
-              </p:ext>
-            </p:extLst>
-          </p:nvPr>
-        </p:nvGraphicFramePr>
-        <p:xfrm>
-          <a:off x="967410" y="1643063"/>
-          <a:ext cx="10283686" cy="3261360"/>
-        </p:xfrm>
-        <a:graphic>
-          <a:graphicData uri="http://schemas.openxmlformats.org/drawingml/2006/table">
-            <a:tbl>
-              <a:tblPr firstRow="1" bandRow="1">
-                <a:tableStyleId>{5C22544A-7EE6-4342-B048-85BDC9FD1C3A}</a:tableStyleId>
-              </a:tblPr>
-              <a:tblGrid>
-                <a:gridCol w="649355">
-                  <a:extLst>
-                    <a:ext uri="{9D8B030D-6E8A-4147-A177-3AD203B41FA5}">
-                      <a16:colId xmlns:a16="http://schemas.microsoft.com/office/drawing/2014/main" val="1656889719"/>
-                    </a:ext>
-                  </a:extLst>
-                </a:gridCol>
-                <a:gridCol w="3657600">
-                  <a:extLst>
-                    <a:ext uri="{9D8B030D-6E8A-4147-A177-3AD203B41FA5}">
-                      <a16:colId xmlns:a16="http://schemas.microsoft.com/office/drawing/2014/main" val="2613002775"/>
-                    </a:ext>
-                  </a:extLst>
-                </a:gridCol>
-                <a:gridCol w="1386834">
-                  <a:extLst>
-                    <a:ext uri="{9D8B030D-6E8A-4147-A177-3AD203B41FA5}">
-                      <a16:colId xmlns:a16="http://schemas.microsoft.com/office/drawing/2014/main" val="3209742257"/>
-                    </a:ext>
-                  </a:extLst>
-                </a:gridCol>
-                <a:gridCol w="4589897">
-                  <a:extLst>
-                    <a:ext uri="{9D8B030D-6E8A-4147-A177-3AD203B41FA5}">
-                      <a16:colId xmlns:a16="http://schemas.microsoft.com/office/drawing/2014/main" val="1679887175"/>
-                    </a:ext>
-                  </a:extLst>
-                </a:gridCol>
-              </a:tblGrid>
-              <a:tr h="370840">
-                <a:tc>
-                  <a:txBody>
-                    <a:bodyPr/>
-                    <a:lstStyle/>
-                    <a:p>
-                      <a:pPr algn="ctr"/>
-                      <a:r>
-                        <a:rPr lang="en-US" sz="2800" dirty="0"/>
-                        <a:t>No</a:t>
-                      </a:r>
-                    </a:p>
-                  </a:txBody>
-                  <a:tcPr/>
-                </a:tc>
-                <a:tc>
-                  <a:txBody>
-                    <a:bodyPr/>
-                    <a:lstStyle/>
-                    <a:p>
-                      <a:pPr algn="ctr"/>
-                      <a:r>
-                        <a:rPr lang="en-US" sz="2800" dirty="0"/>
-                        <a:t>Use Case</a:t>
-                      </a:r>
-                    </a:p>
-                  </a:txBody>
-                  <a:tcPr/>
-                </a:tc>
-                <a:tc>
-                  <a:txBody>
-                    <a:bodyPr/>
-                    <a:lstStyle/>
-                    <a:p>
-                      <a:pPr algn="ctr"/>
-                      <a:r>
-                        <a:rPr lang="en-US" sz="2800" dirty="0"/>
-                        <a:t>Priority</a:t>
-                      </a:r>
-                    </a:p>
-                  </a:txBody>
-                  <a:tcPr/>
-                </a:tc>
-                <a:tc>
-                  <a:txBody>
-                    <a:bodyPr/>
-                    <a:lstStyle/>
-                    <a:p>
-                      <a:pPr algn="ctr"/>
-                      <a:r>
-                        <a:rPr lang="en-US" sz="2800" dirty="0"/>
-                        <a:t>Description</a:t>
-                      </a:r>
-                    </a:p>
-                  </a:txBody>
-                  <a:tcPr/>
-                </a:tc>
-                <a:extLst>
-                  <a:ext uri="{0D108BD9-81ED-4DB2-BD59-A6C34878D82A}">
-                    <a16:rowId xmlns:a16="http://schemas.microsoft.com/office/drawing/2014/main" val="1260802174"/>
-                  </a:ext>
-                </a:extLst>
-              </a:tr>
-              <a:tr h="370840">
-                <a:tc>
-                  <a:txBody>
-                    <a:bodyPr/>
-                    <a:lstStyle/>
-                    <a:p>
-                      <a:pPr algn="r"/>
-                      <a:r>
-                        <a:rPr lang="en-US" sz="2800" dirty="0"/>
-                        <a:t>1</a:t>
-                      </a:r>
-                    </a:p>
-                  </a:txBody>
-                  <a:tcPr/>
-                </a:tc>
-                <a:tc>
-                  <a:txBody>
-                    <a:bodyPr/>
-                    <a:lstStyle/>
-                    <a:p>
-                      <a:r>
-                        <a:rPr lang="en-US" sz="2800" dirty="0"/>
-                        <a:t>View and Approve Car Owner application</a:t>
-                      </a:r>
-                    </a:p>
-                  </a:txBody>
-                  <a:tcPr/>
-                </a:tc>
-                <a:tc>
-                  <a:txBody>
-                    <a:bodyPr/>
-                    <a:lstStyle/>
-                    <a:p>
-                      <a:pPr algn="ctr"/>
-                      <a:r>
-                        <a:rPr lang="en-US" sz="2800" dirty="0"/>
-                        <a:t>1</a:t>
-                      </a:r>
-                    </a:p>
-                  </a:txBody>
-                  <a:tcPr/>
-                </a:tc>
-                <a:tc>
-                  <a:txBody>
-                    <a:bodyPr/>
-                    <a:lstStyle/>
-                    <a:p>
-                      <a:r>
-                        <a:rPr lang="en-US" sz="2800" dirty="0"/>
-                        <a:t>Admin can view and approve pending Car Owner application</a:t>
-                      </a:r>
-                    </a:p>
-                  </a:txBody>
-                  <a:tcPr/>
-                </a:tc>
-                <a:extLst>
-                  <a:ext uri="{0D108BD9-81ED-4DB2-BD59-A6C34878D82A}">
-                    <a16:rowId xmlns:a16="http://schemas.microsoft.com/office/drawing/2014/main" val="4282141431"/>
-                  </a:ext>
-                </a:extLst>
-              </a:tr>
-              <a:tr h="370840">
-                <a:tc>
-                  <a:txBody>
-                    <a:bodyPr/>
-                    <a:lstStyle/>
-                    <a:p>
-                      <a:pPr algn="r"/>
-                      <a:r>
-                        <a:rPr lang="en-US" sz="2800" dirty="0"/>
-                        <a:t>2</a:t>
-                      </a:r>
-                    </a:p>
-                  </a:txBody>
-                  <a:tcPr/>
-                </a:tc>
-                <a:tc>
-                  <a:txBody>
-                    <a:bodyPr/>
-                    <a:lstStyle/>
-                    <a:p>
-                      <a:r>
-                        <a:rPr lang="en-US" sz="2800" dirty="0"/>
-                        <a:t>View and approve Car registration and Car rental price offer</a:t>
-                      </a:r>
-                    </a:p>
-                  </a:txBody>
-                  <a:tcPr/>
-                </a:tc>
-                <a:tc>
-                  <a:txBody>
-                    <a:bodyPr/>
-                    <a:lstStyle/>
-                    <a:p>
-                      <a:pPr algn="ctr"/>
-                      <a:r>
-                        <a:rPr lang="en-US" sz="2800" dirty="0"/>
-                        <a:t>1</a:t>
-                      </a:r>
-                    </a:p>
-                  </a:txBody>
-                  <a:tcPr/>
-                </a:tc>
-                <a:tc>
-                  <a:txBody>
-                    <a:bodyPr/>
-                    <a:lstStyle/>
-                    <a:p>
-                      <a:r>
-                        <a:rPr lang="en-US" sz="2800" dirty="0"/>
-                        <a:t>Car Owner can view and approve Car and rental price offer of Car Owner</a:t>
-                      </a:r>
-                    </a:p>
-                  </a:txBody>
-                  <a:tcPr/>
-                </a:tc>
-                <a:extLst>
-                  <a:ext uri="{0D108BD9-81ED-4DB2-BD59-A6C34878D82A}">
-                    <a16:rowId xmlns:a16="http://schemas.microsoft.com/office/drawing/2014/main" val="4092894426"/>
-                  </a:ext>
-                </a:extLst>
-              </a:tr>
-            </a:tbl>
-          </a:graphicData>
-        </a:graphic>
-      </p:graphicFrame>
-    </p:spTree>
-    <p:extLst>
-      <p:ext uri="{BB962C8B-B14F-4D97-AF65-F5344CB8AC3E}">
-        <p14:creationId xmlns:p14="http://schemas.microsoft.com/office/powerpoint/2010/main" val="522995816"/>
-      </p:ext>
-    </p:extLst>
-  </p:cSld>
-  <p:clrMapOvr>
-    <a:masterClrMapping/>
-  </p:clrMapOvr>
-</p:sld>
-</file>
-
 <file path=ppt/theme/theme1.xml><?xml version="1.0" encoding="utf-8"?>
 <a:theme xmlns:a="http://schemas.openxmlformats.org/drawingml/2006/main" name="Circuit">
   <a:themeElements>

</xml_diff>

<commit_message>
Change BankAccount to CreditCardInfo
</commit_message>
<xml_diff>
--- a/Aha-presentation.pptx
+++ b/Aha-presentation.pptx
@@ -174,7 +174,7 @@
           <a:noFill/>
           <a:extLst>
             <a:ext uri="{909E8E84-426E-40dd-AFC4-6F175D3DCCD1}">
-              <a14:hiddenFill xmlns="" xmlns:a14="http://schemas.microsoft.com/office/drawing/2010/main">
+              <a14:hiddenFill xmlns:a14="http://schemas.microsoft.com/office/drawing/2010/main" xmlns="">
                 <a:solidFill>
                   <a:srgbClr val="FFFFFF"/>
                 </a:solidFill>
@@ -234,7 +234,7 @@
             </a:ln>
             <a:extLst>
               <a:ext uri="{91240B29-F687-4f45-9708-019B960494DF}">
-                <a14:hiddenLine xmlns="" xmlns:a14="http://schemas.microsoft.com/office/drawing/2010/main" w="9525">
+                <a14:hiddenLine xmlns:a14="http://schemas.microsoft.com/office/drawing/2010/main" xmlns="" w="9525">
                   <a:solidFill>
                     <a:srgbClr val="000000"/>
                   </a:solidFill>
@@ -324,7 +324,7 @@
             </a:ln>
             <a:extLst>
               <a:ext uri="{91240B29-F687-4f45-9708-019B960494DF}">
-                <a14:hiddenLine xmlns="" xmlns:a14="http://schemas.microsoft.com/office/drawing/2010/main" w="9525">
+                <a14:hiddenLine xmlns:a14="http://schemas.microsoft.com/office/drawing/2010/main" xmlns="" w="9525">
                   <a:solidFill>
                     <a:srgbClr val="000000"/>
                   </a:solidFill>
@@ -414,7 +414,7 @@
             </a:ln>
             <a:extLst>
               <a:ext uri="{91240B29-F687-4f45-9708-019B960494DF}">
-                <a14:hiddenLine xmlns="" xmlns:a14="http://schemas.microsoft.com/office/drawing/2010/main" w="9525">
+                <a14:hiddenLine xmlns:a14="http://schemas.microsoft.com/office/drawing/2010/main" xmlns="" w="9525">
                   <a:solidFill>
                     <a:srgbClr val="000000"/>
                   </a:solidFill>
@@ -448,7 +448,7 @@
             </a:ln>
             <a:extLst>
               <a:ext uri="{91240B29-F687-4f45-9708-019B960494DF}">
-                <a14:hiddenLine xmlns="" xmlns:a14="http://schemas.microsoft.com/office/drawing/2010/main" w="9525">
+                <a14:hiddenLine xmlns:a14="http://schemas.microsoft.com/office/drawing/2010/main" xmlns="" w="9525">
                   <a:solidFill>
                     <a:srgbClr val="000000"/>
                   </a:solidFill>
@@ -538,7 +538,7 @@
             </a:ln>
             <a:extLst>
               <a:ext uri="{91240B29-F687-4f45-9708-019B960494DF}">
-                <a14:hiddenLine xmlns="" xmlns:a14="http://schemas.microsoft.com/office/drawing/2010/main" w="9525">
+                <a14:hiddenLine xmlns:a14="http://schemas.microsoft.com/office/drawing/2010/main" xmlns="" w="9525">
                   <a:solidFill>
                     <a:srgbClr val="000000"/>
                   </a:solidFill>
@@ -600,7 +600,7 @@
             </a:ln>
             <a:extLst>
               <a:ext uri="{91240B29-F687-4f45-9708-019B960494DF}">
-                <a14:hiddenLine xmlns="" xmlns:a14="http://schemas.microsoft.com/office/drawing/2010/main" w="9525">
+                <a14:hiddenLine xmlns:a14="http://schemas.microsoft.com/office/drawing/2010/main" xmlns="" w="9525">
                   <a:solidFill>
                     <a:srgbClr val="000000"/>
                   </a:solidFill>
@@ -662,7 +662,7 @@
             </a:ln>
             <a:extLst>
               <a:ext uri="{91240B29-F687-4f45-9708-019B960494DF}">
-                <a14:hiddenLine xmlns="" xmlns:a14="http://schemas.microsoft.com/office/drawing/2010/main" w="9525">
+                <a14:hiddenLine xmlns:a14="http://schemas.microsoft.com/office/drawing/2010/main" xmlns="" w="9525">
                   <a:solidFill>
                     <a:srgbClr val="000000"/>
                   </a:solidFill>
@@ -752,7 +752,7 @@
             </a:ln>
             <a:extLst>
               <a:ext uri="{91240B29-F687-4f45-9708-019B960494DF}">
-                <a14:hiddenLine xmlns="" xmlns:a14="http://schemas.microsoft.com/office/drawing/2010/main" w="9525">
+                <a14:hiddenLine xmlns:a14="http://schemas.microsoft.com/office/drawing/2010/main" xmlns="" w="9525">
                   <a:solidFill>
                     <a:srgbClr val="000000"/>
                   </a:solidFill>
@@ -814,7 +814,7 @@
             </a:ln>
             <a:extLst>
               <a:ext uri="{91240B29-F687-4f45-9708-019B960494DF}">
-                <a14:hiddenLine xmlns="" xmlns:a14="http://schemas.microsoft.com/office/drawing/2010/main" w="9525">
+                <a14:hiddenLine xmlns:a14="http://schemas.microsoft.com/office/drawing/2010/main" xmlns="" w="9525">
                   <a:solidFill>
                     <a:srgbClr val="000000"/>
                   </a:solidFill>
@@ -876,7 +876,7 @@
             </a:ln>
             <a:extLst>
               <a:ext uri="{91240B29-F687-4f45-9708-019B960494DF}">
-                <a14:hiddenLine xmlns="" xmlns:a14="http://schemas.microsoft.com/office/drawing/2010/main" w="9525">
+                <a14:hiddenLine xmlns:a14="http://schemas.microsoft.com/office/drawing/2010/main" xmlns="" w="9525">
                   <a:solidFill>
                     <a:srgbClr val="000000"/>
                   </a:solidFill>
@@ -966,7 +966,7 @@
             </a:ln>
             <a:extLst>
               <a:ext uri="{91240B29-F687-4f45-9708-019B960494DF}">
-                <a14:hiddenLine xmlns="" xmlns:a14="http://schemas.microsoft.com/office/drawing/2010/main" w="9525">
+                <a14:hiddenLine xmlns:a14="http://schemas.microsoft.com/office/drawing/2010/main" xmlns="" w="9525">
                   <a:solidFill>
                     <a:srgbClr val="000000"/>
                   </a:solidFill>
@@ -1056,7 +1056,7 @@
             </a:ln>
             <a:extLst>
               <a:ext uri="{91240B29-F687-4f45-9708-019B960494DF}">
-                <a14:hiddenLine xmlns="" xmlns:a14="http://schemas.microsoft.com/office/drawing/2010/main" w="9525">
+                <a14:hiddenLine xmlns:a14="http://schemas.microsoft.com/office/drawing/2010/main" xmlns="" w="9525">
                   <a:solidFill>
                     <a:srgbClr val="000000"/>
                   </a:solidFill>
@@ -1118,7 +1118,7 @@
             </a:ln>
             <a:extLst>
               <a:ext uri="{91240B29-F687-4f45-9708-019B960494DF}">
-                <a14:hiddenLine xmlns="" xmlns:a14="http://schemas.microsoft.com/office/drawing/2010/main" w="9525">
+                <a14:hiddenLine xmlns:a14="http://schemas.microsoft.com/office/drawing/2010/main" xmlns="" w="9525">
                   <a:solidFill>
                     <a:srgbClr val="000000"/>
                   </a:solidFill>
@@ -1228,7 +1228,7 @@
             </a:ln>
             <a:extLst>
               <a:ext uri="{91240B29-F687-4f45-9708-019B960494DF}">
-                <a14:hiddenLine xmlns="" xmlns:a14="http://schemas.microsoft.com/office/drawing/2010/main" w="9525">
+                <a14:hiddenLine xmlns:a14="http://schemas.microsoft.com/office/drawing/2010/main" xmlns="" w="9525">
                   <a:solidFill>
                     <a:srgbClr val="000000"/>
                   </a:solidFill>
@@ -1290,7 +1290,7 @@
             </a:ln>
             <a:extLst>
               <a:ext uri="{91240B29-F687-4f45-9708-019B960494DF}">
-                <a14:hiddenLine xmlns="" xmlns:a14="http://schemas.microsoft.com/office/drawing/2010/main" w="9525">
+                <a14:hiddenLine xmlns:a14="http://schemas.microsoft.com/office/drawing/2010/main" xmlns="" w="9525">
                   <a:solidFill>
                     <a:srgbClr val="000000"/>
                   </a:solidFill>
@@ -1380,7 +1380,7 @@
             </a:ln>
             <a:extLst>
               <a:ext uri="{91240B29-F687-4f45-9708-019B960494DF}">
-                <a14:hiddenLine xmlns="" xmlns:a14="http://schemas.microsoft.com/office/drawing/2010/main" w="9525">
+                <a14:hiddenLine xmlns:a14="http://schemas.microsoft.com/office/drawing/2010/main" xmlns="" w="9525">
                   <a:solidFill>
                     <a:srgbClr val="000000"/>
                   </a:solidFill>
@@ -1470,7 +1470,7 @@
             </a:ln>
             <a:extLst>
               <a:ext uri="{91240B29-F687-4f45-9708-019B960494DF}">
-                <a14:hiddenLine xmlns="" xmlns:a14="http://schemas.microsoft.com/office/drawing/2010/main" w="9525">
+                <a14:hiddenLine xmlns:a14="http://schemas.microsoft.com/office/drawing/2010/main" xmlns="" w="9525">
                   <a:solidFill>
                     <a:srgbClr val="000000"/>
                   </a:solidFill>
@@ -1532,7 +1532,7 @@
             </a:ln>
             <a:extLst>
               <a:ext uri="{91240B29-F687-4f45-9708-019B960494DF}">
-                <a14:hiddenLine xmlns="" xmlns:a14="http://schemas.microsoft.com/office/drawing/2010/main" w="9525">
+                <a14:hiddenLine xmlns:a14="http://schemas.microsoft.com/office/drawing/2010/main" xmlns="" w="9525">
                   <a:solidFill>
                     <a:srgbClr val="000000"/>
                   </a:solidFill>
@@ -1622,7 +1622,7 @@
             </a:ln>
             <a:extLst>
               <a:ext uri="{91240B29-F687-4f45-9708-019B960494DF}">
-                <a14:hiddenLine xmlns="" xmlns:a14="http://schemas.microsoft.com/office/drawing/2010/main" w="9525">
+                <a14:hiddenLine xmlns:a14="http://schemas.microsoft.com/office/drawing/2010/main" xmlns="" w="9525">
                   <a:solidFill>
                     <a:srgbClr val="000000"/>
                   </a:solidFill>
@@ -1712,7 +1712,7 @@
             </a:ln>
             <a:extLst>
               <a:ext uri="{91240B29-F687-4f45-9708-019B960494DF}">
-                <a14:hiddenLine xmlns="" xmlns:a14="http://schemas.microsoft.com/office/drawing/2010/main" w="9525">
+                <a14:hiddenLine xmlns:a14="http://schemas.microsoft.com/office/drawing/2010/main" xmlns="" w="9525">
                   <a:solidFill>
                     <a:srgbClr val="000000"/>
                   </a:solidFill>
@@ -1768,7 +1768,7 @@
             </a:ln>
             <a:extLst>
               <a:ext uri="{91240B29-F687-4f45-9708-019B960494DF}">
-                <a14:hiddenLine xmlns="" xmlns:a14="http://schemas.microsoft.com/office/drawing/2010/main" w="9525">
+                <a14:hiddenLine xmlns:a14="http://schemas.microsoft.com/office/drawing/2010/main" xmlns="" w="9525">
                   <a:solidFill>
                     <a:srgbClr val="000000"/>
                   </a:solidFill>
@@ -1858,7 +1858,7 @@
             </a:ln>
             <a:extLst>
               <a:ext uri="{91240B29-F687-4f45-9708-019B960494DF}">
-                <a14:hiddenLine xmlns="" xmlns:a14="http://schemas.microsoft.com/office/drawing/2010/main" w="9525">
+                <a14:hiddenLine xmlns:a14="http://schemas.microsoft.com/office/drawing/2010/main" xmlns="" w="9525">
                   <a:solidFill>
                     <a:srgbClr val="000000"/>
                   </a:solidFill>
@@ -1914,7 +1914,7 @@
             </a:ln>
             <a:extLst>
               <a:ext uri="{91240B29-F687-4f45-9708-019B960494DF}">
-                <a14:hiddenLine xmlns="" xmlns:a14="http://schemas.microsoft.com/office/drawing/2010/main" w="9525">
+                <a14:hiddenLine xmlns:a14="http://schemas.microsoft.com/office/drawing/2010/main" xmlns="" w="9525">
                   <a:solidFill>
                     <a:srgbClr val="000000"/>
                   </a:solidFill>
@@ -2004,7 +2004,7 @@
             </a:ln>
             <a:extLst>
               <a:ext uri="{91240B29-F687-4f45-9708-019B960494DF}">
-                <a14:hiddenLine xmlns="" xmlns:a14="http://schemas.microsoft.com/office/drawing/2010/main" w="9525">
+                <a14:hiddenLine xmlns:a14="http://schemas.microsoft.com/office/drawing/2010/main" xmlns="" w="9525">
                   <a:solidFill>
                     <a:srgbClr val="000000"/>
                   </a:solidFill>
@@ -2072,7 +2072,7 @@
             </a:ln>
             <a:extLst>
               <a:ext uri="{91240B29-F687-4f45-9708-019B960494DF}">
-                <a14:hiddenLine xmlns="" xmlns:a14="http://schemas.microsoft.com/office/drawing/2010/main" w="9525">
+                <a14:hiddenLine xmlns:a14="http://schemas.microsoft.com/office/drawing/2010/main" xmlns="" w="9525">
                   <a:solidFill>
                     <a:srgbClr val="000000"/>
                   </a:solidFill>
@@ -2162,7 +2162,7 @@
             </a:ln>
             <a:extLst>
               <a:ext uri="{91240B29-F687-4f45-9708-019B960494DF}">
-                <a14:hiddenLine xmlns="" xmlns:a14="http://schemas.microsoft.com/office/drawing/2010/main" w="9525">
+                <a14:hiddenLine xmlns:a14="http://schemas.microsoft.com/office/drawing/2010/main" xmlns="" w="9525">
                   <a:solidFill>
                     <a:srgbClr val="000000"/>
                   </a:solidFill>
@@ -2230,7 +2230,7 @@
             </a:ln>
             <a:extLst>
               <a:ext uri="{91240B29-F687-4f45-9708-019B960494DF}">
-                <a14:hiddenLine xmlns="" xmlns:a14="http://schemas.microsoft.com/office/drawing/2010/main" w="9525">
+                <a14:hiddenLine xmlns:a14="http://schemas.microsoft.com/office/drawing/2010/main" xmlns="" w="9525">
                   <a:solidFill>
                     <a:srgbClr val="000000"/>
                   </a:solidFill>
@@ -2320,7 +2320,7 @@
             </a:ln>
             <a:extLst>
               <a:ext uri="{91240B29-F687-4f45-9708-019B960494DF}">
-                <a14:hiddenLine xmlns="" xmlns:a14="http://schemas.microsoft.com/office/drawing/2010/main" w="9525">
+                <a14:hiddenLine xmlns:a14="http://schemas.microsoft.com/office/drawing/2010/main" xmlns="" w="9525">
                   <a:solidFill>
                     <a:srgbClr val="000000"/>
                   </a:solidFill>
@@ -2354,7 +2354,7 @@
             </a:ln>
             <a:extLst>
               <a:ext uri="{91240B29-F687-4f45-9708-019B960494DF}">
-                <a14:hiddenLine xmlns="" xmlns:a14="http://schemas.microsoft.com/office/drawing/2010/main" w="9525">
+                <a14:hiddenLine xmlns:a14="http://schemas.microsoft.com/office/drawing/2010/main" xmlns="" w="9525">
                   <a:solidFill>
                     <a:srgbClr val="000000"/>
                   </a:solidFill>
@@ -2444,7 +2444,7 @@
             </a:ln>
             <a:extLst>
               <a:ext uri="{91240B29-F687-4f45-9708-019B960494DF}">
-                <a14:hiddenLine xmlns="" xmlns:a14="http://schemas.microsoft.com/office/drawing/2010/main" w="9525">
+                <a14:hiddenLine xmlns:a14="http://schemas.microsoft.com/office/drawing/2010/main" xmlns="" w="9525">
                   <a:solidFill>
                     <a:srgbClr val="000000"/>
                   </a:solidFill>
@@ -2506,7 +2506,7 @@
             </a:ln>
             <a:extLst>
               <a:ext uri="{91240B29-F687-4f45-9708-019B960494DF}">
-                <a14:hiddenLine xmlns="" xmlns:a14="http://schemas.microsoft.com/office/drawing/2010/main" w="9525">
+                <a14:hiddenLine xmlns:a14="http://schemas.microsoft.com/office/drawing/2010/main" xmlns="" w="9525">
                   <a:solidFill>
                     <a:srgbClr val="000000"/>
                   </a:solidFill>
@@ -2568,7 +2568,7 @@
             </a:ln>
             <a:extLst>
               <a:ext uri="{91240B29-F687-4f45-9708-019B960494DF}">
-                <a14:hiddenLine xmlns="" xmlns:a14="http://schemas.microsoft.com/office/drawing/2010/main" w="9525">
+                <a14:hiddenLine xmlns:a14="http://schemas.microsoft.com/office/drawing/2010/main" xmlns="" w="9525">
                   <a:solidFill>
                     <a:srgbClr val="000000"/>
                   </a:solidFill>
@@ -2658,7 +2658,7 @@
             </a:ln>
             <a:extLst>
               <a:ext uri="{91240B29-F687-4f45-9708-019B960494DF}">
-                <a14:hiddenLine xmlns="" xmlns:a14="http://schemas.microsoft.com/office/drawing/2010/main" w="9525">
+                <a14:hiddenLine xmlns:a14="http://schemas.microsoft.com/office/drawing/2010/main" xmlns="" w="9525">
                   <a:solidFill>
                     <a:srgbClr val="000000"/>
                   </a:solidFill>
@@ -2726,7 +2726,7 @@
             </a:ln>
             <a:extLst>
               <a:ext uri="{91240B29-F687-4f45-9708-019B960494DF}">
-                <a14:hiddenLine xmlns="" xmlns:a14="http://schemas.microsoft.com/office/drawing/2010/main" w="9525">
+                <a14:hiddenLine xmlns:a14="http://schemas.microsoft.com/office/drawing/2010/main" xmlns="" w="9525">
                   <a:solidFill>
                     <a:srgbClr val="000000"/>
                   </a:solidFill>
@@ -2788,7 +2788,7 @@
             </a:ln>
             <a:extLst>
               <a:ext uri="{91240B29-F687-4f45-9708-019B960494DF}">
-                <a14:hiddenLine xmlns="" xmlns:a14="http://schemas.microsoft.com/office/drawing/2010/main" w="9525">
+                <a14:hiddenLine xmlns:a14="http://schemas.microsoft.com/office/drawing/2010/main" xmlns="" w="9525">
                   <a:solidFill>
                     <a:srgbClr val="000000"/>
                   </a:solidFill>
@@ -2878,7 +2878,7 @@
             </a:ln>
             <a:extLst>
               <a:ext uri="{91240B29-F687-4f45-9708-019B960494DF}">
-                <a14:hiddenLine xmlns="" xmlns:a14="http://schemas.microsoft.com/office/drawing/2010/main" w="9525">
+                <a14:hiddenLine xmlns:a14="http://schemas.microsoft.com/office/drawing/2010/main" xmlns="" w="9525">
                   <a:solidFill>
                     <a:srgbClr val="000000"/>
                   </a:solidFill>
@@ -2940,7 +2940,7 @@
             </a:ln>
             <a:extLst>
               <a:ext uri="{91240B29-F687-4f45-9708-019B960494DF}">
-                <a14:hiddenLine xmlns="" xmlns:a14="http://schemas.microsoft.com/office/drawing/2010/main" w="9525">
+                <a14:hiddenLine xmlns:a14="http://schemas.microsoft.com/office/drawing/2010/main" xmlns="" w="9525">
                   <a:solidFill>
                     <a:srgbClr val="000000"/>
                   </a:solidFill>
@@ -3030,7 +3030,7 @@
             </a:ln>
             <a:extLst>
               <a:ext uri="{91240B29-F687-4f45-9708-019B960494DF}">
-                <a14:hiddenLine xmlns="" xmlns:a14="http://schemas.microsoft.com/office/drawing/2010/main" w="9525">
+                <a14:hiddenLine xmlns:a14="http://schemas.microsoft.com/office/drawing/2010/main" xmlns="" w="9525">
                   <a:solidFill>
                     <a:srgbClr val="000000"/>
                   </a:solidFill>
@@ -3092,7 +3092,7 @@
             </a:ln>
             <a:extLst>
               <a:ext uri="{91240B29-F687-4f45-9708-019B960494DF}">
-                <a14:hiddenLine xmlns="" xmlns:a14="http://schemas.microsoft.com/office/drawing/2010/main" w="9525">
+                <a14:hiddenLine xmlns:a14="http://schemas.microsoft.com/office/drawing/2010/main" xmlns="" w="9525">
                   <a:solidFill>
                     <a:srgbClr val="000000"/>
                   </a:solidFill>
@@ -3182,7 +3182,7 @@
             </a:ln>
             <a:extLst>
               <a:ext uri="{91240B29-F687-4f45-9708-019B960494DF}">
-                <a14:hiddenLine xmlns="" xmlns:a14="http://schemas.microsoft.com/office/drawing/2010/main" w="9525">
+                <a14:hiddenLine xmlns:a14="http://schemas.microsoft.com/office/drawing/2010/main" xmlns="" w="9525">
                   <a:solidFill>
                     <a:srgbClr val="000000"/>
                   </a:solidFill>
@@ -3216,7 +3216,7 @@
             </a:ln>
             <a:extLst>
               <a:ext uri="{91240B29-F687-4f45-9708-019B960494DF}">
-                <a14:hiddenLine xmlns="" xmlns:a14="http://schemas.microsoft.com/office/drawing/2010/main" w="9525">
+                <a14:hiddenLine xmlns:a14="http://schemas.microsoft.com/office/drawing/2010/main" xmlns="" w="9525">
                   <a:solidFill>
                     <a:srgbClr val="000000"/>
                   </a:solidFill>
@@ -3281,7 +3281,7 @@
             </a:ln>
             <a:extLst>
               <a:ext uri="{91240B29-F687-4f45-9708-019B960494DF}">
-                <a14:hiddenLine xmlns="" xmlns:a14="http://schemas.microsoft.com/office/drawing/2010/main" w="9525">
+                <a14:hiddenLine xmlns:a14="http://schemas.microsoft.com/office/drawing/2010/main" xmlns="" w="9525">
                   <a:solidFill>
                     <a:srgbClr val="000000"/>
                   </a:solidFill>
@@ -3371,7 +3371,7 @@
             </a:ln>
             <a:extLst>
               <a:ext uri="{91240B29-F687-4f45-9708-019B960494DF}">
-                <a14:hiddenLine xmlns="" xmlns:a14="http://schemas.microsoft.com/office/drawing/2010/main" w="9525">
+                <a14:hiddenLine xmlns:a14="http://schemas.microsoft.com/office/drawing/2010/main" xmlns="" w="9525">
                   <a:solidFill>
                     <a:srgbClr val="000000"/>
                   </a:solidFill>
@@ -3433,7 +3433,7 @@
             </a:ln>
             <a:extLst>
               <a:ext uri="{91240B29-F687-4f45-9708-019B960494DF}">
-                <a14:hiddenLine xmlns="" xmlns:a14="http://schemas.microsoft.com/office/drawing/2010/main" w="9525">
+                <a14:hiddenLine xmlns:a14="http://schemas.microsoft.com/office/drawing/2010/main" xmlns="" w="9525">
                   <a:solidFill>
                     <a:srgbClr val="000000"/>
                   </a:solidFill>
@@ -3523,7 +3523,7 @@
             </a:ln>
             <a:extLst>
               <a:ext uri="{91240B29-F687-4f45-9708-019B960494DF}">
-                <a14:hiddenLine xmlns="" xmlns:a14="http://schemas.microsoft.com/office/drawing/2010/main" w="9525">
+                <a14:hiddenLine xmlns:a14="http://schemas.microsoft.com/office/drawing/2010/main" xmlns="" w="9525">
                   <a:solidFill>
                     <a:srgbClr val="000000"/>
                   </a:solidFill>
@@ -3613,7 +3613,7 @@
             </a:ln>
             <a:extLst>
               <a:ext uri="{91240B29-F687-4f45-9708-019B960494DF}">
-                <a14:hiddenLine xmlns="" xmlns:a14="http://schemas.microsoft.com/office/drawing/2010/main" w="9525">
+                <a14:hiddenLine xmlns:a14="http://schemas.microsoft.com/office/drawing/2010/main" xmlns="" w="9525">
                   <a:solidFill>
                     <a:srgbClr val="000000"/>
                   </a:solidFill>
@@ -3678,7 +3678,7 @@
             </a:ln>
             <a:extLst>
               <a:ext uri="{91240B29-F687-4f45-9708-019B960494DF}">
-                <a14:hiddenLine xmlns="" xmlns:a14="http://schemas.microsoft.com/office/drawing/2010/main" w="9525">
+                <a14:hiddenLine xmlns:a14="http://schemas.microsoft.com/office/drawing/2010/main" xmlns="" w="9525">
                   <a:solidFill>
                     <a:srgbClr val="000000"/>
                   </a:solidFill>
@@ -3740,7 +3740,7 @@
             </a:ln>
             <a:extLst>
               <a:ext uri="{91240B29-F687-4f45-9708-019B960494DF}">
-                <a14:hiddenLine xmlns="" xmlns:a14="http://schemas.microsoft.com/office/drawing/2010/main" w="9525">
+                <a14:hiddenLine xmlns:a14="http://schemas.microsoft.com/office/drawing/2010/main" xmlns="" w="9525">
                   <a:solidFill>
                     <a:srgbClr val="000000"/>
                   </a:solidFill>
@@ -3830,7 +3830,7 @@
             </a:ln>
             <a:extLst>
               <a:ext uri="{91240B29-F687-4f45-9708-019B960494DF}">
-                <a14:hiddenLine xmlns="" xmlns:a14="http://schemas.microsoft.com/office/drawing/2010/main" w="9525">
+                <a14:hiddenLine xmlns:a14="http://schemas.microsoft.com/office/drawing/2010/main" xmlns="" w="9525">
                   <a:solidFill>
                     <a:srgbClr val="000000"/>
                   </a:solidFill>
@@ -3920,7 +3920,7 @@
             </a:ln>
             <a:extLst>
               <a:ext uri="{91240B29-F687-4f45-9708-019B960494DF}">
-                <a14:hiddenLine xmlns="" xmlns:a14="http://schemas.microsoft.com/office/drawing/2010/main" w="9525">
+                <a14:hiddenLine xmlns:a14="http://schemas.microsoft.com/office/drawing/2010/main" xmlns="" w="9525">
                   <a:solidFill>
                     <a:srgbClr val="000000"/>
                   </a:solidFill>
@@ -3982,7 +3982,7 @@
             </a:ln>
             <a:extLst>
               <a:ext uri="{91240B29-F687-4f45-9708-019B960494DF}">
-                <a14:hiddenLine xmlns="" xmlns:a14="http://schemas.microsoft.com/office/drawing/2010/main" w="9525">
+                <a14:hiddenLine xmlns:a14="http://schemas.microsoft.com/office/drawing/2010/main" xmlns="" w="9525">
                   <a:solidFill>
                     <a:srgbClr val="000000"/>
                   </a:solidFill>
@@ -4102,7 +4102,7 @@
             </a:ln>
             <a:extLst>
               <a:ext uri="{91240B29-F687-4f45-9708-019B960494DF}">
-                <a14:hiddenLine xmlns="" xmlns:a14="http://schemas.microsoft.com/office/drawing/2010/main" w="9525">
+                <a14:hiddenLine xmlns:a14="http://schemas.microsoft.com/office/drawing/2010/main" xmlns="" w="9525">
                   <a:solidFill>
                     <a:srgbClr val="000000"/>
                   </a:solidFill>
@@ -4170,7 +4170,7 @@
             </a:ln>
             <a:extLst>
               <a:ext uri="{91240B29-F687-4f45-9708-019B960494DF}">
-                <a14:hiddenLine xmlns="" xmlns:a14="http://schemas.microsoft.com/office/drawing/2010/main" w="9525">
+                <a14:hiddenLine xmlns:a14="http://schemas.microsoft.com/office/drawing/2010/main" xmlns="" w="9525">
                   <a:solidFill>
                     <a:srgbClr val="000000"/>
                   </a:solidFill>
@@ -4260,7 +4260,7 @@
             </a:ln>
             <a:extLst>
               <a:ext uri="{91240B29-F687-4f45-9708-019B960494DF}">
-                <a14:hiddenLine xmlns="" xmlns:a14="http://schemas.microsoft.com/office/drawing/2010/main" w="9525">
+                <a14:hiddenLine xmlns:a14="http://schemas.microsoft.com/office/drawing/2010/main" xmlns="" w="9525">
                   <a:solidFill>
                     <a:srgbClr val="000000"/>
                   </a:solidFill>
@@ -4400,7 +4400,7 @@
           <a:p>
             <a:fld id="{48A87A34-81AB-432B-8DAE-1953F412C126}" type="datetimeFigureOut">
               <a:rPr lang="en-US" dirty="0"/>
-              <a:t>7/26/2018</a:t>
+              <a:t>7/27/2018</a:t>
             </a:fld>
             <a:endParaRPr lang="en-US" dirty="0"/>
           </a:p>
@@ -4662,7 +4662,7 @@
           <a:p>
             <a:fld id="{48A87A34-81AB-432B-8DAE-1953F412C126}" type="datetimeFigureOut">
               <a:rPr lang="en-US" dirty="0"/>
-              <a:t>7/26/2018</a:t>
+              <a:t>7/27/2018</a:t>
             </a:fld>
             <a:endParaRPr lang="en-US" dirty="0"/>
           </a:p>
@@ -4853,7 +4853,7 @@
           <a:p>
             <a:fld id="{48A87A34-81AB-432B-8DAE-1953F412C126}" type="datetimeFigureOut">
               <a:rPr lang="en-US" dirty="0"/>
-              <a:t>7/26/2018</a:t>
+              <a:t>7/27/2018</a:t>
             </a:fld>
             <a:endParaRPr lang="en-US" dirty="0"/>
           </a:p>
@@ -5111,7 +5111,7 @@
           <a:p>
             <a:fld id="{48A87A34-81AB-432B-8DAE-1953F412C126}" type="datetimeFigureOut">
               <a:rPr lang="en-US" dirty="0"/>
-              <a:t>7/26/2018</a:t>
+              <a:t>7/27/2018</a:t>
             </a:fld>
             <a:endParaRPr lang="en-US" dirty="0"/>
           </a:p>
@@ -5540,7 +5540,7 @@
           <a:p>
             <a:fld id="{48A87A34-81AB-432B-8DAE-1953F412C126}" type="datetimeFigureOut">
               <a:rPr lang="en-US" dirty="0"/>
-              <a:t>7/26/2018</a:t>
+              <a:t>7/27/2018</a:t>
             </a:fld>
             <a:endParaRPr lang="en-US" dirty="0"/>
           </a:p>
@@ -6081,7 +6081,7 @@
           <a:p>
             <a:fld id="{48A87A34-81AB-432B-8DAE-1953F412C126}" type="datetimeFigureOut">
               <a:rPr lang="en-US" dirty="0"/>
-              <a:t>7/26/2018</a:t>
+              <a:t>7/27/2018</a:t>
             </a:fld>
             <a:endParaRPr lang="en-US" dirty="0"/>
           </a:p>
@@ -6796,7 +6796,7 @@
           <a:p>
             <a:fld id="{48A87A34-81AB-432B-8DAE-1953F412C126}" type="datetimeFigureOut">
               <a:rPr lang="en-US" dirty="0"/>
-              <a:t>7/26/2018</a:t>
+              <a:t>7/27/2018</a:t>
             </a:fld>
             <a:endParaRPr lang="en-US" dirty="0"/>
           </a:p>
@@ -6961,7 +6961,7 @@
           <a:p>
             <a:fld id="{48A87A34-81AB-432B-8DAE-1953F412C126}" type="datetimeFigureOut">
               <a:rPr lang="en-US" dirty="0"/>
-              <a:t>7/26/2018</a:t>
+              <a:t>7/27/2018</a:t>
             </a:fld>
             <a:endParaRPr lang="en-US" dirty="0"/>
           </a:p>
@@ -7136,7 +7136,7 @@
           <a:p>
             <a:fld id="{48A87A34-81AB-432B-8DAE-1953F412C126}" type="datetimeFigureOut">
               <a:rPr lang="en-US" dirty="0"/>
-              <a:t>7/26/2018</a:t>
+              <a:t>7/27/2018</a:t>
             </a:fld>
             <a:endParaRPr lang="en-US" dirty="0"/>
           </a:p>
@@ -7301,7 +7301,7 @@
           <a:p>
             <a:fld id="{48A87A34-81AB-432B-8DAE-1953F412C126}" type="datetimeFigureOut">
               <a:rPr lang="en-US" dirty="0"/>
-              <a:t>7/26/2018</a:t>
+              <a:t>7/27/2018</a:t>
             </a:fld>
             <a:endParaRPr lang="en-US" dirty="0"/>
           </a:p>
@@ -7546,7 +7546,7 @@
           <a:p>
             <a:fld id="{48A87A34-81AB-432B-8DAE-1953F412C126}" type="datetimeFigureOut">
               <a:rPr lang="en-US" dirty="0"/>
-              <a:t>7/26/2018</a:t>
+              <a:t>7/27/2018</a:t>
             </a:fld>
             <a:endParaRPr lang="en-US" dirty="0"/>
           </a:p>
@@ -7773,7 +7773,7 @@
           <a:p>
             <a:fld id="{48A87A34-81AB-432B-8DAE-1953F412C126}" type="datetimeFigureOut">
               <a:rPr lang="en-US" dirty="0"/>
-              <a:t>7/26/2018</a:t>
+              <a:t>7/27/2018</a:t>
             </a:fld>
             <a:endParaRPr lang="en-US" dirty="0"/>
           </a:p>
@@ -8149,7 +8149,7 @@
           <a:p>
             <a:fld id="{48A87A34-81AB-432B-8DAE-1953F412C126}" type="datetimeFigureOut">
               <a:rPr lang="en-US" dirty="0"/>
-              <a:t>7/26/2018</a:t>
+              <a:t>7/27/2018</a:t>
             </a:fld>
             <a:endParaRPr lang="en-US" dirty="0"/>
           </a:p>
@@ -8262,7 +8262,7 @@
           <a:p>
             <a:fld id="{48A87A34-81AB-432B-8DAE-1953F412C126}" type="datetimeFigureOut">
               <a:rPr lang="en-US" dirty="0"/>
-              <a:t>7/26/2018</a:t>
+              <a:t>7/27/2018</a:t>
             </a:fld>
             <a:endParaRPr lang="en-US" dirty="0"/>
           </a:p>
@@ -8352,7 +8352,7 @@
           <a:p>
             <a:fld id="{48A87A34-81AB-432B-8DAE-1953F412C126}" type="datetimeFigureOut">
               <a:rPr lang="en-US" dirty="0"/>
-              <a:t>7/26/2018</a:t>
+              <a:t>7/27/2018</a:t>
             </a:fld>
             <a:endParaRPr lang="en-US" dirty="0"/>
           </a:p>
@@ -8596,7 +8596,7 @@
           <a:p>
             <a:fld id="{48A87A34-81AB-432B-8DAE-1953F412C126}" type="datetimeFigureOut">
               <a:rPr lang="en-US" dirty="0"/>
-              <a:t>7/26/2018</a:t>
+              <a:t>7/27/2018</a:t>
             </a:fld>
             <a:endParaRPr lang="en-US" dirty="0"/>
           </a:p>
@@ -8871,7 +8871,7 @@
           <a:p>
             <a:fld id="{48A87A34-81AB-432B-8DAE-1953F412C126}" type="datetimeFigureOut">
               <a:rPr lang="en-US" dirty="0"/>
-              <a:t>7/26/2018</a:t>
+              <a:t>7/27/2018</a:t>
             </a:fld>
             <a:endParaRPr lang="en-US" dirty="0"/>
           </a:p>
@@ -8982,7 +8982,7 @@
           <a:noFill/>
           <a:extLst>
             <a:ext uri="{909E8E84-426E-40dd-AFC4-6F175D3DCCD1}">
-              <a14:hiddenFill xmlns="" xmlns:a14="http://schemas.microsoft.com/office/drawing/2010/main">
+              <a14:hiddenFill xmlns:a14="http://schemas.microsoft.com/office/drawing/2010/main" xmlns="">
                 <a:solidFill>
                   <a:srgbClr val="FFFFFF"/>
                 </a:solidFill>
@@ -9056,7 +9056,7 @@
               </a:ln>
               <a:extLst>
                 <a:ext uri="{91240B29-F687-4f45-9708-019B960494DF}">
-                  <a14:hiddenLine xmlns="" xmlns:a14="http://schemas.microsoft.com/office/drawing/2010/main" w="9525">
+                  <a14:hiddenLine xmlns:a14="http://schemas.microsoft.com/office/drawing/2010/main" xmlns="" w="9525">
                     <a:solidFill>
                       <a:srgbClr val="000000"/>
                     </a:solidFill>
@@ -9146,7 +9146,7 @@
               </a:ln>
               <a:extLst>
                 <a:ext uri="{91240B29-F687-4f45-9708-019B960494DF}">
-                  <a14:hiddenLine xmlns="" xmlns:a14="http://schemas.microsoft.com/office/drawing/2010/main" w="9525">
+                  <a14:hiddenLine xmlns:a14="http://schemas.microsoft.com/office/drawing/2010/main" xmlns="" w="9525">
                     <a:solidFill>
                       <a:srgbClr val="000000"/>
                     </a:solidFill>
@@ -9236,7 +9236,7 @@
               </a:ln>
               <a:extLst>
                 <a:ext uri="{91240B29-F687-4f45-9708-019B960494DF}">
-                  <a14:hiddenLine xmlns="" xmlns:a14="http://schemas.microsoft.com/office/drawing/2010/main" w="9525">
+                  <a14:hiddenLine xmlns:a14="http://schemas.microsoft.com/office/drawing/2010/main" xmlns="" w="9525">
                     <a:solidFill>
                       <a:srgbClr val="000000"/>
                     </a:solidFill>
@@ -9298,7 +9298,7 @@
               </a:ln>
               <a:extLst>
                 <a:ext uri="{91240B29-F687-4f45-9708-019B960494DF}">
-                  <a14:hiddenLine xmlns="" xmlns:a14="http://schemas.microsoft.com/office/drawing/2010/main" w="9525">
+                  <a14:hiddenLine xmlns:a14="http://schemas.microsoft.com/office/drawing/2010/main" xmlns="" w="9525">
                     <a:solidFill>
                       <a:srgbClr val="000000"/>
                     </a:solidFill>
@@ -9388,7 +9388,7 @@
               </a:ln>
               <a:extLst>
                 <a:ext uri="{91240B29-F687-4f45-9708-019B960494DF}">
-                  <a14:hiddenLine xmlns="" xmlns:a14="http://schemas.microsoft.com/office/drawing/2010/main" w="9525">
+                  <a14:hiddenLine xmlns:a14="http://schemas.microsoft.com/office/drawing/2010/main" xmlns="" w="9525">
                     <a:solidFill>
                       <a:srgbClr val="000000"/>
                     </a:solidFill>
@@ -9450,7 +9450,7 @@
               </a:ln>
               <a:extLst>
                 <a:ext uri="{91240B29-F687-4f45-9708-019B960494DF}">
-                  <a14:hiddenLine xmlns="" xmlns:a14="http://schemas.microsoft.com/office/drawing/2010/main" w="9525">
+                  <a14:hiddenLine xmlns:a14="http://schemas.microsoft.com/office/drawing/2010/main" xmlns="" w="9525">
                     <a:solidFill>
                       <a:srgbClr val="000000"/>
                     </a:solidFill>
@@ -9512,7 +9512,7 @@
               </a:ln>
               <a:extLst>
                 <a:ext uri="{91240B29-F687-4f45-9708-019B960494DF}">
-                  <a14:hiddenLine xmlns="" xmlns:a14="http://schemas.microsoft.com/office/drawing/2010/main" w="9525">
+                  <a14:hiddenLine xmlns:a14="http://schemas.microsoft.com/office/drawing/2010/main" xmlns="" w="9525">
                     <a:solidFill>
                       <a:srgbClr val="000000"/>
                     </a:solidFill>
@@ -9602,7 +9602,7 @@
               </a:ln>
               <a:extLst>
                 <a:ext uri="{91240B29-F687-4f45-9708-019B960494DF}">
-                  <a14:hiddenLine xmlns="" xmlns:a14="http://schemas.microsoft.com/office/drawing/2010/main" w="9525">
+                  <a14:hiddenLine xmlns:a14="http://schemas.microsoft.com/office/drawing/2010/main" xmlns="" w="9525">
                     <a:solidFill>
                       <a:srgbClr val="000000"/>
                     </a:solidFill>
@@ -9692,7 +9692,7 @@
               </a:ln>
               <a:extLst>
                 <a:ext uri="{91240B29-F687-4f45-9708-019B960494DF}">
-                  <a14:hiddenLine xmlns="" xmlns:a14="http://schemas.microsoft.com/office/drawing/2010/main" w="9525">
+                  <a14:hiddenLine xmlns:a14="http://schemas.microsoft.com/office/drawing/2010/main" xmlns="" w="9525">
                     <a:solidFill>
                       <a:srgbClr val="000000"/>
                     </a:solidFill>
@@ -9754,7 +9754,7 @@
               </a:ln>
               <a:extLst>
                 <a:ext uri="{91240B29-F687-4f45-9708-019B960494DF}">
-                  <a14:hiddenLine xmlns="" xmlns:a14="http://schemas.microsoft.com/office/drawing/2010/main" w="9525">
+                  <a14:hiddenLine xmlns:a14="http://schemas.microsoft.com/office/drawing/2010/main" xmlns="" w="9525">
                     <a:solidFill>
                       <a:srgbClr val="000000"/>
                     </a:solidFill>
@@ -9864,7 +9864,7 @@
               </a:ln>
               <a:extLst>
                 <a:ext uri="{91240B29-F687-4f45-9708-019B960494DF}">
-                  <a14:hiddenLine xmlns="" xmlns:a14="http://schemas.microsoft.com/office/drawing/2010/main" w="9525">
+                  <a14:hiddenLine xmlns:a14="http://schemas.microsoft.com/office/drawing/2010/main" xmlns="" w="9525">
                     <a:solidFill>
                       <a:srgbClr val="000000"/>
                     </a:solidFill>
@@ -9948,7 +9948,7 @@
               </a:ln>
               <a:extLst>
                 <a:ext uri="{91240B29-F687-4f45-9708-019B960494DF}">
-                  <a14:hiddenLine xmlns="" xmlns:a14="http://schemas.microsoft.com/office/drawing/2010/main" w="9525">
+                  <a14:hiddenLine xmlns:a14="http://schemas.microsoft.com/office/drawing/2010/main" xmlns="" w="9525">
                     <a:solidFill>
                       <a:srgbClr val="000000"/>
                     </a:solidFill>
@@ -10010,7 +10010,7 @@
               </a:ln>
               <a:extLst>
                 <a:ext uri="{91240B29-F687-4f45-9708-019B960494DF}">
-                  <a14:hiddenLine xmlns="" xmlns:a14="http://schemas.microsoft.com/office/drawing/2010/main" w="9525">
+                  <a14:hiddenLine xmlns:a14="http://schemas.microsoft.com/office/drawing/2010/main" xmlns="" w="9525">
                     <a:solidFill>
                       <a:srgbClr val="000000"/>
                     </a:solidFill>
@@ -10072,7 +10072,7 @@
               </a:ln>
               <a:extLst>
                 <a:ext uri="{91240B29-F687-4f45-9708-019B960494DF}">
-                  <a14:hiddenLine xmlns="" xmlns:a14="http://schemas.microsoft.com/office/drawing/2010/main" w="9525">
+                  <a14:hiddenLine xmlns:a14="http://schemas.microsoft.com/office/drawing/2010/main" xmlns="" w="9525">
                     <a:solidFill>
                       <a:srgbClr val="000000"/>
                     </a:solidFill>
@@ -10162,7 +10162,7 @@
               </a:ln>
               <a:extLst>
                 <a:ext uri="{91240B29-F687-4f45-9708-019B960494DF}">
-                  <a14:hiddenLine xmlns="" xmlns:a14="http://schemas.microsoft.com/office/drawing/2010/main" w="9525">
+                  <a14:hiddenLine xmlns:a14="http://schemas.microsoft.com/office/drawing/2010/main" xmlns="" w="9525">
                     <a:solidFill>
                       <a:srgbClr val="000000"/>
                     </a:solidFill>
@@ -10196,7 +10196,7 @@
               </a:ln>
               <a:extLst>
                 <a:ext uri="{91240B29-F687-4f45-9708-019B960494DF}">
-                  <a14:hiddenLine xmlns="" xmlns:a14="http://schemas.microsoft.com/office/drawing/2010/main" w="9525">
+                  <a14:hiddenLine xmlns:a14="http://schemas.microsoft.com/office/drawing/2010/main" xmlns="" w="9525">
                     <a:solidFill>
                       <a:srgbClr val="000000"/>
                     </a:solidFill>
@@ -10261,7 +10261,7 @@
               </a:ln>
               <a:extLst>
                 <a:ext uri="{91240B29-F687-4f45-9708-019B960494DF}">
-                  <a14:hiddenLine xmlns="" xmlns:a14="http://schemas.microsoft.com/office/drawing/2010/main" w="9525">
+                  <a14:hiddenLine xmlns:a14="http://schemas.microsoft.com/office/drawing/2010/main" xmlns="" w="9525">
                     <a:solidFill>
                       <a:srgbClr val="000000"/>
                     </a:solidFill>
@@ -10351,7 +10351,7 @@
               </a:ln>
               <a:extLst>
                 <a:ext uri="{91240B29-F687-4f45-9708-019B960494DF}">
-                  <a14:hiddenLine xmlns="" xmlns:a14="http://schemas.microsoft.com/office/drawing/2010/main" w="9525">
+                  <a14:hiddenLine xmlns:a14="http://schemas.microsoft.com/office/drawing/2010/main" xmlns="" w="9525">
                     <a:solidFill>
                       <a:srgbClr val="000000"/>
                     </a:solidFill>
@@ -10413,7 +10413,7 @@
               </a:ln>
               <a:extLst>
                 <a:ext uri="{91240B29-F687-4f45-9708-019B960494DF}">
-                  <a14:hiddenLine xmlns="" xmlns:a14="http://schemas.microsoft.com/office/drawing/2010/main" w="9525">
+                  <a14:hiddenLine xmlns:a14="http://schemas.microsoft.com/office/drawing/2010/main" xmlns="" w="9525">
                     <a:solidFill>
                       <a:srgbClr val="000000"/>
                     </a:solidFill>
@@ -10503,7 +10503,7 @@
               </a:ln>
               <a:extLst>
                 <a:ext uri="{91240B29-F687-4f45-9708-019B960494DF}">
-                  <a14:hiddenLine xmlns="" xmlns:a14="http://schemas.microsoft.com/office/drawing/2010/main" w="9525">
+                  <a14:hiddenLine xmlns:a14="http://schemas.microsoft.com/office/drawing/2010/main" xmlns="" w="9525">
                     <a:solidFill>
                       <a:srgbClr val="000000"/>
                     </a:solidFill>
@@ -10568,7 +10568,7 @@
               </a:ln>
               <a:extLst>
                 <a:ext uri="{91240B29-F687-4f45-9708-019B960494DF}">
-                  <a14:hiddenLine xmlns="" xmlns:a14="http://schemas.microsoft.com/office/drawing/2010/main" w="9525">
+                  <a14:hiddenLine xmlns:a14="http://schemas.microsoft.com/office/drawing/2010/main" xmlns="" w="9525">
                     <a:solidFill>
                       <a:srgbClr val="000000"/>
                     </a:solidFill>
@@ -10630,7 +10630,7 @@
               </a:ln>
               <a:extLst>
                 <a:ext uri="{91240B29-F687-4f45-9708-019B960494DF}">
-                  <a14:hiddenLine xmlns="" xmlns:a14="http://schemas.microsoft.com/office/drawing/2010/main" w="9525">
+                  <a14:hiddenLine xmlns:a14="http://schemas.microsoft.com/office/drawing/2010/main" xmlns="" w="9525">
                     <a:solidFill>
                       <a:srgbClr val="000000"/>
                     </a:solidFill>
@@ -10720,7 +10720,7 @@
               </a:ln>
               <a:extLst>
                 <a:ext uri="{91240B29-F687-4f45-9708-019B960494DF}">
-                  <a14:hiddenLine xmlns="" xmlns:a14="http://schemas.microsoft.com/office/drawing/2010/main" w="9525">
+                  <a14:hiddenLine xmlns:a14="http://schemas.microsoft.com/office/drawing/2010/main" xmlns="" w="9525">
                     <a:solidFill>
                       <a:srgbClr val="000000"/>
                     </a:solidFill>
@@ -10810,7 +10810,7 @@
               </a:ln>
               <a:extLst>
                 <a:ext uri="{91240B29-F687-4f45-9708-019B960494DF}">
-                  <a14:hiddenLine xmlns="" xmlns:a14="http://schemas.microsoft.com/office/drawing/2010/main" w="9525">
+                  <a14:hiddenLine xmlns:a14="http://schemas.microsoft.com/office/drawing/2010/main" xmlns="" w="9525">
                     <a:solidFill>
                       <a:srgbClr val="000000"/>
                     </a:solidFill>
@@ -10875,7 +10875,7 @@
               </a:ln>
               <a:extLst>
                 <a:ext uri="{91240B29-F687-4f45-9708-019B960494DF}">
-                  <a14:hiddenLine xmlns="" xmlns:a14="http://schemas.microsoft.com/office/drawing/2010/main" w="9525">
+                  <a14:hiddenLine xmlns:a14="http://schemas.microsoft.com/office/drawing/2010/main" xmlns="" w="9525">
                     <a:solidFill>
                       <a:srgbClr val="000000"/>
                     </a:solidFill>
@@ -10995,7 +10995,7 @@
               </a:ln>
               <a:extLst>
                 <a:ext uri="{91240B29-F687-4f45-9708-019B960494DF}">
-                  <a14:hiddenLine xmlns="" xmlns:a14="http://schemas.microsoft.com/office/drawing/2010/main" w="9525">
+                  <a14:hiddenLine xmlns:a14="http://schemas.microsoft.com/office/drawing/2010/main" xmlns="" w="9525">
                     <a:solidFill>
                       <a:srgbClr val="000000"/>
                     </a:solidFill>
@@ -11093,7 +11093,7 @@
               </a:ln>
               <a:extLst>
                 <a:ext uri="{91240B29-F687-4f45-9708-019B960494DF}">
-                  <a14:hiddenLine xmlns="" xmlns:a14="http://schemas.microsoft.com/office/drawing/2010/main" w="9525">
+                  <a14:hiddenLine xmlns:a14="http://schemas.microsoft.com/office/drawing/2010/main" xmlns="" w="9525">
                     <a:solidFill>
                       <a:srgbClr val="000000"/>
                     </a:solidFill>
@@ -11208,7 +11208,7 @@
               </a:ln>
               <a:extLst>
                 <a:ext uri="{91240B29-F687-4f45-9708-019B960494DF}">
-                  <a14:hiddenLine xmlns="" xmlns:a14="http://schemas.microsoft.com/office/drawing/2010/main" w="9525">
+                  <a14:hiddenLine xmlns:a14="http://schemas.microsoft.com/office/drawing/2010/main" xmlns="" w="9525">
                     <a:solidFill>
                       <a:srgbClr val="000000"/>
                     </a:solidFill>
@@ -11298,7 +11298,7 @@
               </a:ln>
               <a:extLst>
                 <a:ext uri="{91240B29-F687-4f45-9708-019B960494DF}">
-                  <a14:hiddenLine xmlns="" xmlns:a14="http://schemas.microsoft.com/office/drawing/2010/main" w="9525">
+                  <a14:hiddenLine xmlns:a14="http://schemas.microsoft.com/office/drawing/2010/main" xmlns="" w="9525">
                     <a:solidFill>
                       <a:srgbClr val="000000"/>
                     </a:solidFill>
@@ -11363,7 +11363,7 @@
               </a:ln>
               <a:extLst>
                 <a:ext uri="{91240B29-F687-4f45-9708-019B960494DF}">
-                  <a14:hiddenLine xmlns="" xmlns:a14="http://schemas.microsoft.com/office/drawing/2010/main" w="9525">
+                  <a14:hiddenLine xmlns:a14="http://schemas.microsoft.com/office/drawing/2010/main" xmlns="" w="9525">
                     <a:solidFill>
                       <a:srgbClr val="000000"/>
                     </a:solidFill>
@@ -11453,7 +11453,7 @@
               </a:ln>
               <a:extLst>
                 <a:ext uri="{91240B29-F687-4f45-9708-019B960494DF}">
-                  <a14:hiddenLine xmlns="" xmlns:a14="http://schemas.microsoft.com/office/drawing/2010/main" w="9525">
+                  <a14:hiddenLine xmlns:a14="http://schemas.microsoft.com/office/drawing/2010/main" xmlns="" w="9525">
                     <a:solidFill>
                       <a:srgbClr val="000000"/>
                     </a:solidFill>
@@ -11521,7 +11521,7 @@
               </a:ln>
               <a:extLst>
                 <a:ext uri="{91240B29-F687-4f45-9708-019B960494DF}">
-                  <a14:hiddenLine xmlns="" xmlns:a14="http://schemas.microsoft.com/office/drawing/2010/main" w="9525">
+                  <a14:hiddenLine xmlns:a14="http://schemas.microsoft.com/office/drawing/2010/main" xmlns="" w="9525">
                     <a:solidFill>
                       <a:srgbClr val="000000"/>
                     </a:solidFill>
@@ -11611,7 +11611,7 @@
               </a:ln>
               <a:extLst>
                 <a:ext uri="{91240B29-F687-4f45-9708-019B960494DF}">
-                  <a14:hiddenLine xmlns="" xmlns:a14="http://schemas.microsoft.com/office/drawing/2010/main" w="9525">
+                  <a14:hiddenLine xmlns:a14="http://schemas.microsoft.com/office/drawing/2010/main" xmlns="" w="9525">
                     <a:solidFill>
                       <a:srgbClr val="000000"/>
                     </a:solidFill>
@@ -11679,7 +11679,7 @@
               </a:ln>
               <a:extLst>
                 <a:ext uri="{91240B29-F687-4f45-9708-019B960494DF}">
-                  <a14:hiddenLine xmlns="" xmlns:a14="http://schemas.microsoft.com/office/drawing/2010/main" w="9525">
+                  <a14:hiddenLine xmlns:a14="http://schemas.microsoft.com/office/drawing/2010/main" xmlns="" w="9525">
                     <a:solidFill>
                       <a:srgbClr val="000000"/>
                     </a:solidFill>
@@ -11769,7 +11769,7 @@
               </a:ln>
               <a:extLst>
                 <a:ext uri="{91240B29-F687-4f45-9708-019B960494DF}">
-                  <a14:hiddenLine xmlns="" xmlns:a14="http://schemas.microsoft.com/office/drawing/2010/main" w="9525">
+                  <a14:hiddenLine xmlns:a14="http://schemas.microsoft.com/office/drawing/2010/main" xmlns="" w="9525">
                     <a:solidFill>
                       <a:srgbClr val="000000"/>
                     </a:solidFill>
@@ -11803,7 +11803,7 @@
               </a:ln>
               <a:extLst>
                 <a:ext uri="{91240B29-F687-4f45-9708-019B960494DF}">
-                  <a14:hiddenLine xmlns="" xmlns:a14="http://schemas.microsoft.com/office/drawing/2010/main" w="9525">
+                  <a14:hiddenLine xmlns:a14="http://schemas.microsoft.com/office/drawing/2010/main" xmlns="" w="9525">
                     <a:solidFill>
                       <a:srgbClr val="000000"/>
                     </a:solidFill>
@@ -11944,7 +11944,7 @@
             <a:fld id="{48A87A34-81AB-432B-8DAE-1953F412C126}" type="datetimeFigureOut">
               <a:rPr lang="en-US" dirty="0"/>
               <a:pPr/>
-              <a:t>7/26/2018</a:t>
+              <a:t>7/27/2018</a:t>
             </a:fld>
             <a:endParaRPr lang="en-US" dirty="0"/>
           </a:p>
@@ -13439,8 +13439,8 @@
               </a:spcBef>
             </a:pPr>
             <a:r>
-              <a:rPr lang="en-US" sz="2800" dirty="0" err="1"/>
-              <a:t>BankAccount</a:t>
+              <a:rPr lang="en-US" sz="2800"/>
+              <a:t>CreditCardInfo</a:t>
             </a:r>
             <a:endParaRPr lang="en-US" sz="2800" dirty="0"/>
           </a:p>

</xml_diff>